<commit_message>
Updated report files and started presentation
</commit_message>
<xml_diff>
--- a/Source Files/Final/CPU Architecture.pptx
+++ b/Source Files/Final/CPU Architecture.pptx
@@ -8,10 +8,14 @@
     <p:sldId id="256" r:id="rId2"/>
     <p:sldId id="257" r:id="rId3"/>
     <p:sldId id="258" r:id="rId4"/>
-    <p:sldId id="259" r:id="rId5"/>
-    <p:sldId id="260" r:id="rId6"/>
-    <p:sldId id="261" r:id="rId7"/>
-    <p:sldId id="262" r:id="rId8"/>
+    <p:sldId id="263" r:id="rId5"/>
+    <p:sldId id="259" r:id="rId6"/>
+    <p:sldId id="264" r:id="rId7"/>
+    <p:sldId id="260" r:id="rId8"/>
+    <p:sldId id="265" r:id="rId9"/>
+    <p:sldId id="266" r:id="rId10"/>
+    <p:sldId id="261" r:id="rId11"/>
+    <p:sldId id="262" r:id="rId12"/>
   </p:sldIdLst>
   <p:sldSz cx="12192000" cy="6858000"/>
   <p:notesSz cx="6858000" cy="9144000"/>
@@ -110,6 +114,11 @@
       </a:defRPr>
     </a:lvl9pPr>
   </p:defaultTextStyle>
+  <p:extLst>
+    <p:ext uri="{EFAFB233-063F-42B5-8137-9DF3F51BA10A}">
+      <p15:sldGuideLst xmlns:p15="http://schemas.microsoft.com/office/powerpoint/2012/main"/>
+    </p:ext>
+  </p:extLst>
 </p:presentation>
 </file>
 
@@ -244,7 +253,7 @@
           <a:p>
             <a:fld id="{CB37AB1E-EE32-48F7-B51B-28267015AF68}" type="datetimeFigureOut">
               <a:rPr lang="en-US" smtClean="0"/>
-              <a:t>4/25/2015</a:t>
+              <a:t>5/2/2015</a:t>
             </a:fld>
             <a:endParaRPr lang="en-US"/>
           </a:p>
@@ -419,7 +428,7 @@
           <a:p>
             <a:fld id="{CB37AB1E-EE32-48F7-B51B-28267015AF68}" type="datetimeFigureOut">
               <a:rPr lang="en-US" smtClean="0"/>
-              <a:t>4/25/2015</a:t>
+              <a:t>5/2/2015</a:t>
             </a:fld>
             <a:endParaRPr lang="en-US"/>
           </a:p>
@@ -599,7 +608,7 @@
           <a:p>
             <a:fld id="{CB37AB1E-EE32-48F7-B51B-28267015AF68}" type="datetimeFigureOut">
               <a:rPr lang="en-US" smtClean="0"/>
-              <a:t>4/25/2015</a:t>
+              <a:t>5/2/2015</a:t>
             </a:fld>
             <a:endParaRPr lang="en-US"/>
           </a:p>
@@ -774,7 +783,7 @@
           <a:p>
             <a:fld id="{CB37AB1E-EE32-48F7-B51B-28267015AF68}" type="datetimeFigureOut">
               <a:rPr lang="en-US" smtClean="0"/>
-              <a:t>4/25/2015</a:t>
+              <a:t>5/2/2015</a:t>
             </a:fld>
             <a:endParaRPr lang="en-US"/>
           </a:p>
@@ -1020,7 +1029,7 @@
           <a:p>
             <a:fld id="{CB37AB1E-EE32-48F7-B51B-28267015AF68}" type="datetimeFigureOut">
               <a:rPr lang="en-US" smtClean="0"/>
-              <a:t>4/25/2015</a:t>
+              <a:t>5/2/2015</a:t>
             </a:fld>
             <a:endParaRPr lang="en-US"/>
           </a:p>
@@ -1257,7 +1266,7 @@
           <a:p>
             <a:fld id="{CB37AB1E-EE32-48F7-B51B-28267015AF68}" type="datetimeFigureOut">
               <a:rPr lang="en-US" smtClean="0"/>
-              <a:t>4/25/2015</a:t>
+              <a:t>5/2/2015</a:t>
             </a:fld>
             <a:endParaRPr lang="en-US"/>
           </a:p>
@@ -1624,7 +1633,7 @@
           <a:p>
             <a:fld id="{CB37AB1E-EE32-48F7-B51B-28267015AF68}" type="datetimeFigureOut">
               <a:rPr lang="en-US" smtClean="0"/>
-              <a:t>4/25/2015</a:t>
+              <a:t>5/2/2015</a:t>
             </a:fld>
             <a:endParaRPr lang="en-US"/>
           </a:p>
@@ -1742,7 +1751,7 @@
           <a:p>
             <a:fld id="{CB37AB1E-EE32-48F7-B51B-28267015AF68}" type="datetimeFigureOut">
               <a:rPr lang="en-US" smtClean="0"/>
-              <a:t>4/25/2015</a:t>
+              <a:t>5/2/2015</a:t>
             </a:fld>
             <a:endParaRPr lang="en-US"/>
           </a:p>
@@ -1837,7 +1846,7 @@
           <a:p>
             <a:fld id="{CB37AB1E-EE32-48F7-B51B-28267015AF68}" type="datetimeFigureOut">
               <a:rPr lang="en-US" smtClean="0"/>
-              <a:t>4/25/2015</a:t>
+              <a:t>5/2/2015</a:t>
             </a:fld>
             <a:endParaRPr lang="en-US"/>
           </a:p>
@@ -2114,7 +2123,7 @@
           <a:p>
             <a:fld id="{CB37AB1E-EE32-48F7-B51B-28267015AF68}" type="datetimeFigureOut">
               <a:rPr lang="en-US" smtClean="0"/>
-              <a:t>4/25/2015</a:t>
+              <a:t>5/2/2015</a:t>
             </a:fld>
             <a:endParaRPr lang="en-US"/>
           </a:p>
@@ -2371,7 +2380,7 @@
           <a:p>
             <a:fld id="{CB37AB1E-EE32-48F7-B51B-28267015AF68}" type="datetimeFigureOut">
               <a:rPr lang="en-US" smtClean="0"/>
-              <a:t>4/25/2015</a:t>
+              <a:t>5/2/2015</a:t>
             </a:fld>
             <a:endParaRPr lang="en-US"/>
           </a:p>
@@ -2584,7 +2593,7 @@
           <a:p>
             <a:fld id="{CB37AB1E-EE32-48F7-B51B-28267015AF68}" type="datetimeFigureOut">
               <a:rPr lang="en-US" smtClean="0"/>
-              <a:t>4/25/2015</a:t>
+              <a:t>5/2/2015</a:t>
             </a:fld>
             <a:endParaRPr lang="en-US"/>
           </a:p>
@@ -3352,6 +3361,1424 @@
 </p:sld>
 </file>
 
+<file path=ppt/slides/slide10.xml><?xml version="1.0" encoding="utf-8"?>
+<p:sld xmlns:a="http://schemas.openxmlformats.org/drawingml/2006/main" xmlns:r="http://schemas.openxmlformats.org/officeDocument/2006/relationships" xmlns:p="http://schemas.openxmlformats.org/presentationml/2006/main">
+  <p:cSld>
+    <p:spTree>
+      <p:nvGrpSpPr>
+        <p:cNvPr id="1" name=""/>
+        <p:cNvGrpSpPr/>
+        <p:nvPr/>
+      </p:nvGrpSpPr>
+      <p:grpSpPr>
+        <a:xfrm>
+          <a:off x="0" y="0"/>
+          <a:ext cx="0" cy="0"/>
+          <a:chOff x="0" y="0"/>
+          <a:chExt cx="0" cy="0"/>
+        </a:xfrm>
+      </p:grpSpPr>
+      <p:sp>
+        <p:nvSpPr>
+          <p:cNvPr id="2" name="Title 1"/>
+          <p:cNvSpPr>
+            <a:spLocks noGrp="1"/>
+          </p:cNvSpPr>
+          <p:nvPr>
+            <p:ph type="title"/>
+          </p:nvPr>
+        </p:nvSpPr>
+        <p:spPr/>
+        <p:txBody>
+          <a:bodyPr/>
+          <a:lstStyle/>
+          <a:p>
+            <a:r>
+              <a:rPr lang="en-US" dirty="0" smtClean="0"/>
+              <a:t>Execution</a:t>
+            </a:r>
+            <a:endParaRPr lang="en-US" dirty="0"/>
+          </a:p>
+        </p:txBody>
+      </p:sp>
+      <p:graphicFrame>
+        <p:nvGraphicFramePr>
+          <p:cNvPr id="14" name="Content Placeholder 13"/>
+          <p:cNvGraphicFramePr>
+            <a:graphicFrameLocks noGrp="1"/>
+          </p:cNvGraphicFramePr>
+          <p:nvPr>
+            <p:ph idx="1"/>
+            <p:extLst>
+              <p:ext uri="{D42A27DB-BD31-4B8C-83A1-F6EECF244321}">
+                <p14:modId xmlns:p14="http://schemas.microsoft.com/office/powerpoint/2010/main" val="3060891782"/>
+              </p:ext>
+            </p:extLst>
+          </p:nvPr>
+        </p:nvGraphicFramePr>
+        <p:xfrm>
+          <a:off x="838200" y="1825625"/>
+          <a:ext cx="10515600" cy="4206240"/>
+        </p:xfrm>
+        <a:graphic>
+          <a:graphicData uri="http://schemas.openxmlformats.org/drawingml/2006/table">
+            <a:tbl>
+              <a:tblPr firstRow="1" bandRow="1">
+                <a:tableStyleId>{073A0DAA-6AF3-43AB-8588-CEC1D06C72B9}</a:tableStyleId>
+              </a:tblPr>
+              <a:tblGrid>
+                <a:gridCol w="3505200"/>
+                <a:gridCol w="3505200"/>
+                <a:gridCol w="3505200"/>
+              </a:tblGrid>
+              <a:tr h="370840">
+                <a:tc>
+                  <a:txBody>
+                    <a:bodyPr/>
+                    <a:lstStyle/>
+                    <a:p>
+                      <a:r>
+                        <a:rPr lang="en-US" dirty="0" err="1" smtClean="0"/>
+                        <a:t>lw</a:t>
+                      </a:r>
+                      <a:r>
+                        <a:rPr lang="en-US" dirty="0" smtClean="0"/>
+                        <a:t> $1, 0($0)</a:t>
+                      </a:r>
+                    </a:p>
+                    <a:p>
+                      <a:endParaRPr lang="en-US" dirty="0" smtClean="0"/>
+                    </a:p>
+                    <a:p>
+                      <a:r>
+                        <a:rPr lang="en-US" dirty="0" err="1" smtClean="0"/>
+                        <a:t>lw</a:t>
+                      </a:r>
+                      <a:r>
+                        <a:rPr lang="en-US" dirty="0" smtClean="0"/>
+                        <a:t> $2, 2($0)</a:t>
+                      </a:r>
+                    </a:p>
+                    <a:p>
+                      <a:endParaRPr lang="en-US" dirty="0" smtClean="0"/>
+                    </a:p>
+                    <a:p>
+                      <a:r>
+                        <a:rPr lang="en-US" dirty="0" smtClean="0"/>
+                        <a:t>add  $2, $2, $1</a:t>
+                      </a:r>
+                    </a:p>
+                    <a:p>
+                      <a:endParaRPr lang="en-US" dirty="0" smtClean="0"/>
+                    </a:p>
+                    <a:p>
+                      <a:r>
+                        <a:rPr lang="en-US" dirty="0" err="1" smtClean="0"/>
+                        <a:t>addi</a:t>
+                      </a:r>
+                      <a:r>
+                        <a:rPr lang="en-US" dirty="0" smtClean="0"/>
+                        <a:t> $1, $1, 1</a:t>
+                      </a:r>
+                    </a:p>
+                    <a:p>
+                      <a:endParaRPr lang="en-US" dirty="0" smtClean="0"/>
+                    </a:p>
+                    <a:p>
+                      <a:r>
+                        <a:rPr lang="en-US" dirty="0" err="1" smtClean="0"/>
+                        <a:t>slt</a:t>
+                      </a:r>
+                      <a:r>
+                        <a:rPr lang="en-US" dirty="0" smtClean="0"/>
+                        <a:t> $3, $1, $2</a:t>
+                      </a:r>
+                    </a:p>
+                    <a:p>
+                      <a:endParaRPr lang="en-US" dirty="0" smtClean="0"/>
+                    </a:p>
+                    <a:p>
+                      <a:r>
+                        <a:rPr lang="en-US" dirty="0" err="1" smtClean="0"/>
+                        <a:t>beq</a:t>
+                      </a:r>
+                      <a:r>
+                        <a:rPr lang="en-US" dirty="0" smtClean="0"/>
+                        <a:t> $3, $0, 4</a:t>
+                      </a:r>
+                    </a:p>
+                    <a:p>
+                      <a:endParaRPr lang="en-US" dirty="0" smtClean="0"/>
+                    </a:p>
+                    <a:p>
+                      <a:r>
+                        <a:rPr lang="en-US" dirty="0" err="1" smtClean="0"/>
+                        <a:t>sw</a:t>
+                      </a:r>
+                      <a:r>
+                        <a:rPr lang="en-US" dirty="0" smtClean="0"/>
+                        <a:t> $1, 2($0)</a:t>
+                      </a:r>
+                    </a:p>
+                    <a:p>
+                      <a:endParaRPr lang="en-US" dirty="0" smtClean="0"/>
+                    </a:p>
+                    <a:p>
+                      <a:r>
+                        <a:rPr lang="en-US" dirty="0" err="1" smtClean="0"/>
+                        <a:t>sw</a:t>
+                      </a:r>
+                      <a:r>
+                        <a:rPr lang="en-US" dirty="0" smtClean="0"/>
+                        <a:t> $2, 0($0)</a:t>
+                      </a:r>
+                      <a:endParaRPr lang="en-US" dirty="0"/>
+                    </a:p>
+                  </a:txBody>
+                  <a:tcPr/>
+                </a:tc>
+                <a:tc>
+                  <a:txBody>
+                    <a:bodyPr/>
+                    <a:lstStyle/>
+                    <a:p>
+                      <a:r>
+                        <a:rPr lang="en-US" dirty="0" err="1" smtClean="0"/>
+                        <a:t>lw</a:t>
+                      </a:r>
+                      <a:r>
+                        <a:rPr lang="en-US" dirty="0" smtClean="0"/>
+                        <a:t> $1, 0($0)</a:t>
+                      </a:r>
+                    </a:p>
+                    <a:p>
+                      <a:endParaRPr lang="en-US" dirty="0" smtClean="0"/>
+                    </a:p>
+                    <a:p>
+                      <a:r>
+                        <a:rPr lang="en-US" dirty="0" err="1" smtClean="0"/>
+                        <a:t>lw</a:t>
+                      </a:r>
+                      <a:r>
+                        <a:rPr lang="en-US" dirty="0" smtClean="0"/>
+                        <a:t> $2, 2($0)</a:t>
+                      </a:r>
+                    </a:p>
+                    <a:p>
+                      <a:endParaRPr lang="en-US" dirty="0" smtClean="0"/>
+                    </a:p>
+                    <a:p>
+                      <a:r>
+                        <a:rPr lang="en-US" dirty="0" smtClean="0"/>
+                        <a:t>sub $1, $1, $2</a:t>
+                      </a:r>
+                    </a:p>
+                    <a:p>
+                      <a:endParaRPr lang="en-US" dirty="0" smtClean="0"/>
+                    </a:p>
+                    <a:p>
+                      <a:r>
+                        <a:rPr lang="en-US" dirty="0" err="1" smtClean="0"/>
+                        <a:t>bne</a:t>
+                      </a:r>
+                      <a:r>
+                        <a:rPr lang="en-US" dirty="0" smtClean="0"/>
+                        <a:t> $1, $0, -5</a:t>
+                      </a:r>
+                    </a:p>
+                    <a:p>
+                      <a:endParaRPr lang="en-US" dirty="0" smtClean="0"/>
+                    </a:p>
+                    <a:p>
+                      <a:r>
+                        <a:rPr lang="en-US" dirty="0" err="1" smtClean="0"/>
+                        <a:t>sw</a:t>
+                      </a:r>
+                      <a:r>
+                        <a:rPr lang="en-US" dirty="0" smtClean="0"/>
+                        <a:t>  $1, 2($0)</a:t>
+                      </a:r>
+                    </a:p>
+                    <a:p>
+                      <a:endParaRPr lang="en-US" dirty="0" smtClean="0"/>
+                    </a:p>
+                    <a:p>
+                      <a:r>
+                        <a:rPr lang="en-US" dirty="0" err="1" smtClean="0"/>
+                        <a:t>beq</a:t>
+                      </a:r>
+                      <a:r>
+                        <a:rPr lang="en-US" dirty="0" smtClean="0"/>
+                        <a:t> $1, $0, 4</a:t>
+                      </a:r>
+                    </a:p>
+                    <a:p>
+                      <a:endParaRPr lang="en-US" dirty="0" smtClean="0"/>
+                    </a:p>
+                    <a:p>
+                      <a:r>
+                        <a:rPr lang="en-US" dirty="0" err="1" smtClean="0"/>
+                        <a:t>addi</a:t>
+                      </a:r>
+                      <a:r>
+                        <a:rPr lang="en-US" dirty="0" smtClean="0"/>
+                        <a:t> $t1, $0, 1</a:t>
+                      </a:r>
+                    </a:p>
+                    <a:p>
+                      <a:endParaRPr lang="en-US" dirty="0" smtClean="0"/>
+                    </a:p>
+                    <a:p>
+                      <a:r>
+                        <a:rPr lang="en-US" dirty="0" err="1" smtClean="0"/>
+                        <a:t>addi</a:t>
+                      </a:r>
+                      <a:r>
+                        <a:rPr lang="en-US" dirty="0" smtClean="0"/>
+                        <a:t> $t1, $0, 1</a:t>
+                      </a:r>
+                      <a:endParaRPr lang="en-US" dirty="0"/>
+                    </a:p>
+                  </a:txBody>
+                  <a:tcPr/>
+                </a:tc>
+                <a:tc>
+                  <a:txBody>
+                    <a:bodyPr/>
+                    <a:lstStyle/>
+                    <a:p>
+                      <a:r>
+                        <a:rPr lang="en-US" dirty="0" err="1" smtClean="0"/>
+                        <a:t>addi</a:t>
+                      </a:r>
+                      <a:r>
+                        <a:rPr lang="en-US" dirty="0" smtClean="0"/>
+                        <a:t> $t1, $0, 1</a:t>
+                      </a:r>
+                    </a:p>
+                    <a:p>
+                      <a:endParaRPr lang="en-US" dirty="0" smtClean="0"/>
+                    </a:p>
+                    <a:p>
+                      <a:r>
+                        <a:rPr lang="en-US" dirty="0" err="1" smtClean="0"/>
+                        <a:t>addi</a:t>
+                      </a:r>
+                      <a:r>
+                        <a:rPr lang="en-US" dirty="0" smtClean="0"/>
+                        <a:t> $t1, $0, 1</a:t>
+                      </a:r>
+                    </a:p>
+                    <a:p>
+                      <a:endParaRPr lang="en-US" dirty="0" smtClean="0"/>
+                    </a:p>
+                    <a:p>
+                      <a:r>
+                        <a:rPr lang="en-US" dirty="0" err="1" smtClean="0"/>
+                        <a:t>lw</a:t>
+                      </a:r>
+                      <a:r>
+                        <a:rPr lang="en-US" dirty="0" smtClean="0"/>
+                        <a:t> $2, 2($0)</a:t>
+                      </a:r>
+                    </a:p>
+                    <a:p>
+                      <a:endParaRPr lang="en-US" dirty="0" smtClean="0"/>
+                    </a:p>
+                    <a:p>
+                      <a:r>
+                        <a:rPr lang="en-US" dirty="0" err="1" smtClean="0"/>
+                        <a:t>addi</a:t>
+                      </a:r>
+                      <a:r>
+                        <a:rPr lang="en-US" dirty="0" smtClean="0"/>
+                        <a:t> $t1, $0, 3</a:t>
+                      </a:r>
+                    </a:p>
+                    <a:p>
+                      <a:endParaRPr lang="en-US" dirty="0" smtClean="0"/>
+                    </a:p>
+                    <a:p>
+                      <a:r>
+                        <a:rPr lang="en-US" dirty="0" err="1" smtClean="0"/>
+                        <a:t>addi</a:t>
+                      </a:r>
+                      <a:r>
+                        <a:rPr lang="en-US" dirty="0" smtClean="0"/>
+                        <a:t> $t2, $0, 1</a:t>
+                      </a:r>
+                    </a:p>
+                    <a:p>
+                      <a:endParaRPr lang="en-US" dirty="0" smtClean="0"/>
+                    </a:p>
+                    <a:p>
+                      <a:r>
+                        <a:rPr lang="en-US" dirty="0" err="1" smtClean="0"/>
+                        <a:t>sw</a:t>
+                      </a:r>
+                      <a:r>
+                        <a:rPr lang="en-US" dirty="0" smtClean="0"/>
+                        <a:t>  $1, 0($0)</a:t>
+                      </a:r>
+                    </a:p>
+                    <a:p>
+                      <a:endParaRPr lang="en-US" dirty="0" smtClean="0"/>
+                    </a:p>
+                    <a:p>
+                      <a:r>
+                        <a:rPr lang="en-US" dirty="0" err="1" smtClean="0"/>
+                        <a:t>sw</a:t>
+                      </a:r>
+                      <a:r>
+                        <a:rPr lang="en-US" dirty="0" smtClean="0"/>
+                        <a:t>  $2, 2($0)</a:t>
+                      </a:r>
+                    </a:p>
+                    <a:p>
+                      <a:endParaRPr lang="en-US" dirty="0" smtClean="0"/>
+                    </a:p>
+                    <a:p>
+                      <a:r>
+                        <a:rPr lang="en-US" dirty="0" smtClean="0"/>
+                        <a:t>j 0</a:t>
+                      </a:r>
+                      <a:endParaRPr lang="en-US" dirty="0"/>
+                    </a:p>
+                  </a:txBody>
+                  <a:tcPr/>
+                </a:tc>
+              </a:tr>
+            </a:tbl>
+          </a:graphicData>
+        </a:graphic>
+      </p:graphicFrame>
+      <p:cxnSp>
+        <p:nvCxnSpPr>
+          <p:cNvPr id="4" name="Straight Connector 3"/>
+          <p:cNvCxnSpPr/>
+          <p:nvPr/>
+        </p:nvCxnSpPr>
+        <p:spPr>
+          <a:xfrm flipH="1">
+            <a:off x="541178" y="6316824"/>
+            <a:ext cx="11109646" cy="0"/>
+          </a:xfrm>
+          <a:prstGeom prst="line">
+            <a:avLst/>
+          </a:prstGeom>
+        </p:spPr>
+        <p:style>
+          <a:lnRef idx="1">
+            <a:schemeClr val="accent1"/>
+          </a:lnRef>
+          <a:fillRef idx="0">
+            <a:schemeClr val="accent1"/>
+          </a:fillRef>
+          <a:effectRef idx="0">
+            <a:schemeClr val="accent1"/>
+          </a:effectRef>
+          <a:fontRef idx="minor">
+            <a:schemeClr val="tx1"/>
+          </a:fontRef>
+        </p:style>
+      </p:cxnSp>
+      <p:cxnSp>
+        <p:nvCxnSpPr>
+          <p:cNvPr id="5" name="Straight Connector 4"/>
+          <p:cNvCxnSpPr/>
+          <p:nvPr/>
+        </p:nvCxnSpPr>
+        <p:spPr>
+          <a:xfrm flipH="1">
+            <a:off x="723900" y="6469224"/>
+            <a:ext cx="10744200" cy="0"/>
+          </a:xfrm>
+          <a:prstGeom prst="line">
+            <a:avLst/>
+          </a:prstGeom>
+        </p:spPr>
+        <p:style>
+          <a:lnRef idx="1">
+            <a:schemeClr val="accent1"/>
+          </a:lnRef>
+          <a:fillRef idx="0">
+            <a:schemeClr val="accent1"/>
+          </a:fillRef>
+          <a:effectRef idx="0">
+            <a:schemeClr val="accent1"/>
+          </a:effectRef>
+          <a:fontRef idx="minor">
+            <a:schemeClr val="tx1"/>
+          </a:fontRef>
+        </p:style>
+      </p:cxnSp>
+      <p:cxnSp>
+        <p:nvCxnSpPr>
+          <p:cNvPr id="6" name="Straight Connector 5"/>
+          <p:cNvCxnSpPr/>
+          <p:nvPr/>
+        </p:nvCxnSpPr>
+        <p:spPr>
+          <a:xfrm flipH="1">
+            <a:off x="876300" y="6621624"/>
+            <a:ext cx="10378440" cy="0"/>
+          </a:xfrm>
+          <a:prstGeom prst="line">
+            <a:avLst/>
+          </a:prstGeom>
+        </p:spPr>
+        <p:style>
+          <a:lnRef idx="1">
+            <a:schemeClr val="accent1"/>
+          </a:lnRef>
+          <a:fillRef idx="0">
+            <a:schemeClr val="accent1"/>
+          </a:fillRef>
+          <a:effectRef idx="0">
+            <a:schemeClr val="accent1"/>
+          </a:effectRef>
+          <a:fontRef idx="minor">
+            <a:schemeClr val="tx1"/>
+          </a:fontRef>
+        </p:style>
+      </p:cxnSp>
+      <p:cxnSp>
+        <p:nvCxnSpPr>
+          <p:cNvPr id="7" name="Straight Connector 6"/>
+          <p:cNvCxnSpPr/>
+          <p:nvPr/>
+        </p:nvCxnSpPr>
+        <p:spPr>
+          <a:xfrm flipH="1">
+            <a:off x="0" y="6316824"/>
+            <a:ext cx="541178" cy="541176"/>
+          </a:xfrm>
+          <a:prstGeom prst="line">
+            <a:avLst/>
+          </a:prstGeom>
+        </p:spPr>
+        <p:style>
+          <a:lnRef idx="1">
+            <a:schemeClr val="accent1"/>
+          </a:lnRef>
+          <a:fillRef idx="0">
+            <a:schemeClr val="accent1"/>
+          </a:fillRef>
+          <a:effectRef idx="0">
+            <a:schemeClr val="accent1"/>
+          </a:effectRef>
+          <a:fontRef idx="minor">
+            <a:schemeClr val="tx1"/>
+          </a:fontRef>
+        </p:style>
+      </p:cxnSp>
+      <p:cxnSp>
+        <p:nvCxnSpPr>
+          <p:cNvPr id="8" name="Straight Connector 7"/>
+          <p:cNvCxnSpPr/>
+          <p:nvPr/>
+        </p:nvCxnSpPr>
+        <p:spPr>
+          <a:xfrm flipH="1">
+            <a:off x="344846" y="6469224"/>
+            <a:ext cx="379054" cy="388776"/>
+          </a:xfrm>
+          <a:prstGeom prst="line">
+            <a:avLst/>
+          </a:prstGeom>
+        </p:spPr>
+        <p:style>
+          <a:lnRef idx="1">
+            <a:schemeClr val="accent1"/>
+          </a:lnRef>
+          <a:fillRef idx="0">
+            <a:schemeClr val="accent1"/>
+          </a:fillRef>
+          <a:effectRef idx="0">
+            <a:schemeClr val="accent1"/>
+          </a:effectRef>
+          <a:fontRef idx="minor">
+            <a:schemeClr val="tx1"/>
+          </a:fontRef>
+        </p:style>
+      </p:cxnSp>
+      <p:cxnSp>
+        <p:nvCxnSpPr>
+          <p:cNvPr id="9" name="Straight Connector 8"/>
+          <p:cNvCxnSpPr/>
+          <p:nvPr/>
+        </p:nvCxnSpPr>
+        <p:spPr>
+          <a:xfrm flipH="1">
+            <a:off x="657225" y="6621624"/>
+            <a:ext cx="219075" cy="236376"/>
+          </a:xfrm>
+          <a:prstGeom prst="line">
+            <a:avLst/>
+          </a:prstGeom>
+        </p:spPr>
+        <p:style>
+          <a:lnRef idx="1">
+            <a:schemeClr val="accent1"/>
+          </a:lnRef>
+          <a:fillRef idx="0">
+            <a:schemeClr val="accent1"/>
+          </a:fillRef>
+          <a:effectRef idx="0">
+            <a:schemeClr val="accent1"/>
+          </a:effectRef>
+          <a:fontRef idx="minor">
+            <a:schemeClr val="tx1"/>
+          </a:fontRef>
+        </p:style>
+      </p:cxnSp>
+      <p:cxnSp>
+        <p:nvCxnSpPr>
+          <p:cNvPr id="10" name="Straight Connector 9"/>
+          <p:cNvCxnSpPr/>
+          <p:nvPr/>
+        </p:nvCxnSpPr>
+        <p:spPr>
+          <a:xfrm rot="5400000" flipH="1">
+            <a:off x="11650821" y="6316823"/>
+            <a:ext cx="541178" cy="541176"/>
+          </a:xfrm>
+          <a:prstGeom prst="line">
+            <a:avLst/>
+          </a:prstGeom>
+        </p:spPr>
+        <p:style>
+          <a:lnRef idx="1">
+            <a:schemeClr val="accent1"/>
+          </a:lnRef>
+          <a:fillRef idx="0">
+            <a:schemeClr val="accent1"/>
+          </a:fillRef>
+          <a:effectRef idx="0">
+            <a:schemeClr val="accent1"/>
+          </a:effectRef>
+          <a:fontRef idx="minor">
+            <a:schemeClr val="tx1"/>
+          </a:fontRef>
+        </p:style>
+      </p:cxnSp>
+      <p:cxnSp>
+        <p:nvCxnSpPr>
+          <p:cNvPr id="11" name="Straight Connector 10"/>
+          <p:cNvCxnSpPr/>
+          <p:nvPr/>
+        </p:nvCxnSpPr>
+        <p:spPr>
+          <a:xfrm flipH="1" flipV="1">
+            <a:off x="11468100" y="6469223"/>
+            <a:ext cx="396082" cy="388777"/>
+          </a:xfrm>
+          <a:prstGeom prst="line">
+            <a:avLst/>
+          </a:prstGeom>
+        </p:spPr>
+        <p:style>
+          <a:lnRef idx="1">
+            <a:schemeClr val="accent1"/>
+          </a:lnRef>
+          <a:fillRef idx="0">
+            <a:schemeClr val="accent1"/>
+          </a:fillRef>
+          <a:effectRef idx="0">
+            <a:schemeClr val="accent1"/>
+          </a:effectRef>
+          <a:fontRef idx="minor">
+            <a:schemeClr val="tx1"/>
+          </a:fontRef>
+        </p:style>
+      </p:cxnSp>
+      <p:cxnSp>
+        <p:nvCxnSpPr>
+          <p:cNvPr id="12" name="Straight Connector 11"/>
+          <p:cNvCxnSpPr/>
+          <p:nvPr/>
+        </p:nvCxnSpPr>
+        <p:spPr>
+          <a:xfrm flipH="1" flipV="1">
+            <a:off x="11254740" y="6621624"/>
+            <a:ext cx="213360" cy="236376"/>
+          </a:xfrm>
+          <a:prstGeom prst="line">
+            <a:avLst/>
+          </a:prstGeom>
+        </p:spPr>
+        <p:style>
+          <a:lnRef idx="1">
+            <a:schemeClr val="accent1"/>
+          </a:lnRef>
+          <a:fillRef idx="0">
+            <a:schemeClr val="accent1"/>
+          </a:fillRef>
+          <a:effectRef idx="0">
+            <a:schemeClr val="accent1"/>
+          </a:effectRef>
+          <a:fontRef idx="minor">
+            <a:schemeClr val="tx1"/>
+          </a:fontRef>
+        </p:style>
+      </p:cxnSp>
+      <p:sp>
+        <p:nvSpPr>
+          <p:cNvPr id="13" name="Oval 12"/>
+          <p:cNvSpPr/>
+          <p:nvPr/>
+        </p:nvSpPr>
+        <p:spPr>
+          <a:xfrm>
+            <a:off x="0" y="6724650"/>
+            <a:ext cx="121879" cy="133350"/>
+          </a:xfrm>
+          <a:prstGeom prst="ellipse">
+            <a:avLst/>
+          </a:prstGeom>
+          <a:solidFill>
+            <a:schemeClr val="tx1"/>
+          </a:solidFill>
+          <a:effectLst>
+            <a:glow rad="63500">
+              <a:schemeClr val="accent1">
+                <a:satMod val="175000"/>
+                <a:alpha val="40000"/>
+              </a:schemeClr>
+            </a:glow>
+            <a:softEdge rad="31750"/>
+          </a:effectLst>
+        </p:spPr>
+        <p:style>
+          <a:lnRef idx="2">
+            <a:schemeClr val="accent1">
+              <a:shade val="50000"/>
+            </a:schemeClr>
+          </a:lnRef>
+          <a:fillRef idx="1">
+            <a:schemeClr val="accent1"/>
+          </a:fillRef>
+          <a:effectRef idx="0">
+            <a:schemeClr val="accent1"/>
+          </a:effectRef>
+          <a:fontRef idx="minor">
+            <a:schemeClr val="lt1"/>
+          </a:fontRef>
+        </p:style>
+        <p:txBody>
+          <a:bodyPr rtlCol="0" anchor="ctr"/>
+          <a:lstStyle/>
+          <a:p>
+            <a:pPr algn="ctr"/>
+            <a:endParaRPr lang="en-US"/>
+          </a:p>
+        </p:txBody>
+      </p:sp>
+    </p:spTree>
+    <p:extLst>
+      <p:ext uri="{BB962C8B-B14F-4D97-AF65-F5344CB8AC3E}">
+        <p14:creationId xmlns:p14="http://schemas.microsoft.com/office/powerpoint/2010/main" val="712387226"/>
+      </p:ext>
+    </p:extLst>
+  </p:cSld>
+  <p:clrMapOvr>
+    <a:masterClrMapping/>
+  </p:clrMapOvr>
+  <p:timing>
+    <p:tnLst>
+      <p:par>
+        <p:cTn id="1" dur="indefinite" restart="never" nodeType="tmRoot">
+          <p:childTnLst>
+            <p:seq concurrent="1" nextAc="seek">
+              <p:cTn id="2" dur="indefinite" nodeType="mainSeq">
+                <p:childTnLst>
+                  <p:par>
+                    <p:cTn id="3" fill="hold">
+                      <p:stCondLst>
+                        <p:cond delay="indefinite"/>
+                        <p:cond evt="onBegin" delay="0">
+                          <p:tn val="2"/>
+                        </p:cond>
+                      </p:stCondLst>
+                      <p:childTnLst>
+                        <p:par>
+                          <p:cTn id="4" fill="hold">
+                            <p:stCondLst>
+                              <p:cond delay="0"/>
+                            </p:stCondLst>
+                            <p:childTnLst>
+                              <p:par>
+                                <p:cTn id="5" presetID="1" presetClass="entr" presetSubtype="0" fill="hold" grpId="1" nodeType="afterEffect">
+                                  <p:stCondLst>
+                                    <p:cond delay="0"/>
+                                  </p:stCondLst>
+                                  <p:childTnLst>
+                                    <p:set>
+                                      <p:cBhvr>
+                                        <p:cTn id="6" dur="1" fill="hold">
+                                          <p:stCondLst>
+                                            <p:cond delay="0"/>
+                                          </p:stCondLst>
+                                        </p:cTn>
+                                        <p:tgtEl>
+                                          <p:spTgt spid="13"/>
+                                        </p:tgtEl>
+                                        <p:attrNameLst>
+                                          <p:attrName>style.visibility</p:attrName>
+                                        </p:attrNameLst>
+                                      </p:cBhvr>
+                                      <p:to>
+                                        <p:strVal val="visible"/>
+                                      </p:to>
+                                    </p:set>
+                                  </p:childTnLst>
+                                </p:cTn>
+                              </p:par>
+                            </p:childTnLst>
+                          </p:cTn>
+                        </p:par>
+                        <p:par>
+                          <p:cTn id="7" fill="hold">
+                            <p:stCondLst>
+                              <p:cond delay="0"/>
+                            </p:stCondLst>
+                            <p:childTnLst>
+                              <p:par>
+                                <p:cTn id="8" presetID="0" presetClass="path" presetSubtype="0" accel="50000" decel="50000" fill="hold" grpId="0" nodeType="afterEffect">
+                                  <p:stCondLst>
+                                    <p:cond delay="0"/>
+                                  </p:stCondLst>
+                                  <p:childTnLst>
+                                    <p:animMotion origin="layout" path="M 1.66667E-6 2.22222E-6 L 0.0414 -0.06806 L 0.95234 -0.06945 L 0.99453 0.00694 " pathEditMode="relative" ptsTypes="AAAA">
+                                      <p:cBhvr>
+                                        <p:cTn id="9" dur="2000" fill="hold"/>
+                                        <p:tgtEl>
+                                          <p:spTgt spid="13"/>
+                                        </p:tgtEl>
+                                        <p:attrNameLst>
+                                          <p:attrName>ppt_x</p:attrName>
+                                          <p:attrName>ppt_y</p:attrName>
+                                        </p:attrNameLst>
+                                      </p:cBhvr>
+                                    </p:animMotion>
+                                  </p:childTnLst>
+                                </p:cTn>
+                              </p:par>
+                            </p:childTnLst>
+                          </p:cTn>
+                        </p:par>
+                        <p:par>
+                          <p:cTn id="10" fill="hold">
+                            <p:stCondLst>
+                              <p:cond delay="2000"/>
+                            </p:stCondLst>
+                            <p:childTnLst>
+                              <p:par>
+                                <p:cTn id="11" presetID="1" presetClass="exit" presetSubtype="0" fill="hold" grpId="2" nodeType="afterEffect">
+                                  <p:stCondLst>
+                                    <p:cond delay="0"/>
+                                  </p:stCondLst>
+                                  <p:childTnLst>
+                                    <p:set>
+                                      <p:cBhvr>
+                                        <p:cTn id="12" dur="1" fill="hold">
+                                          <p:stCondLst>
+                                            <p:cond delay="0"/>
+                                          </p:stCondLst>
+                                        </p:cTn>
+                                        <p:tgtEl>
+                                          <p:spTgt spid="13"/>
+                                        </p:tgtEl>
+                                        <p:attrNameLst>
+                                          <p:attrName>style.visibility</p:attrName>
+                                        </p:attrNameLst>
+                                      </p:cBhvr>
+                                      <p:to>
+                                        <p:strVal val="hidden"/>
+                                      </p:to>
+                                    </p:set>
+                                  </p:childTnLst>
+                                </p:cTn>
+                              </p:par>
+                            </p:childTnLst>
+                          </p:cTn>
+                        </p:par>
+                      </p:childTnLst>
+                    </p:cTn>
+                  </p:par>
+                </p:childTnLst>
+              </p:cTn>
+              <p:prevCondLst>
+                <p:cond evt="onPrev" delay="0">
+                  <p:tgtEl>
+                    <p:sldTgt/>
+                  </p:tgtEl>
+                </p:cond>
+              </p:prevCondLst>
+              <p:nextCondLst>
+                <p:cond evt="onNext" delay="0">
+                  <p:tgtEl>
+                    <p:sldTgt/>
+                  </p:tgtEl>
+                </p:cond>
+              </p:nextCondLst>
+            </p:seq>
+          </p:childTnLst>
+        </p:cTn>
+      </p:par>
+    </p:tnLst>
+    <p:bldLst>
+      <p:bldP spid="13" grpId="0" animBg="1"/>
+      <p:bldP spid="13" grpId="1" animBg="1"/>
+      <p:bldP spid="13" grpId="2" animBg="1"/>
+    </p:bldLst>
+  </p:timing>
+</p:sld>
+</file>
+
+<file path=ppt/slides/slide11.xml><?xml version="1.0" encoding="utf-8"?>
+<p:sld xmlns:a="http://schemas.openxmlformats.org/drawingml/2006/main" xmlns:r="http://schemas.openxmlformats.org/officeDocument/2006/relationships" xmlns:p="http://schemas.openxmlformats.org/presentationml/2006/main">
+  <p:cSld>
+    <p:spTree>
+      <p:nvGrpSpPr>
+        <p:cNvPr id="1" name=""/>
+        <p:cNvGrpSpPr/>
+        <p:nvPr/>
+      </p:nvGrpSpPr>
+      <p:grpSpPr>
+        <a:xfrm>
+          <a:off x="0" y="0"/>
+          <a:ext cx="0" cy="0"/>
+          <a:chOff x="0" y="0"/>
+          <a:chExt cx="0" cy="0"/>
+        </a:xfrm>
+      </p:grpSpPr>
+      <p:sp>
+        <p:nvSpPr>
+          <p:cNvPr id="2" name="Title 1"/>
+          <p:cNvSpPr>
+            <a:spLocks noGrp="1"/>
+          </p:cNvSpPr>
+          <p:nvPr>
+            <p:ph type="title"/>
+          </p:nvPr>
+        </p:nvSpPr>
+        <p:spPr/>
+        <p:txBody>
+          <a:bodyPr/>
+          <a:lstStyle/>
+          <a:p>
+            <a:r>
+              <a:rPr lang="en-US" dirty="0" smtClean="0"/>
+              <a:t>Thank You!</a:t>
+            </a:r>
+            <a:endParaRPr lang="en-US" dirty="0"/>
+          </a:p>
+        </p:txBody>
+      </p:sp>
+      <p:sp>
+        <p:nvSpPr>
+          <p:cNvPr id="3" name="Content Placeholder 2"/>
+          <p:cNvSpPr>
+            <a:spLocks noGrp="1"/>
+          </p:cNvSpPr>
+          <p:nvPr>
+            <p:ph idx="1"/>
+          </p:nvPr>
+        </p:nvSpPr>
+        <p:spPr/>
+        <p:txBody>
+          <a:bodyPr/>
+          <a:lstStyle/>
+          <a:p>
+            <a:endParaRPr lang="en-US" dirty="0"/>
+          </a:p>
+        </p:txBody>
+      </p:sp>
+      <p:cxnSp>
+        <p:nvCxnSpPr>
+          <p:cNvPr id="4" name="Straight Connector 3"/>
+          <p:cNvCxnSpPr/>
+          <p:nvPr/>
+        </p:nvCxnSpPr>
+        <p:spPr>
+          <a:xfrm flipH="1">
+            <a:off x="541178" y="6316824"/>
+            <a:ext cx="11109646" cy="0"/>
+          </a:xfrm>
+          <a:prstGeom prst="line">
+            <a:avLst/>
+          </a:prstGeom>
+        </p:spPr>
+        <p:style>
+          <a:lnRef idx="1">
+            <a:schemeClr val="accent1"/>
+          </a:lnRef>
+          <a:fillRef idx="0">
+            <a:schemeClr val="accent1"/>
+          </a:fillRef>
+          <a:effectRef idx="0">
+            <a:schemeClr val="accent1"/>
+          </a:effectRef>
+          <a:fontRef idx="minor">
+            <a:schemeClr val="tx1"/>
+          </a:fontRef>
+        </p:style>
+      </p:cxnSp>
+      <p:cxnSp>
+        <p:nvCxnSpPr>
+          <p:cNvPr id="5" name="Straight Connector 4"/>
+          <p:cNvCxnSpPr/>
+          <p:nvPr/>
+        </p:nvCxnSpPr>
+        <p:spPr>
+          <a:xfrm flipH="1">
+            <a:off x="723900" y="6469224"/>
+            <a:ext cx="10744200" cy="0"/>
+          </a:xfrm>
+          <a:prstGeom prst="line">
+            <a:avLst/>
+          </a:prstGeom>
+        </p:spPr>
+        <p:style>
+          <a:lnRef idx="1">
+            <a:schemeClr val="accent1"/>
+          </a:lnRef>
+          <a:fillRef idx="0">
+            <a:schemeClr val="accent1"/>
+          </a:fillRef>
+          <a:effectRef idx="0">
+            <a:schemeClr val="accent1"/>
+          </a:effectRef>
+          <a:fontRef idx="minor">
+            <a:schemeClr val="tx1"/>
+          </a:fontRef>
+        </p:style>
+      </p:cxnSp>
+      <p:cxnSp>
+        <p:nvCxnSpPr>
+          <p:cNvPr id="6" name="Straight Connector 5"/>
+          <p:cNvCxnSpPr/>
+          <p:nvPr/>
+        </p:nvCxnSpPr>
+        <p:spPr>
+          <a:xfrm flipH="1">
+            <a:off x="876300" y="6621624"/>
+            <a:ext cx="10378440" cy="0"/>
+          </a:xfrm>
+          <a:prstGeom prst="line">
+            <a:avLst/>
+          </a:prstGeom>
+        </p:spPr>
+        <p:style>
+          <a:lnRef idx="1">
+            <a:schemeClr val="accent1"/>
+          </a:lnRef>
+          <a:fillRef idx="0">
+            <a:schemeClr val="accent1"/>
+          </a:fillRef>
+          <a:effectRef idx="0">
+            <a:schemeClr val="accent1"/>
+          </a:effectRef>
+          <a:fontRef idx="minor">
+            <a:schemeClr val="tx1"/>
+          </a:fontRef>
+        </p:style>
+      </p:cxnSp>
+      <p:cxnSp>
+        <p:nvCxnSpPr>
+          <p:cNvPr id="7" name="Straight Connector 6"/>
+          <p:cNvCxnSpPr/>
+          <p:nvPr/>
+        </p:nvCxnSpPr>
+        <p:spPr>
+          <a:xfrm flipH="1">
+            <a:off x="0" y="6316824"/>
+            <a:ext cx="541178" cy="541176"/>
+          </a:xfrm>
+          <a:prstGeom prst="line">
+            <a:avLst/>
+          </a:prstGeom>
+        </p:spPr>
+        <p:style>
+          <a:lnRef idx="1">
+            <a:schemeClr val="accent1"/>
+          </a:lnRef>
+          <a:fillRef idx="0">
+            <a:schemeClr val="accent1"/>
+          </a:fillRef>
+          <a:effectRef idx="0">
+            <a:schemeClr val="accent1"/>
+          </a:effectRef>
+          <a:fontRef idx="minor">
+            <a:schemeClr val="tx1"/>
+          </a:fontRef>
+        </p:style>
+      </p:cxnSp>
+      <p:cxnSp>
+        <p:nvCxnSpPr>
+          <p:cNvPr id="8" name="Straight Connector 7"/>
+          <p:cNvCxnSpPr/>
+          <p:nvPr/>
+        </p:nvCxnSpPr>
+        <p:spPr>
+          <a:xfrm flipH="1">
+            <a:off x="344846" y="6469224"/>
+            <a:ext cx="379054" cy="388776"/>
+          </a:xfrm>
+          <a:prstGeom prst="line">
+            <a:avLst/>
+          </a:prstGeom>
+        </p:spPr>
+        <p:style>
+          <a:lnRef idx="1">
+            <a:schemeClr val="accent1"/>
+          </a:lnRef>
+          <a:fillRef idx="0">
+            <a:schemeClr val="accent1"/>
+          </a:fillRef>
+          <a:effectRef idx="0">
+            <a:schemeClr val="accent1"/>
+          </a:effectRef>
+          <a:fontRef idx="minor">
+            <a:schemeClr val="tx1"/>
+          </a:fontRef>
+        </p:style>
+      </p:cxnSp>
+      <p:cxnSp>
+        <p:nvCxnSpPr>
+          <p:cNvPr id="9" name="Straight Connector 8"/>
+          <p:cNvCxnSpPr/>
+          <p:nvPr/>
+        </p:nvCxnSpPr>
+        <p:spPr>
+          <a:xfrm flipH="1">
+            <a:off x="657225" y="6621624"/>
+            <a:ext cx="219075" cy="236376"/>
+          </a:xfrm>
+          <a:prstGeom prst="line">
+            <a:avLst/>
+          </a:prstGeom>
+        </p:spPr>
+        <p:style>
+          <a:lnRef idx="1">
+            <a:schemeClr val="accent1"/>
+          </a:lnRef>
+          <a:fillRef idx="0">
+            <a:schemeClr val="accent1"/>
+          </a:fillRef>
+          <a:effectRef idx="0">
+            <a:schemeClr val="accent1"/>
+          </a:effectRef>
+          <a:fontRef idx="minor">
+            <a:schemeClr val="tx1"/>
+          </a:fontRef>
+        </p:style>
+      </p:cxnSp>
+      <p:cxnSp>
+        <p:nvCxnSpPr>
+          <p:cNvPr id="10" name="Straight Connector 9"/>
+          <p:cNvCxnSpPr/>
+          <p:nvPr/>
+        </p:nvCxnSpPr>
+        <p:spPr>
+          <a:xfrm rot="5400000" flipH="1">
+            <a:off x="11650821" y="6316823"/>
+            <a:ext cx="541178" cy="541176"/>
+          </a:xfrm>
+          <a:prstGeom prst="line">
+            <a:avLst/>
+          </a:prstGeom>
+        </p:spPr>
+        <p:style>
+          <a:lnRef idx="1">
+            <a:schemeClr val="accent1"/>
+          </a:lnRef>
+          <a:fillRef idx="0">
+            <a:schemeClr val="accent1"/>
+          </a:fillRef>
+          <a:effectRef idx="0">
+            <a:schemeClr val="accent1"/>
+          </a:effectRef>
+          <a:fontRef idx="minor">
+            <a:schemeClr val="tx1"/>
+          </a:fontRef>
+        </p:style>
+      </p:cxnSp>
+      <p:cxnSp>
+        <p:nvCxnSpPr>
+          <p:cNvPr id="11" name="Straight Connector 10"/>
+          <p:cNvCxnSpPr/>
+          <p:nvPr/>
+        </p:nvCxnSpPr>
+        <p:spPr>
+          <a:xfrm flipH="1" flipV="1">
+            <a:off x="11468100" y="6469223"/>
+            <a:ext cx="396082" cy="388777"/>
+          </a:xfrm>
+          <a:prstGeom prst="line">
+            <a:avLst/>
+          </a:prstGeom>
+        </p:spPr>
+        <p:style>
+          <a:lnRef idx="1">
+            <a:schemeClr val="accent1"/>
+          </a:lnRef>
+          <a:fillRef idx="0">
+            <a:schemeClr val="accent1"/>
+          </a:fillRef>
+          <a:effectRef idx="0">
+            <a:schemeClr val="accent1"/>
+          </a:effectRef>
+          <a:fontRef idx="minor">
+            <a:schemeClr val="tx1"/>
+          </a:fontRef>
+        </p:style>
+      </p:cxnSp>
+      <p:cxnSp>
+        <p:nvCxnSpPr>
+          <p:cNvPr id="12" name="Straight Connector 11"/>
+          <p:cNvCxnSpPr/>
+          <p:nvPr/>
+        </p:nvCxnSpPr>
+        <p:spPr>
+          <a:xfrm flipH="1" flipV="1">
+            <a:off x="11254740" y="6621624"/>
+            <a:ext cx="213360" cy="236376"/>
+          </a:xfrm>
+          <a:prstGeom prst="line">
+            <a:avLst/>
+          </a:prstGeom>
+        </p:spPr>
+        <p:style>
+          <a:lnRef idx="1">
+            <a:schemeClr val="accent1"/>
+          </a:lnRef>
+          <a:fillRef idx="0">
+            <a:schemeClr val="accent1"/>
+          </a:fillRef>
+          <a:effectRef idx="0">
+            <a:schemeClr val="accent1"/>
+          </a:effectRef>
+          <a:fontRef idx="minor">
+            <a:schemeClr val="tx1"/>
+          </a:fontRef>
+        </p:style>
+      </p:cxnSp>
+      <p:sp>
+        <p:nvSpPr>
+          <p:cNvPr id="13" name="Oval 12"/>
+          <p:cNvSpPr/>
+          <p:nvPr/>
+        </p:nvSpPr>
+        <p:spPr>
+          <a:xfrm>
+            <a:off x="0" y="6724650"/>
+            <a:ext cx="121879" cy="133350"/>
+          </a:xfrm>
+          <a:prstGeom prst="ellipse">
+            <a:avLst/>
+          </a:prstGeom>
+          <a:solidFill>
+            <a:schemeClr val="tx1"/>
+          </a:solidFill>
+          <a:effectLst>
+            <a:glow rad="63500">
+              <a:schemeClr val="accent1">
+                <a:satMod val="175000"/>
+                <a:alpha val="40000"/>
+              </a:schemeClr>
+            </a:glow>
+            <a:softEdge rad="31750"/>
+          </a:effectLst>
+        </p:spPr>
+        <p:style>
+          <a:lnRef idx="2">
+            <a:schemeClr val="accent1">
+              <a:shade val="50000"/>
+            </a:schemeClr>
+          </a:lnRef>
+          <a:fillRef idx="1">
+            <a:schemeClr val="accent1"/>
+          </a:fillRef>
+          <a:effectRef idx="0">
+            <a:schemeClr val="accent1"/>
+          </a:effectRef>
+          <a:fontRef idx="minor">
+            <a:schemeClr val="lt1"/>
+          </a:fontRef>
+        </p:style>
+        <p:txBody>
+          <a:bodyPr rtlCol="0" anchor="ctr"/>
+          <a:lstStyle/>
+          <a:p>
+            <a:pPr algn="ctr"/>
+            <a:endParaRPr lang="en-US"/>
+          </a:p>
+        </p:txBody>
+      </p:sp>
+    </p:spTree>
+    <p:extLst>
+      <p:ext uri="{BB962C8B-B14F-4D97-AF65-F5344CB8AC3E}">
+        <p14:creationId xmlns:p14="http://schemas.microsoft.com/office/powerpoint/2010/main" val="1865351667"/>
+      </p:ext>
+    </p:extLst>
+  </p:cSld>
+  <p:clrMapOvr>
+    <a:masterClrMapping/>
+  </p:clrMapOvr>
+  <p:timing>
+    <p:tnLst>
+      <p:par>
+        <p:cTn id="1" dur="indefinite" restart="never" nodeType="tmRoot">
+          <p:childTnLst>
+            <p:seq concurrent="1" nextAc="seek">
+              <p:cTn id="2" dur="indefinite" nodeType="mainSeq">
+                <p:childTnLst>
+                  <p:par>
+                    <p:cTn id="3" fill="hold">
+                      <p:stCondLst>
+                        <p:cond delay="indefinite"/>
+                        <p:cond evt="onBegin" delay="0">
+                          <p:tn val="2"/>
+                        </p:cond>
+                      </p:stCondLst>
+                      <p:childTnLst>
+                        <p:par>
+                          <p:cTn id="4" fill="hold">
+                            <p:stCondLst>
+                              <p:cond delay="0"/>
+                            </p:stCondLst>
+                            <p:childTnLst>
+                              <p:par>
+                                <p:cTn id="5" presetID="1" presetClass="entr" presetSubtype="0" fill="hold" grpId="1" nodeType="afterEffect">
+                                  <p:stCondLst>
+                                    <p:cond delay="0"/>
+                                  </p:stCondLst>
+                                  <p:childTnLst>
+                                    <p:set>
+                                      <p:cBhvr>
+                                        <p:cTn id="6" dur="1" fill="hold">
+                                          <p:stCondLst>
+                                            <p:cond delay="0"/>
+                                          </p:stCondLst>
+                                        </p:cTn>
+                                        <p:tgtEl>
+                                          <p:spTgt spid="13"/>
+                                        </p:tgtEl>
+                                        <p:attrNameLst>
+                                          <p:attrName>style.visibility</p:attrName>
+                                        </p:attrNameLst>
+                                      </p:cBhvr>
+                                      <p:to>
+                                        <p:strVal val="visible"/>
+                                      </p:to>
+                                    </p:set>
+                                  </p:childTnLst>
+                                </p:cTn>
+                              </p:par>
+                            </p:childTnLst>
+                          </p:cTn>
+                        </p:par>
+                        <p:par>
+                          <p:cTn id="7" fill="hold">
+                            <p:stCondLst>
+                              <p:cond delay="0"/>
+                            </p:stCondLst>
+                            <p:childTnLst>
+                              <p:par>
+                                <p:cTn id="8" presetID="0" presetClass="path" presetSubtype="0" accel="50000" decel="50000" fill="hold" grpId="0" nodeType="afterEffect">
+                                  <p:stCondLst>
+                                    <p:cond delay="0"/>
+                                  </p:stCondLst>
+                                  <p:childTnLst>
+                                    <p:animMotion origin="layout" path="M 1.66667E-6 2.22222E-6 L 0.0414 -0.06806 L 0.95234 -0.06945 L 0.99453 0.00694 " pathEditMode="relative" ptsTypes="AAAA">
+                                      <p:cBhvr>
+                                        <p:cTn id="9" dur="2000" fill="hold"/>
+                                        <p:tgtEl>
+                                          <p:spTgt spid="13"/>
+                                        </p:tgtEl>
+                                        <p:attrNameLst>
+                                          <p:attrName>ppt_x</p:attrName>
+                                          <p:attrName>ppt_y</p:attrName>
+                                        </p:attrNameLst>
+                                      </p:cBhvr>
+                                    </p:animMotion>
+                                  </p:childTnLst>
+                                </p:cTn>
+                              </p:par>
+                            </p:childTnLst>
+                          </p:cTn>
+                        </p:par>
+                        <p:par>
+                          <p:cTn id="10" fill="hold">
+                            <p:stCondLst>
+                              <p:cond delay="2000"/>
+                            </p:stCondLst>
+                            <p:childTnLst>
+                              <p:par>
+                                <p:cTn id="11" presetID="1" presetClass="exit" presetSubtype="0" fill="hold" grpId="2" nodeType="afterEffect">
+                                  <p:stCondLst>
+                                    <p:cond delay="0"/>
+                                  </p:stCondLst>
+                                  <p:childTnLst>
+                                    <p:set>
+                                      <p:cBhvr>
+                                        <p:cTn id="12" dur="1" fill="hold">
+                                          <p:stCondLst>
+                                            <p:cond delay="0"/>
+                                          </p:stCondLst>
+                                        </p:cTn>
+                                        <p:tgtEl>
+                                          <p:spTgt spid="13"/>
+                                        </p:tgtEl>
+                                        <p:attrNameLst>
+                                          <p:attrName>style.visibility</p:attrName>
+                                        </p:attrNameLst>
+                                      </p:cBhvr>
+                                      <p:to>
+                                        <p:strVal val="hidden"/>
+                                      </p:to>
+                                    </p:set>
+                                  </p:childTnLst>
+                                </p:cTn>
+                              </p:par>
+                            </p:childTnLst>
+                          </p:cTn>
+                        </p:par>
+                      </p:childTnLst>
+                    </p:cTn>
+                  </p:par>
+                </p:childTnLst>
+              </p:cTn>
+              <p:prevCondLst>
+                <p:cond evt="onPrev" delay="0">
+                  <p:tgtEl>
+                    <p:sldTgt/>
+                  </p:tgtEl>
+                </p:cond>
+              </p:prevCondLst>
+              <p:nextCondLst>
+                <p:cond evt="onNext" delay="0">
+                  <p:tgtEl>
+                    <p:sldTgt/>
+                  </p:tgtEl>
+                </p:cond>
+              </p:nextCondLst>
+            </p:seq>
+          </p:childTnLst>
+        </p:cTn>
+      </p:par>
+    </p:tnLst>
+    <p:bldLst>
+      <p:bldP spid="13" grpId="0" animBg="1"/>
+      <p:bldP spid="13" grpId="1" animBg="1"/>
+      <p:bldP spid="13" grpId="2" animBg="1"/>
+    </p:bldLst>
+  </p:timing>
+</p:sld>
+</file>
+
 <file path=ppt/slides/slide2.xml><?xml version="1.0" encoding="utf-8"?>
 <p:sld xmlns:a="http://schemas.openxmlformats.org/drawingml/2006/main" xmlns:r="http://schemas.openxmlformats.org/officeDocument/2006/relationships" xmlns:p="http://schemas.openxmlformats.org/presentationml/2006/main">
   <p:cSld>
@@ -3407,7 +4834,31 @@
           <a:bodyPr/>
           <a:lstStyle/>
           <a:p>
-            <a:endParaRPr lang="en-US"/>
+            <a:r>
+              <a:rPr lang="en-US" dirty="0" smtClean="0"/>
+              <a:t>The CPU is one of the largest heat generators in a computer.</a:t>
+            </a:r>
+          </a:p>
+          <a:p>
+            <a:pPr marL="0" indent="0">
+              <a:buNone/>
+            </a:pPr>
+            <a:endParaRPr lang="en-US" dirty="0" smtClean="0"/>
+          </a:p>
+          <a:p>
+            <a:r>
+              <a:rPr lang="en-US" dirty="0" smtClean="0"/>
+              <a:t>Requires highly purified silicon, the material it’s built on, that is a scarce natural resource.</a:t>
+            </a:r>
+          </a:p>
+          <a:p>
+            <a:endParaRPr lang="en-US" dirty="0"/>
+          </a:p>
+          <a:p>
+            <a:r>
+              <a:rPr lang="en-US" dirty="0" smtClean="0"/>
+              <a:t>Acts as the main instruction center of the device.</a:t>
+            </a:r>
           </a:p>
         </p:txBody>
       </p:sp>
@@ -3929,7 +5380,7 @@
           <a:p>
             <a:r>
               <a:rPr lang="en-US" dirty="0" smtClean="0"/>
-              <a:t>The CPU</a:t>
+              <a:t>Architecture</a:t>
             </a:r>
             <a:endParaRPr lang="en-US" dirty="0"/>
           </a:p>
@@ -3950,7 +5401,40 @@
           <a:bodyPr/>
           <a:lstStyle/>
           <a:p>
-            <a:endParaRPr lang="en-US"/>
+            <a:r>
+              <a:rPr lang="en-US" dirty="0" smtClean="0"/>
+              <a:t>Single-Cycle </a:t>
+            </a:r>
+            <a:r>
+              <a:rPr lang="en-US" dirty="0" err="1" smtClean="0"/>
+              <a:t>Datapath</a:t>
+            </a:r>
+            <a:r>
+              <a:rPr lang="en-US" dirty="0" smtClean="0"/>
+              <a:t> – Instructions you give to the processor are determined on a clock cycle.</a:t>
+            </a:r>
+          </a:p>
+          <a:p>
+            <a:endParaRPr lang="en-US" dirty="0" smtClean="0"/>
+          </a:p>
+          <a:p>
+            <a:endParaRPr lang="en-US" dirty="0"/>
+          </a:p>
+          <a:p>
+            <a:endParaRPr lang="en-US" dirty="0" smtClean="0"/>
+          </a:p>
+          <a:p>
+            <a:r>
+              <a:rPr lang="en-US" dirty="0" smtClean="0"/>
+              <a:t>Negative Edge – Instructions are processed on the “bottom”, or 0, of the clock cycle.</a:t>
+            </a:r>
+          </a:p>
+          <a:p>
+            <a:r>
+              <a:rPr lang="en-US" dirty="0" smtClean="0"/>
+              <a:t>16-Bit Architecture - 0000 0000 0000 0000 would be a 16-bit input.</a:t>
+            </a:r>
+            <a:endParaRPr lang="en-US" dirty="0"/>
           </a:p>
         </p:txBody>
       </p:sp>
@@ -4276,6 +5760,36 @@
           </a:p>
         </p:txBody>
       </p:sp>
+      <p:pic>
+        <p:nvPicPr>
+          <p:cNvPr id="15" name="Picture 14"/>
+          <p:cNvPicPr>
+            <a:picLocks noChangeAspect="1"/>
+          </p:cNvPicPr>
+          <p:nvPr/>
+        </p:nvPicPr>
+        <p:blipFill>
+          <a:blip r:embed="rId2">
+            <a:extLst>
+              <a:ext uri="{28A0092B-C50C-407E-A947-70E740481C1C}">
+                <a14:useLocalDpi xmlns:a14="http://schemas.microsoft.com/office/drawing/2010/main" val="0"/>
+              </a:ext>
+            </a:extLst>
+          </a:blip>
+          <a:stretch>
+            <a:fillRect/>
+          </a:stretch>
+        </p:blipFill>
+        <p:spPr>
+          <a:xfrm>
+            <a:off x="4236559" y="2824427"/>
+            <a:ext cx="3718882" cy="1209145"/>
+          </a:xfrm>
+          <a:prstGeom prst="rect">
+            <a:avLst/>
+          </a:prstGeom>
+        </p:spPr>
+      </p:pic>
     </p:spTree>
     <p:extLst>
       <p:ext uri="{BB962C8B-B14F-4D97-AF65-F5344CB8AC3E}">
@@ -4472,7 +5986,7 @@
           <a:p>
             <a:r>
               <a:rPr lang="en-US" dirty="0" smtClean="0"/>
-              <a:t>Components</a:t>
+              <a:t>Architecture (Part 2)</a:t>
             </a:r>
             <a:endParaRPr lang="en-US" dirty="0"/>
           </a:p>
@@ -4493,7 +6007,46 @@
           <a:bodyPr/>
           <a:lstStyle/>
           <a:p>
-            <a:endParaRPr lang="en-US"/>
+            <a:r>
+              <a:rPr lang="en-US" dirty="0" smtClean="0"/>
+              <a:t>Broken into five activity phases:</a:t>
+            </a:r>
+          </a:p>
+          <a:p>
+            <a:pPr lvl="1"/>
+            <a:r>
+              <a:rPr lang="en-US" dirty="0" smtClean="0"/>
+              <a:t>IF (Instruction Fetch) – Provides the current program location (program counter) and loads the instruction.</a:t>
+            </a:r>
+          </a:p>
+          <a:p>
+            <a:pPr lvl="1"/>
+            <a:r>
+              <a:rPr lang="en-US" dirty="0" smtClean="0"/>
+              <a:t>ID (Instruction Decode) – Retrieves or writes memory to a “register”, a piece of memory dedicated to the CPU.</a:t>
+            </a:r>
+          </a:p>
+          <a:p>
+            <a:pPr lvl="1"/>
+            <a:r>
+              <a:rPr lang="en-US" dirty="0" smtClean="0"/>
+              <a:t>EX (Execute) – Mostly contains the ALU (Algorithmic Logic Unit) and handles most of the logic or math of the unit.</a:t>
+            </a:r>
+          </a:p>
+          <a:p>
+            <a:pPr lvl="1"/>
+            <a:r>
+              <a:rPr lang="en-US" dirty="0" smtClean="0"/>
+              <a:t>MEM (Memory Access) – Accesses the memory of the computer for  storage or retrieval</a:t>
+            </a:r>
+          </a:p>
+          <a:p>
+            <a:pPr lvl="1"/>
+            <a:r>
+              <a:rPr lang="en-US" dirty="0" smtClean="0"/>
+              <a:t>WB (Write Back) – Writes value calculated in EX or retrieved from MEM into a register.</a:t>
+            </a:r>
+            <a:endParaRPr lang="en-US" dirty="0"/>
           </a:p>
         </p:txBody>
       </p:sp>
@@ -4822,7 +6375,7 @@
     </p:spTree>
     <p:extLst>
       <p:ext uri="{BB962C8B-B14F-4D97-AF65-F5344CB8AC3E}">
-        <p14:creationId xmlns:p14="http://schemas.microsoft.com/office/powerpoint/2010/main" val="1788683600"/>
+        <p14:creationId xmlns:p14="http://schemas.microsoft.com/office/powerpoint/2010/main" val="567087557"/>
       </p:ext>
     </p:extLst>
   </p:cSld>
@@ -5014,16 +6567,338 @@
           <a:lstStyle/>
           <a:p>
             <a:r>
-              <a:rPr lang="en-US" dirty="0" err="1" smtClean="0"/>
-              <a:t>Datapath</a:t>
+              <a:rPr lang="en-US" dirty="0" smtClean="0"/>
+              <a:t>Instructions</a:t>
             </a:r>
             <a:endParaRPr lang="en-US" dirty="0"/>
+          </a:p>
+        </p:txBody>
+      </p:sp>
+      <p:cxnSp>
+        <p:nvCxnSpPr>
+          <p:cNvPr id="4" name="Straight Connector 3"/>
+          <p:cNvCxnSpPr/>
+          <p:nvPr/>
+        </p:nvCxnSpPr>
+        <p:spPr>
+          <a:xfrm flipH="1">
+            <a:off x="541178" y="6316824"/>
+            <a:ext cx="11109646" cy="0"/>
+          </a:xfrm>
+          <a:prstGeom prst="line">
+            <a:avLst/>
+          </a:prstGeom>
+        </p:spPr>
+        <p:style>
+          <a:lnRef idx="1">
+            <a:schemeClr val="accent1"/>
+          </a:lnRef>
+          <a:fillRef idx="0">
+            <a:schemeClr val="accent1"/>
+          </a:fillRef>
+          <a:effectRef idx="0">
+            <a:schemeClr val="accent1"/>
+          </a:effectRef>
+          <a:fontRef idx="minor">
+            <a:schemeClr val="tx1"/>
+          </a:fontRef>
+        </p:style>
+      </p:cxnSp>
+      <p:cxnSp>
+        <p:nvCxnSpPr>
+          <p:cNvPr id="5" name="Straight Connector 4"/>
+          <p:cNvCxnSpPr/>
+          <p:nvPr/>
+        </p:nvCxnSpPr>
+        <p:spPr>
+          <a:xfrm flipH="1">
+            <a:off x="723900" y="6469224"/>
+            <a:ext cx="10744200" cy="0"/>
+          </a:xfrm>
+          <a:prstGeom prst="line">
+            <a:avLst/>
+          </a:prstGeom>
+        </p:spPr>
+        <p:style>
+          <a:lnRef idx="1">
+            <a:schemeClr val="accent1"/>
+          </a:lnRef>
+          <a:fillRef idx="0">
+            <a:schemeClr val="accent1"/>
+          </a:fillRef>
+          <a:effectRef idx="0">
+            <a:schemeClr val="accent1"/>
+          </a:effectRef>
+          <a:fontRef idx="minor">
+            <a:schemeClr val="tx1"/>
+          </a:fontRef>
+        </p:style>
+      </p:cxnSp>
+      <p:cxnSp>
+        <p:nvCxnSpPr>
+          <p:cNvPr id="6" name="Straight Connector 5"/>
+          <p:cNvCxnSpPr/>
+          <p:nvPr/>
+        </p:nvCxnSpPr>
+        <p:spPr>
+          <a:xfrm flipH="1">
+            <a:off x="876300" y="6621624"/>
+            <a:ext cx="10378440" cy="0"/>
+          </a:xfrm>
+          <a:prstGeom prst="line">
+            <a:avLst/>
+          </a:prstGeom>
+        </p:spPr>
+        <p:style>
+          <a:lnRef idx="1">
+            <a:schemeClr val="accent1"/>
+          </a:lnRef>
+          <a:fillRef idx="0">
+            <a:schemeClr val="accent1"/>
+          </a:fillRef>
+          <a:effectRef idx="0">
+            <a:schemeClr val="accent1"/>
+          </a:effectRef>
+          <a:fontRef idx="minor">
+            <a:schemeClr val="tx1"/>
+          </a:fontRef>
+        </p:style>
+      </p:cxnSp>
+      <p:cxnSp>
+        <p:nvCxnSpPr>
+          <p:cNvPr id="7" name="Straight Connector 6"/>
+          <p:cNvCxnSpPr/>
+          <p:nvPr/>
+        </p:nvCxnSpPr>
+        <p:spPr>
+          <a:xfrm flipH="1">
+            <a:off x="0" y="6316824"/>
+            <a:ext cx="541178" cy="541176"/>
+          </a:xfrm>
+          <a:prstGeom prst="line">
+            <a:avLst/>
+          </a:prstGeom>
+        </p:spPr>
+        <p:style>
+          <a:lnRef idx="1">
+            <a:schemeClr val="accent1"/>
+          </a:lnRef>
+          <a:fillRef idx="0">
+            <a:schemeClr val="accent1"/>
+          </a:fillRef>
+          <a:effectRef idx="0">
+            <a:schemeClr val="accent1"/>
+          </a:effectRef>
+          <a:fontRef idx="minor">
+            <a:schemeClr val="tx1"/>
+          </a:fontRef>
+        </p:style>
+      </p:cxnSp>
+      <p:cxnSp>
+        <p:nvCxnSpPr>
+          <p:cNvPr id="8" name="Straight Connector 7"/>
+          <p:cNvCxnSpPr/>
+          <p:nvPr/>
+        </p:nvCxnSpPr>
+        <p:spPr>
+          <a:xfrm flipH="1">
+            <a:off x="344846" y="6469224"/>
+            <a:ext cx="379054" cy="388776"/>
+          </a:xfrm>
+          <a:prstGeom prst="line">
+            <a:avLst/>
+          </a:prstGeom>
+        </p:spPr>
+        <p:style>
+          <a:lnRef idx="1">
+            <a:schemeClr val="accent1"/>
+          </a:lnRef>
+          <a:fillRef idx="0">
+            <a:schemeClr val="accent1"/>
+          </a:fillRef>
+          <a:effectRef idx="0">
+            <a:schemeClr val="accent1"/>
+          </a:effectRef>
+          <a:fontRef idx="minor">
+            <a:schemeClr val="tx1"/>
+          </a:fontRef>
+        </p:style>
+      </p:cxnSp>
+      <p:cxnSp>
+        <p:nvCxnSpPr>
+          <p:cNvPr id="9" name="Straight Connector 8"/>
+          <p:cNvCxnSpPr/>
+          <p:nvPr/>
+        </p:nvCxnSpPr>
+        <p:spPr>
+          <a:xfrm flipH="1">
+            <a:off x="657225" y="6621624"/>
+            <a:ext cx="219075" cy="236376"/>
+          </a:xfrm>
+          <a:prstGeom prst="line">
+            <a:avLst/>
+          </a:prstGeom>
+        </p:spPr>
+        <p:style>
+          <a:lnRef idx="1">
+            <a:schemeClr val="accent1"/>
+          </a:lnRef>
+          <a:fillRef idx="0">
+            <a:schemeClr val="accent1"/>
+          </a:fillRef>
+          <a:effectRef idx="0">
+            <a:schemeClr val="accent1"/>
+          </a:effectRef>
+          <a:fontRef idx="minor">
+            <a:schemeClr val="tx1"/>
+          </a:fontRef>
+        </p:style>
+      </p:cxnSp>
+      <p:cxnSp>
+        <p:nvCxnSpPr>
+          <p:cNvPr id="10" name="Straight Connector 9"/>
+          <p:cNvCxnSpPr/>
+          <p:nvPr/>
+        </p:nvCxnSpPr>
+        <p:spPr>
+          <a:xfrm rot="5400000" flipH="1">
+            <a:off x="11650821" y="6316823"/>
+            <a:ext cx="541178" cy="541176"/>
+          </a:xfrm>
+          <a:prstGeom prst="line">
+            <a:avLst/>
+          </a:prstGeom>
+        </p:spPr>
+        <p:style>
+          <a:lnRef idx="1">
+            <a:schemeClr val="accent1"/>
+          </a:lnRef>
+          <a:fillRef idx="0">
+            <a:schemeClr val="accent1"/>
+          </a:fillRef>
+          <a:effectRef idx="0">
+            <a:schemeClr val="accent1"/>
+          </a:effectRef>
+          <a:fontRef idx="minor">
+            <a:schemeClr val="tx1"/>
+          </a:fontRef>
+        </p:style>
+      </p:cxnSp>
+      <p:cxnSp>
+        <p:nvCxnSpPr>
+          <p:cNvPr id="11" name="Straight Connector 10"/>
+          <p:cNvCxnSpPr/>
+          <p:nvPr/>
+        </p:nvCxnSpPr>
+        <p:spPr>
+          <a:xfrm flipH="1" flipV="1">
+            <a:off x="11468100" y="6469223"/>
+            <a:ext cx="396082" cy="388777"/>
+          </a:xfrm>
+          <a:prstGeom prst="line">
+            <a:avLst/>
+          </a:prstGeom>
+        </p:spPr>
+        <p:style>
+          <a:lnRef idx="1">
+            <a:schemeClr val="accent1"/>
+          </a:lnRef>
+          <a:fillRef idx="0">
+            <a:schemeClr val="accent1"/>
+          </a:fillRef>
+          <a:effectRef idx="0">
+            <a:schemeClr val="accent1"/>
+          </a:effectRef>
+          <a:fontRef idx="minor">
+            <a:schemeClr val="tx1"/>
+          </a:fontRef>
+        </p:style>
+      </p:cxnSp>
+      <p:cxnSp>
+        <p:nvCxnSpPr>
+          <p:cNvPr id="12" name="Straight Connector 11"/>
+          <p:cNvCxnSpPr/>
+          <p:nvPr/>
+        </p:nvCxnSpPr>
+        <p:spPr>
+          <a:xfrm flipH="1" flipV="1">
+            <a:off x="11254740" y="6621624"/>
+            <a:ext cx="213360" cy="236376"/>
+          </a:xfrm>
+          <a:prstGeom prst="line">
+            <a:avLst/>
+          </a:prstGeom>
+        </p:spPr>
+        <p:style>
+          <a:lnRef idx="1">
+            <a:schemeClr val="accent1"/>
+          </a:lnRef>
+          <a:fillRef idx="0">
+            <a:schemeClr val="accent1"/>
+          </a:fillRef>
+          <a:effectRef idx="0">
+            <a:schemeClr val="accent1"/>
+          </a:effectRef>
+          <a:fontRef idx="minor">
+            <a:schemeClr val="tx1"/>
+          </a:fontRef>
+        </p:style>
+      </p:cxnSp>
+      <p:sp>
+        <p:nvSpPr>
+          <p:cNvPr id="13" name="Oval 12"/>
+          <p:cNvSpPr/>
+          <p:nvPr/>
+        </p:nvSpPr>
+        <p:spPr>
+          <a:xfrm>
+            <a:off x="0" y="6724650"/>
+            <a:ext cx="121879" cy="133350"/>
+          </a:xfrm>
+          <a:prstGeom prst="ellipse">
+            <a:avLst/>
+          </a:prstGeom>
+          <a:solidFill>
+            <a:schemeClr val="tx1"/>
+          </a:solidFill>
+          <a:effectLst>
+            <a:glow rad="63500">
+              <a:schemeClr val="accent1">
+                <a:satMod val="175000"/>
+                <a:alpha val="40000"/>
+              </a:schemeClr>
+            </a:glow>
+            <a:softEdge rad="31750"/>
+          </a:effectLst>
+        </p:spPr>
+        <p:style>
+          <a:lnRef idx="2">
+            <a:schemeClr val="accent1">
+              <a:shade val="50000"/>
+            </a:schemeClr>
+          </a:lnRef>
+          <a:fillRef idx="1">
+            <a:schemeClr val="accent1"/>
+          </a:fillRef>
+          <a:effectRef idx="0">
+            <a:schemeClr val="accent1"/>
+          </a:effectRef>
+          <a:fontRef idx="minor">
+            <a:schemeClr val="lt1"/>
+          </a:fontRef>
+        </p:style>
+        <p:txBody>
+          <a:bodyPr rtlCol="0" anchor="ctr"/>
+          <a:lstStyle/>
+          <a:p>
+            <a:pPr algn="ctr"/>
+            <a:endParaRPr lang="en-US"/>
           </a:p>
         </p:txBody>
       </p:sp>
       <p:sp>
         <p:nvSpPr>
-          <p:cNvPr id="3" name="Content Placeholder 2"/>
+          <p:cNvPr id="15" name="Content Placeholder 14"/>
           <p:cNvSpPr>
             <a:spLocks noGrp="1"/>
           </p:cNvSpPr>
@@ -5036,336 +6911,102 @@
           <a:bodyPr/>
           <a:lstStyle/>
           <a:p>
-            <a:endParaRPr lang="en-US"/>
+            <a:r>
+              <a:rPr lang="en-US" dirty="0" smtClean="0"/>
+              <a:t>Instructions are </a:t>
+            </a:r>
+          </a:p>
+          <a:p>
+            <a:pPr marL="0" indent="0">
+              <a:buNone/>
+            </a:pPr>
+            <a:r>
+              <a:rPr lang="en-US" dirty="0" smtClean="0"/>
+              <a:t>assigned to </a:t>
+            </a:r>
+          </a:p>
+          <a:p>
+            <a:pPr marL="0" indent="0">
+              <a:buNone/>
+            </a:pPr>
+            <a:r>
+              <a:rPr lang="en-US" dirty="0" smtClean="0"/>
+              <a:t>4-bit numbers</a:t>
+            </a:r>
+          </a:p>
+          <a:p>
+            <a:pPr marL="0" indent="0">
+              <a:buNone/>
+            </a:pPr>
+            <a:endParaRPr lang="en-US" dirty="0" smtClean="0"/>
+          </a:p>
+          <a:p>
+            <a:r>
+              <a:rPr lang="en-US" dirty="0" smtClean="0"/>
+              <a:t>Three types:</a:t>
+            </a:r>
+          </a:p>
+          <a:p>
+            <a:pPr lvl="1"/>
+            <a:r>
+              <a:rPr lang="en-US" dirty="0" smtClean="0"/>
+              <a:t>R-type (Register)</a:t>
+            </a:r>
+          </a:p>
+          <a:p>
+            <a:pPr lvl="1"/>
+            <a:r>
+              <a:rPr lang="en-US" dirty="0" smtClean="0"/>
+              <a:t>I-type (Immediate)</a:t>
+            </a:r>
+          </a:p>
+          <a:p>
+            <a:pPr lvl="1"/>
+            <a:r>
+              <a:rPr lang="en-US" dirty="0" smtClean="0"/>
+              <a:t>J-type (Jump)</a:t>
+            </a:r>
+          </a:p>
+          <a:p>
+            <a:pPr lvl="1"/>
+            <a:endParaRPr lang="en-US" dirty="0"/>
           </a:p>
         </p:txBody>
       </p:sp>
-      <p:cxnSp>
-        <p:nvCxnSpPr>
-          <p:cNvPr id="4" name="Straight Connector 3"/>
-          <p:cNvCxnSpPr/>
-          <p:nvPr/>
-        </p:nvCxnSpPr>
-        <p:spPr>
-          <a:xfrm flipH="1">
-            <a:off x="541178" y="6316824"/>
-            <a:ext cx="11109646" cy="0"/>
-          </a:xfrm>
-          <a:prstGeom prst="line">
-            <a:avLst/>
-          </a:prstGeom>
-        </p:spPr>
-        <p:style>
-          <a:lnRef idx="1">
-            <a:schemeClr val="accent1"/>
-          </a:lnRef>
-          <a:fillRef idx="0">
-            <a:schemeClr val="accent1"/>
-          </a:fillRef>
-          <a:effectRef idx="0">
-            <a:schemeClr val="accent1"/>
-          </a:effectRef>
-          <a:fontRef idx="minor">
-            <a:schemeClr val="tx1"/>
-          </a:fontRef>
-        </p:style>
-      </p:cxnSp>
-      <p:cxnSp>
-        <p:nvCxnSpPr>
-          <p:cNvPr id="5" name="Straight Connector 4"/>
-          <p:cNvCxnSpPr/>
-          <p:nvPr/>
-        </p:nvCxnSpPr>
-        <p:spPr>
-          <a:xfrm flipH="1">
-            <a:off x="723900" y="6469224"/>
-            <a:ext cx="10744200" cy="0"/>
-          </a:xfrm>
-          <a:prstGeom prst="line">
-            <a:avLst/>
-          </a:prstGeom>
-        </p:spPr>
-        <p:style>
-          <a:lnRef idx="1">
-            <a:schemeClr val="accent1"/>
-          </a:lnRef>
-          <a:fillRef idx="0">
-            <a:schemeClr val="accent1"/>
-          </a:fillRef>
-          <a:effectRef idx="0">
-            <a:schemeClr val="accent1"/>
-          </a:effectRef>
-          <a:fontRef idx="minor">
-            <a:schemeClr val="tx1"/>
-          </a:fontRef>
-        </p:style>
-      </p:cxnSp>
-      <p:cxnSp>
-        <p:nvCxnSpPr>
-          <p:cNvPr id="6" name="Straight Connector 5"/>
-          <p:cNvCxnSpPr/>
-          <p:nvPr/>
-        </p:nvCxnSpPr>
-        <p:spPr>
-          <a:xfrm flipH="1">
-            <a:off x="876300" y="6621624"/>
-            <a:ext cx="10378440" cy="0"/>
-          </a:xfrm>
-          <a:prstGeom prst="line">
-            <a:avLst/>
-          </a:prstGeom>
-        </p:spPr>
-        <p:style>
-          <a:lnRef idx="1">
-            <a:schemeClr val="accent1"/>
-          </a:lnRef>
-          <a:fillRef idx="0">
-            <a:schemeClr val="accent1"/>
-          </a:fillRef>
-          <a:effectRef idx="0">
-            <a:schemeClr val="accent1"/>
-          </a:effectRef>
-          <a:fontRef idx="minor">
-            <a:schemeClr val="tx1"/>
-          </a:fontRef>
-        </p:style>
-      </p:cxnSp>
-      <p:cxnSp>
-        <p:nvCxnSpPr>
-          <p:cNvPr id="7" name="Straight Connector 6"/>
-          <p:cNvCxnSpPr/>
-          <p:nvPr/>
-        </p:nvCxnSpPr>
-        <p:spPr>
-          <a:xfrm flipH="1">
-            <a:off x="0" y="6316824"/>
-            <a:ext cx="541178" cy="541176"/>
-          </a:xfrm>
-          <a:prstGeom prst="line">
-            <a:avLst/>
-          </a:prstGeom>
-        </p:spPr>
-        <p:style>
-          <a:lnRef idx="1">
-            <a:schemeClr val="accent1"/>
-          </a:lnRef>
-          <a:fillRef idx="0">
-            <a:schemeClr val="accent1"/>
-          </a:fillRef>
-          <a:effectRef idx="0">
-            <a:schemeClr val="accent1"/>
-          </a:effectRef>
-          <a:fontRef idx="minor">
-            <a:schemeClr val="tx1"/>
-          </a:fontRef>
-        </p:style>
-      </p:cxnSp>
-      <p:cxnSp>
-        <p:nvCxnSpPr>
-          <p:cNvPr id="8" name="Straight Connector 7"/>
-          <p:cNvCxnSpPr/>
-          <p:nvPr/>
-        </p:nvCxnSpPr>
-        <p:spPr>
-          <a:xfrm flipH="1">
-            <a:off x="344846" y="6469224"/>
-            <a:ext cx="379054" cy="388776"/>
-          </a:xfrm>
-          <a:prstGeom prst="line">
-            <a:avLst/>
-          </a:prstGeom>
-        </p:spPr>
-        <p:style>
-          <a:lnRef idx="1">
-            <a:schemeClr val="accent1"/>
-          </a:lnRef>
-          <a:fillRef idx="0">
-            <a:schemeClr val="accent1"/>
-          </a:fillRef>
-          <a:effectRef idx="0">
-            <a:schemeClr val="accent1"/>
-          </a:effectRef>
-          <a:fontRef idx="minor">
-            <a:schemeClr val="tx1"/>
-          </a:fontRef>
-        </p:style>
-      </p:cxnSp>
-      <p:cxnSp>
-        <p:nvCxnSpPr>
-          <p:cNvPr id="9" name="Straight Connector 8"/>
-          <p:cNvCxnSpPr/>
-          <p:nvPr/>
-        </p:nvCxnSpPr>
-        <p:spPr>
-          <a:xfrm flipH="1">
-            <a:off x="657225" y="6621624"/>
-            <a:ext cx="219075" cy="236376"/>
-          </a:xfrm>
-          <a:prstGeom prst="line">
-            <a:avLst/>
-          </a:prstGeom>
-        </p:spPr>
-        <p:style>
-          <a:lnRef idx="1">
-            <a:schemeClr val="accent1"/>
-          </a:lnRef>
-          <a:fillRef idx="0">
-            <a:schemeClr val="accent1"/>
-          </a:fillRef>
-          <a:effectRef idx="0">
-            <a:schemeClr val="accent1"/>
-          </a:effectRef>
-          <a:fontRef idx="minor">
-            <a:schemeClr val="tx1"/>
-          </a:fontRef>
-        </p:style>
-      </p:cxnSp>
-      <p:cxnSp>
-        <p:nvCxnSpPr>
-          <p:cNvPr id="10" name="Straight Connector 9"/>
-          <p:cNvCxnSpPr/>
-          <p:nvPr/>
-        </p:nvCxnSpPr>
-        <p:spPr>
-          <a:xfrm rot="5400000" flipH="1">
-            <a:off x="11650821" y="6316823"/>
-            <a:ext cx="541178" cy="541176"/>
-          </a:xfrm>
-          <a:prstGeom prst="line">
-            <a:avLst/>
-          </a:prstGeom>
-        </p:spPr>
-        <p:style>
-          <a:lnRef idx="1">
-            <a:schemeClr val="accent1"/>
-          </a:lnRef>
-          <a:fillRef idx="0">
-            <a:schemeClr val="accent1"/>
-          </a:fillRef>
-          <a:effectRef idx="0">
-            <a:schemeClr val="accent1"/>
-          </a:effectRef>
-          <a:fontRef idx="minor">
-            <a:schemeClr val="tx1"/>
-          </a:fontRef>
-        </p:style>
-      </p:cxnSp>
-      <p:cxnSp>
-        <p:nvCxnSpPr>
-          <p:cNvPr id="11" name="Straight Connector 10"/>
-          <p:cNvCxnSpPr/>
-          <p:nvPr/>
-        </p:nvCxnSpPr>
-        <p:spPr>
-          <a:xfrm flipH="1" flipV="1">
-            <a:off x="11468100" y="6469223"/>
-            <a:ext cx="396082" cy="388777"/>
-          </a:xfrm>
-          <a:prstGeom prst="line">
-            <a:avLst/>
-          </a:prstGeom>
-        </p:spPr>
-        <p:style>
-          <a:lnRef idx="1">
-            <a:schemeClr val="accent1"/>
-          </a:lnRef>
-          <a:fillRef idx="0">
-            <a:schemeClr val="accent1"/>
-          </a:fillRef>
-          <a:effectRef idx="0">
-            <a:schemeClr val="accent1"/>
-          </a:effectRef>
-          <a:fontRef idx="minor">
-            <a:schemeClr val="tx1"/>
-          </a:fontRef>
-        </p:style>
-      </p:cxnSp>
-      <p:cxnSp>
-        <p:nvCxnSpPr>
-          <p:cNvPr id="12" name="Straight Connector 11"/>
-          <p:cNvCxnSpPr/>
-          <p:nvPr/>
-        </p:nvCxnSpPr>
-        <p:spPr>
-          <a:xfrm flipH="1" flipV="1">
-            <a:off x="11254740" y="6621624"/>
-            <a:ext cx="213360" cy="236376"/>
-          </a:xfrm>
-          <a:prstGeom prst="line">
-            <a:avLst/>
-          </a:prstGeom>
-        </p:spPr>
-        <p:style>
-          <a:lnRef idx="1">
-            <a:schemeClr val="accent1"/>
-          </a:lnRef>
-          <a:fillRef idx="0">
-            <a:schemeClr val="accent1"/>
-          </a:fillRef>
-          <a:effectRef idx="0">
-            <a:schemeClr val="accent1"/>
-          </a:effectRef>
-          <a:fontRef idx="minor">
-            <a:schemeClr val="tx1"/>
-          </a:fontRef>
-        </p:style>
-      </p:cxnSp>
-      <p:sp>
-        <p:nvSpPr>
-          <p:cNvPr id="13" name="Oval 12"/>
-          <p:cNvSpPr/>
-          <p:nvPr/>
-        </p:nvSpPr>
+      <p:pic>
+        <p:nvPicPr>
+          <p:cNvPr id="17" name="Picture 16"/>
+          <p:cNvPicPr>
+            <a:picLocks noChangeAspect="1"/>
+          </p:cNvPicPr>
+          <p:nvPr/>
+        </p:nvPicPr>
+        <p:blipFill>
+          <a:blip r:embed="rId2">
+            <a:extLst>
+              <a:ext uri="{28A0092B-C50C-407E-A947-70E740481C1C}">
+                <a14:useLocalDpi xmlns:a14="http://schemas.microsoft.com/office/drawing/2010/main" val="0"/>
+              </a:ext>
+            </a:extLst>
+          </a:blip>
+          <a:stretch>
+            <a:fillRect/>
+          </a:stretch>
+        </p:blipFill>
         <p:spPr>
           <a:xfrm>
-            <a:off x="0" y="6724650"/>
-            <a:ext cx="121879" cy="133350"/>
-          </a:xfrm>
-          <a:prstGeom prst="ellipse">
-            <a:avLst/>
-          </a:prstGeom>
-          <a:solidFill>
-            <a:schemeClr val="tx1"/>
-          </a:solidFill>
-          <a:effectLst>
-            <a:glow rad="63500">
-              <a:schemeClr val="accent1">
-                <a:satMod val="175000"/>
-                <a:alpha val="40000"/>
-              </a:schemeClr>
-            </a:glow>
-            <a:softEdge rad="31750"/>
-          </a:effectLst>
-        </p:spPr>
-        <p:style>
-          <a:lnRef idx="2">
-            <a:schemeClr val="accent1">
-              <a:shade val="50000"/>
-            </a:schemeClr>
-          </a:lnRef>
-          <a:fillRef idx="1">
-            <a:schemeClr val="accent1"/>
-          </a:fillRef>
-          <a:effectRef idx="0">
-            <a:schemeClr val="accent1"/>
-          </a:effectRef>
-          <a:fontRef idx="minor">
-            <a:schemeClr val="lt1"/>
-          </a:fontRef>
-        </p:style>
-        <p:txBody>
-          <a:bodyPr rtlCol="0" anchor="ctr"/>
-          <a:lstStyle/>
-          <a:p>
-            <a:pPr algn="ctr"/>
-            <a:endParaRPr lang="en-US"/>
-          </a:p>
-        </p:txBody>
-      </p:sp>
+            <a:off x="4342609" y="1576785"/>
+            <a:ext cx="7308213" cy="4587638"/>
+          </a:xfrm>
+          <a:prstGeom prst="rect">
+            <a:avLst/>
+          </a:prstGeom>
+        </p:spPr>
+      </p:pic>
     </p:spTree>
     <p:extLst>
       <p:ext uri="{BB962C8B-B14F-4D97-AF65-F5344CB8AC3E}">
-        <p14:creationId xmlns:p14="http://schemas.microsoft.com/office/powerpoint/2010/main" val="727768195"/>
+        <p14:creationId xmlns:p14="http://schemas.microsoft.com/office/powerpoint/2010/main" val="1788683600"/>
       </p:ext>
     </p:extLst>
   </p:cSld>
@@ -5558,7 +7199,7 @@
           <a:p>
             <a:r>
               <a:rPr lang="en-US" dirty="0" smtClean="0"/>
-              <a:t>Execution</a:t>
+              <a:t>Components (Registers)</a:t>
             </a:r>
             <a:endParaRPr lang="en-US" dirty="0"/>
           </a:p>
@@ -5579,7 +7220,40 @@
           <a:bodyPr/>
           <a:lstStyle/>
           <a:p>
-            <a:endParaRPr lang="en-US"/>
+            <a:r>
+              <a:rPr lang="en-US" dirty="0" smtClean="0"/>
+              <a:t>This CPU has 4 registers identified </a:t>
+            </a:r>
+          </a:p>
+          <a:p>
+            <a:pPr marL="0" indent="0">
+              <a:buNone/>
+            </a:pPr>
+            <a:r>
+              <a:rPr lang="en-US" dirty="0" smtClean="0"/>
+              <a:t>by 2-bits: 00, 01, 10, 11 for </a:t>
+            </a:r>
+          </a:p>
+          <a:p>
+            <a:pPr marL="0" indent="0">
+              <a:buNone/>
+            </a:pPr>
+            <a:r>
+              <a:rPr lang="en-US" dirty="0" smtClean="0"/>
+              <a:t>$0, $1, $2, $3.</a:t>
+            </a:r>
+          </a:p>
+          <a:p>
+            <a:pPr marL="0" indent="0">
+              <a:buNone/>
+            </a:pPr>
+            <a:endParaRPr lang="en-US" dirty="0" smtClean="0"/>
+          </a:p>
+          <a:p>
+            <a:r>
+              <a:rPr lang="en-US" dirty="0" smtClean="0"/>
+              <a:t>$0 is read-only for the value 0.</a:t>
+            </a:r>
           </a:p>
         </p:txBody>
       </p:sp>
@@ -5905,10 +7579,40 @@
           </a:p>
         </p:txBody>
       </p:sp>
+      <p:pic>
+        <p:nvPicPr>
+          <p:cNvPr id="15" name="Picture 14"/>
+          <p:cNvPicPr>
+            <a:picLocks noChangeAspect="1"/>
+          </p:cNvPicPr>
+          <p:nvPr/>
+        </p:nvPicPr>
+        <p:blipFill>
+          <a:blip r:embed="rId2">
+            <a:extLst>
+              <a:ext uri="{28A0092B-C50C-407E-A947-70E740481C1C}">
+                <a14:useLocalDpi xmlns:a14="http://schemas.microsoft.com/office/drawing/2010/main" val="0"/>
+              </a:ext>
+            </a:extLst>
+          </a:blip>
+          <a:stretch>
+            <a:fillRect/>
+          </a:stretch>
+        </p:blipFill>
+        <p:spPr>
+          <a:xfrm>
+            <a:off x="6159732" y="1825624"/>
+            <a:ext cx="5491090" cy="4046476"/>
+          </a:xfrm>
+          <a:prstGeom prst="rect">
+            <a:avLst/>
+          </a:prstGeom>
+        </p:spPr>
+      </p:pic>
     </p:spTree>
     <p:extLst>
       <p:ext uri="{BB962C8B-B14F-4D97-AF65-F5344CB8AC3E}">
-        <p14:creationId xmlns:p14="http://schemas.microsoft.com/office/powerpoint/2010/main" val="712387226"/>
+        <p14:creationId xmlns:p14="http://schemas.microsoft.com/office/powerpoint/2010/main" val="3469625977"/>
       </p:ext>
     </p:extLst>
   </p:cSld>
@@ -6101,7 +7805,7 @@
           <a:p>
             <a:r>
               <a:rPr lang="en-US" dirty="0" smtClean="0"/>
-              <a:t>Thank You!</a:t>
+              <a:t>Components (ALU)</a:t>
             </a:r>
             <a:endParaRPr lang="en-US" dirty="0"/>
           </a:p>
@@ -6122,6 +7826,28 @@
           <a:bodyPr/>
           <a:lstStyle/>
           <a:p>
+            <a:r>
+              <a:rPr lang="en-US" dirty="0" smtClean="0"/>
+              <a:t>Workhorse of the CPU</a:t>
+            </a:r>
+          </a:p>
+          <a:p>
+            <a:endParaRPr lang="en-US" dirty="0" smtClean="0"/>
+          </a:p>
+          <a:p>
+            <a:r>
+              <a:rPr lang="en-US" dirty="0" smtClean="0"/>
+              <a:t>Strings together 16 separate 1-bit ALU’s to handle 16-bit data</a:t>
+            </a:r>
+          </a:p>
+          <a:p>
+            <a:endParaRPr lang="en-US" dirty="0"/>
+          </a:p>
+          <a:p>
+            <a:r>
+              <a:rPr lang="en-US" dirty="0" smtClean="0"/>
+              <a:t>Requires a unique significant bit ALU when chaining</a:t>
+            </a:r>
             <a:endParaRPr lang="en-US" dirty="0"/>
           </a:p>
         </p:txBody>
@@ -6451,7 +8177,1179 @@
     </p:spTree>
     <p:extLst>
       <p:ext uri="{BB962C8B-B14F-4D97-AF65-F5344CB8AC3E}">
-        <p14:creationId xmlns:p14="http://schemas.microsoft.com/office/powerpoint/2010/main" val="1865351667"/>
+        <p14:creationId xmlns:p14="http://schemas.microsoft.com/office/powerpoint/2010/main" val="727768195"/>
+      </p:ext>
+    </p:extLst>
+  </p:cSld>
+  <p:clrMapOvr>
+    <a:masterClrMapping/>
+  </p:clrMapOvr>
+  <p:timing>
+    <p:tnLst>
+      <p:par>
+        <p:cTn id="1" dur="indefinite" restart="never" nodeType="tmRoot">
+          <p:childTnLst>
+            <p:seq concurrent="1" nextAc="seek">
+              <p:cTn id="2" dur="indefinite" nodeType="mainSeq">
+                <p:childTnLst>
+                  <p:par>
+                    <p:cTn id="3" fill="hold">
+                      <p:stCondLst>
+                        <p:cond delay="indefinite"/>
+                        <p:cond evt="onBegin" delay="0">
+                          <p:tn val="2"/>
+                        </p:cond>
+                      </p:stCondLst>
+                      <p:childTnLst>
+                        <p:par>
+                          <p:cTn id="4" fill="hold">
+                            <p:stCondLst>
+                              <p:cond delay="0"/>
+                            </p:stCondLst>
+                            <p:childTnLst>
+                              <p:par>
+                                <p:cTn id="5" presetID="1" presetClass="entr" presetSubtype="0" fill="hold" grpId="1" nodeType="afterEffect">
+                                  <p:stCondLst>
+                                    <p:cond delay="0"/>
+                                  </p:stCondLst>
+                                  <p:childTnLst>
+                                    <p:set>
+                                      <p:cBhvr>
+                                        <p:cTn id="6" dur="1" fill="hold">
+                                          <p:stCondLst>
+                                            <p:cond delay="0"/>
+                                          </p:stCondLst>
+                                        </p:cTn>
+                                        <p:tgtEl>
+                                          <p:spTgt spid="13"/>
+                                        </p:tgtEl>
+                                        <p:attrNameLst>
+                                          <p:attrName>style.visibility</p:attrName>
+                                        </p:attrNameLst>
+                                      </p:cBhvr>
+                                      <p:to>
+                                        <p:strVal val="visible"/>
+                                      </p:to>
+                                    </p:set>
+                                  </p:childTnLst>
+                                </p:cTn>
+                              </p:par>
+                            </p:childTnLst>
+                          </p:cTn>
+                        </p:par>
+                        <p:par>
+                          <p:cTn id="7" fill="hold">
+                            <p:stCondLst>
+                              <p:cond delay="0"/>
+                            </p:stCondLst>
+                            <p:childTnLst>
+                              <p:par>
+                                <p:cTn id="8" presetID="0" presetClass="path" presetSubtype="0" accel="50000" decel="50000" fill="hold" grpId="0" nodeType="afterEffect">
+                                  <p:stCondLst>
+                                    <p:cond delay="0"/>
+                                  </p:stCondLst>
+                                  <p:childTnLst>
+                                    <p:animMotion origin="layout" path="M 1.66667E-6 2.22222E-6 L 0.0414 -0.06806 L 0.95234 -0.06945 L 0.99453 0.00694 " pathEditMode="relative" ptsTypes="AAAA">
+                                      <p:cBhvr>
+                                        <p:cTn id="9" dur="2000" fill="hold"/>
+                                        <p:tgtEl>
+                                          <p:spTgt spid="13"/>
+                                        </p:tgtEl>
+                                        <p:attrNameLst>
+                                          <p:attrName>ppt_x</p:attrName>
+                                          <p:attrName>ppt_y</p:attrName>
+                                        </p:attrNameLst>
+                                      </p:cBhvr>
+                                    </p:animMotion>
+                                  </p:childTnLst>
+                                </p:cTn>
+                              </p:par>
+                            </p:childTnLst>
+                          </p:cTn>
+                        </p:par>
+                        <p:par>
+                          <p:cTn id="10" fill="hold">
+                            <p:stCondLst>
+                              <p:cond delay="2000"/>
+                            </p:stCondLst>
+                            <p:childTnLst>
+                              <p:par>
+                                <p:cTn id="11" presetID="1" presetClass="exit" presetSubtype="0" fill="hold" grpId="2" nodeType="afterEffect">
+                                  <p:stCondLst>
+                                    <p:cond delay="0"/>
+                                  </p:stCondLst>
+                                  <p:childTnLst>
+                                    <p:set>
+                                      <p:cBhvr>
+                                        <p:cTn id="12" dur="1" fill="hold">
+                                          <p:stCondLst>
+                                            <p:cond delay="0"/>
+                                          </p:stCondLst>
+                                        </p:cTn>
+                                        <p:tgtEl>
+                                          <p:spTgt spid="13"/>
+                                        </p:tgtEl>
+                                        <p:attrNameLst>
+                                          <p:attrName>style.visibility</p:attrName>
+                                        </p:attrNameLst>
+                                      </p:cBhvr>
+                                      <p:to>
+                                        <p:strVal val="hidden"/>
+                                      </p:to>
+                                    </p:set>
+                                  </p:childTnLst>
+                                </p:cTn>
+                              </p:par>
+                            </p:childTnLst>
+                          </p:cTn>
+                        </p:par>
+                      </p:childTnLst>
+                    </p:cTn>
+                  </p:par>
+                </p:childTnLst>
+              </p:cTn>
+              <p:prevCondLst>
+                <p:cond evt="onPrev" delay="0">
+                  <p:tgtEl>
+                    <p:sldTgt/>
+                  </p:tgtEl>
+                </p:cond>
+              </p:prevCondLst>
+              <p:nextCondLst>
+                <p:cond evt="onNext" delay="0">
+                  <p:tgtEl>
+                    <p:sldTgt/>
+                  </p:tgtEl>
+                </p:cond>
+              </p:nextCondLst>
+            </p:seq>
+          </p:childTnLst>
+        </p:cTn>
+      </p:par>
+    </p:tnLst>
+    <p:bldLst>
+      <p:bldP spid="13" grpId="0" animBg="1"/>
+      <p:bldP spid="13" grpId="1" animBg="1"/>
+      <p:bldP spid="13" grpId="2" animBg="1"/>
+    </p:bldLst>
+  </p:timing>
+</p:sld>
+</file>
+
+<file path=ppt/slides/slide8.xml><?xml version="1.0" encoding="utf-8"?>
+<p:sld xmlns:a="http://schemas.openxmlformats.org/drawingml/2006/main" xmlns:r="http://schemas.openxmlformats.org/officeDocument/2006/relationships" xmlns:p="http://schemas.openxmlformats.org/presentationml/2006/main">
+  <p:cSld>
+    <p:spTree>
+      <p:nvGrpSpPr>
+        <p:cNvPr id="1" name=""/>
+        <p:cNvGrpSpPr/>
+        <p:nvPr/>
+      </p:nvGrpSpPr>
+      <p:grpSpPr>
+        <a:xfrm>
+          <a:off x="0" y="0"/>
+          <a:ext cx="0" cy="0"/>
+          <a:chOff x="0" y="0"/>
+          <a:chExt cx="0" cy="0"/>
+        </a:xfrm>
+      </p:grpSpPr>
+      <p:sp>
+        <p:nvSpPr>
+          <p:cNvPr id="2" name="Title 1"/>
+          <p:cNvSpPr>
+            <a:spLocks noGrp="1"/>
+          </p:cNvSpPr>
+          <p:nvPr>
+            <p:ph type="title"/>
+          </p:nvPr>
+        </p:nvSpPr>
+        <p:spPr/>
+        <p:txBody>
+          <a:bodyPr/>
+          <a:lstStyle/>
+          <a:p>
+            <a:r>
+              <a:rPr lang="en-US" dirty="0" smtClean="0"/>
+              <a:t>Components (Data Memory)</a:t>
+            </a:r>
+            <a:endParaRPr lang="en-US" dirty="0"/>
+          </a:p>
+        </p:txBody>
+      </p:sp>
+      <p:sp>
+        <p:nvSpPr>
+          <p:cNvPr id="3" name="Content Placeholder 2"/>
+          <p:cNvSpPr>
+            <a:spLocks noGrp="1"/>
+          </p:cNvSpPr>
+          <p:nvPr>
+            <p:ph idx="1"/>
+          </p:nvPr>
+        </p:nvSpPr>
+        <p:spPr/>
+        <p:txBody>
+          <a:bodyPr/>
+          <a:lstStyle/>
+          <a:p>
+            <a:r>
+              <a:rPr lang="en-US" dirty="0" smtClean="0"/>
+              <a:t>16-bit storage locations</a:t>
+            </a:r>
+          </a:p>
+          <a:p>
+            <a:endParaRPr lang="en-US" dirty="0"/>
+          </a:p>
+          <a:p>
+            <a:r>
+              <a:rPr lang="en-US" dirty="0" smtClean="0"/>
+              <a:t>Internally stored as an array</a:t>
+            </a:r>
+          </a:p>
+          <a:p>
+            <a:endParaRPr lang="en-US" dirty="0" smtClean="0"/>
+          </a:p>
+          <a:p>
+            <a:r>
+              <a:rPr lang="en-US" dirty="0" smtClean="0"/>
+              <a:t>Can store up to 1024 </a:t>
+            </a:r>
+          </a:p>
+          <a:p>
+            <a:pPr marL="0" indent="0">
+              <a:buNone/>
+            </a:pPr>
+            <a:r>
+              <a:rPr lang="en-US" dirty="0" smtClean="0"/>
+              <a:t>pieces of data</a:t>
+            </a:r>
+            <a:endParaRPr lang="en-US" dirty="0"/>
+          </a:p>
+          <a:p>
+            <a:endParaRPr lang="en-US" dirty="0"/>
+          </a:p>
+        </p:txBody>
+      </p:sp>
+      <p:cxnSp>
+        <p:nvCxnSpPr>
+          <p:cNvPr id="4" name="Straight Connector 3"/>
+          <p:cNvCxnSpPr/>
+          <p:nvPr/>
+        </p:nvCxnSpPr>
+        <p:spPr>
+          <a:xfrm flipH="1">
+            <a:off x="541178" y="6316824"/>
+            <a:ext cx="11109646" cy="0"/>
+          </a:xfrm>
+          <a:prstGeom prst="line">
+            <a:avLst/>
+          </a:prstGeom>
+        </p:spPr>
+        <p:style>
+          <a:lnRef idx="1">
+            <a:schemeClr val="accent1"/>
+          </a:lnRef>
+          <a:fillRef idx="0">
+            <a:schemeClr val="accent1"/>
+          </a:fillRef>
+          <a:effectRef idx="0">
+            <a:schemeClr val="accent1"/>
+          </a:effectRef>
+          <a:fontRef idx="minor">
+            <a:schemeClr val="tx1"/>
+          </a:fontRef>
+        </p:style>
+      </p:cxnSp>
+      <p:cxnSp>
+        <p:nvCxnSpPr>
+          <p:cNvPr id="5" name="Straight Connector 4"/>
+          <p:cNvCxnSpPr/>
+          <p:nvPr/>
+        </p:nvCxnSpPr>
+        <p:spPr>
+          <a:xfrm flipH="1">
+            <a:off x="723900" y="6469224"/>
+            <a:ext cx="10744200" cy="0"/>
+          </a:xfrm>
+          <a:prstGeom prst="line">
+            <a:avLst/>
+          </a:prstGeom>
+        </p:spPr>
+        <p:style>
+          <a:lnRef idx="1">
+            <a:schemeClr val="accent1"/>
+          </a:lnRef>
+          <a:fillRef idx="0">
+            <a:schemeClr val="accent1"/>
+          </a:fillRef>
+          <a:effectRef idx="0">
+            <a:schemeClr val="accent1"/>
+          </a:effectRef>
+          <a:fontRef idx="minor">
+            <a:schemeClr val="tx1"/>
+          </a:fontRef>
+        </p:style>
+      </p:cxnSp>
+      <p:cxnSp>
+        <p:nvCxnSpPr>
+          <p:cNvPr id="6" name="Straight Connector 5"/>
+          <p:cNvCxnSpPr/>
+          <p:nvPr/>
+        </p:nvCxnSpPr>
+        <p:spPr>
+          <a:xfrm flipH="1">
+            <a:off x="876300" y="6621624"/>
+            <a:ext cx="10378440" cy="0"/>
+          </a:xfrm>
+          <a:prstGeom prst="line">
+            <a:avLst/>
+          </a:prstGeom>
+        </p:spPr>
+        <p:style>
+          <a:lnRef idx="1">
+            <a:schemeClr val="accent1"/>
+          </a:lnRef>
+          <a:fillRef idx="0">
+            <a:schemeClr val="accent1"/>
+          </a:fillRef>
+          <a:effectRef idx="0">
+            <a:schemeClr val="accent1"/>
+          </a:effectRef>
+          <a:fontRef idx="minor">
+            <a:schemeClr val="tx1"/>
+          </a:fontRef>
+        </p:style>
+      </p:cxnSp>
+      <p:cxnSp>
+        <p:nvCxnSpPr>
+          <p:cNvPr id="7" name="Straight Connector 6"/>
+          <p:cNvCxnSpPr/>
+          <p:nvPr/>
+        </p:nvCxnSpPr>
+        <p:spPr>
+          <a:xfrm flipH="1">
+            <a:off x="0" y="6316824"/>
+            <a:ext cx="541178" cy="541176"/>
+          </a:xfrm>
+          <a:prstGeom prst="line">
+            <a:avLst/>
+          </a:prstGeom>
+        </p:spPr>
+        <p:style>
+          <a:lnRef idx="1">
+            <a:schemeClr val="accent1"/>
+          </a:lnRef>
+          <a:fillRef idx="0">
+            <a:schemeClr val="accent1"/>
+          </a:fillRef>
+          <a:effectRef idx="0">
+            <a:schemeClr val="accent1"/>
+          </a:effectRef>
+          <a:fontRef idx="minor">
+            <a:schemeClr val="tx1"/>
+          </a:fontRef>
+        </p:style>
+      </p:cxnSp>
+      <p:cxnSp>
+        <p:nvCxnSpPr>
+          <p:cNvPr id="8" name="Straight Connector 7"/>
+          <p:cNvCxnSpPr/>
+          <p:nvPr/>
+        </p:nvCxnSpPr>
+        <p:spPr>
+          <a:xfrm flipH="1">
+            <a:off x="344846" y="6469224"/>
+            <a:ext cx="379054" cy="388776"/>
+          </a:xfrm>
+          <a:prstGeom prst="line">
+            <a:avLst/>
+          </a:prstGeom>
+        </p:spPr>
+        <p:style>
+          <a:lnRef idx="1">
+            <a:schemeClr val="accent1"/>
+          </a:lnRef>
+          <a:fillRef idx="0">
+            <a:schemeClr val="accent1"/>
+          </a:fillRef>
+          <a:effectRef idx="0">
+            <a:schemeClr val="accent1"/>
+          </a:effectRef>
+          <a:fontRef idx="minor">
+            <a:schemeClr val="tx1"/>
+          </a:fontRef>
+        </p:style>
+      </p:cxnSp>
+      <p:cxnSp>
+        <p:nvCxnSpPr>
+          <p:cNvPr id="9" name="Straight Connector 8"/>
+          <p:cNvCxnSpPr/>
+          <p:nvPr/>
+        </p:nvCxnSpPr>
+        <p:spPr>
+          <a:xfrm flipH="1">
+            <a:off x="657225" y="6621624"/>
+            <a:ext cx="219075" cy="236376"/>
+          </a:xfrm>
+          <a:prstGeom prst="line">
+            <a:avLst/>
+          </a:prstGeom>
+        </p:spPr>
+        <p:style>
+          <a:lnRef idx="1">
+            <a:schemeClr val="accent1"/>
+          </a:lnRef>
+          <a:fillRef idx="0">
+            <a:schemeClr val="accent1"/>
+          </a:fillRef>
+          <a:effectRef idx="0">
+            <a:schemeClr val="accent1"/>
+          </a:effectRef>
+          <a:fontRef idx="minor">
+            <a:schemeClr val="tx1"/>
+          </a:fontRef>
+        </p:style>
+      </p:cxnSp>
+      <p:cxnSp>
+        <p:nvCxnSpPr>
+          <p:cNvPr id="10" name="Straight Connector 9"/>
+          <p:cNvCxnSpPr/>
+          <p:nvPr/>
+        </p:nvCxnSpPr>
+        <p:spPr>
+          <a:xfrm rot="5400000" flipH="1">
+            <a:off x="11650821" y="6316823"/>
+            <a:ext cx="541178" cy="541176"/>
+          </a:xfrm>
+          <a:prstGeom prst="line">
+            <a:avLst/>
+          </a:prstGeom>
+        </p:spPr>
+        <p:style>
+          <a:lnRef idx="1">
+            <a:schemeClr val="accent1"/>
+          </a:lnRef>
+          <a:fillRef idx="0">
+            <a:schemeClr val="accent1"/>
+          </a:fillRef>
+          <a:effectRef idx="0">
+            <a:schemeClr val="accent1"/>
+          </a:effectRef>
+          <a:fontRef idx="minor">
+            <a:schemeClr val="tx1"/>
+          </a:fontRef>
+        </p:style>
+      </p:cxnSp>
+      <p:cxnSp>
+        <p:nvCxnSpPr>
+          <p:cNvPr id="11" name="Straight Connector 10"/>
+          <p:cNvCxnSpPr/>
+          <p:nvPr/>
+        </p:nvCxnSpPr>
+        <p:spPr>
+          <a:xfrm flipH="1" flipV="1">
+            <a:off x="11468100" y="6469223"/>
+            <a:ext cx="396082" cy="388777"/>
+          </a:xfrm>
+          <a:prstGeom prst="line">
+            <a:avLst/>
+          </a:prstGeom>
+        </p:spPr>
+        <p:style>
+          <a:lnRef idx="1">
+            <a:schemeClr val="accent1"/>
+          </a:lnRef>
+          <a:fillRef idx="0">
+            <a:schemeClr val="accent1"/>
+          </a:fillRef>
+          <a:effectRef idx="0">
+            <a:schemeClr val="accent1"/>
+          </a:effectRef>
+          <a:fontRef idx="minor">
+            <a:schemeClr val="tx1"/>
+          </a:fontRef>
+        </p:style>
+      </p:cxnSp>
+      <p:cxnSp>
+        <p:nvCxnSpPr>
+          <p:cNvPr id="12" name="Straight Connector 11"/>
+          <p:cNvCxnSpPr/>
+          <p:nvPr/>
+        </p:nvCxnSpPr>
+        <p:spPr>
+          <a:xfrm flipH="1" flipV="1">
+            <a:off x="11254740" y="6621624"/>
+            <a:ext cx="213360" cy="236376"/>
+          </a:xfrm>
+          <a:prstGeom prst="line">
+            <a:avLst/>
+          </a:prstGeom>
+        </p:spPr>
+        <p:style>
+          <a:lnRef idx="1">
+            <a:schemeClr val="accent1"/>
+          </a:lnRef>
+          <a:fillRef idx="0">
+            <a:schemeClr val="accent1"/>
+          </a:fillRef>
+          <a:effectRef idx="0">
+            <a:schemeClr val="accent1"/>
+          </a:effectRef>
+          <a:fontRef idx="minor">
+            <a:schemeClr val="tx1"/>
+          </a:fontRef>
+        </p:style>
+      </p:cxnSp>
+      <p:sp>
+        <p:nvSpPr>
+          <p:cNvPr id="13" name="Oval 12"/>
+          <p:cNvSpPr/>
+          <p:nvPr/>
+        </p:nvSpPr>
+        <p:spPr>
+          <a:xfrm>
+            <a:off x="0" y="6724650"/>
+            <a:ext cx="121879" cy="133350"/>
+          </a:xfrm>
+          <a:prstGeom prst="ellipse">
+            <a:avLst/>
+          </a:prstGeom>
+          <a:solidFill>
+            <a:schemeClr val="tx1"/>
+          </a:solidFill>
+          <a:effectLst>
+            <a:glow rad="63500">
+              <a:schemeClr val="accent1">
+                <a:satMod val="175000"/>
+                <a:alpha val="40000"/>
+              </a:schemeClr>
+            </a:glow>
+            <a:softEdge rad="31750"/>
+          </a:effectLst>
+        </p:spPr>
+        <p:style>
+          <a:lnRef idx="2">
+            <a:schemeClr val="accent1">
+              <a:shade val="50000"/>
+            </a:schemeClr>
+          </a:lnRef>
+          <a:fillRef idx="1">
+            <a:schemeClr val="accent1"/>
+          </a:fillRef>
+          <a:effectRef idx="0">
+            <a:schemeClr val="accent1"/>
+          </a:effectRef>
+          <a:fontRef idx="minor">
+            <a:schemeClr val="lt1"/>
+          </a:fontRef>
+        </p:style>
+        <p:txBody>
+          <a:bodyPr rtlCol="0" anchor="ctr"/>
+          <a:lstStyle/>
+          <a:p>
+            <a:pPr algn="ctr"/>
+            <a:endParaRPr lang="en-US"/>
+          </a:p>
+        </p:txBody>
+      </p:sp>
+      <p:pic>
+        <p:nvPicPr>
+          <p:cNvPr id="16" name="Picture 15"/>
+          <p:cNvPicPr>
+            <a:picLocks noChangeAspect="1"/>
+          </p:cNvPicPr>
+          <p:nvPr/>
+        </p:nvPicPr>
+        <p:blipFill>
+          <a:blip r:embed="rId2">
+            <a:extLst>
+              <a:ext uri="{28A0092B-C50C-407E-A947-70E740481C1C}">
+                <a14:useLocalDpi xmlns:a14="http://schemas.microsoft.com/office/drawing/2010/main" val="0"/>
+              </a:ext>
+            </a:extLst>
+          </a:blip>
+          <a:stretch>
+            <a:fillRect/>
+          </a:stretch>
+        </p:blipFill>
+        <p:spPr>
+          <a:xfrm>
+            <a:off x="5940407" y="1825624"/>
+            <a:ext cx="5710415" cy="3952582"/>
+          </a:xfrm>
+          <a:prstGeom prst="rect">
+            <a:avLst/>
+          </a:prstGeom>
+        </p:spPr>
+      </p:pic>
+    </p:spTree>
+    <p:extLst>
+      <p:ext uri="{BB962C8B-B14F-4D97-AF65-F5344CB8AC3E}">
+        <p14:creationId xmlns:p14="http://schemas.microsoft.com/office/powerpoint/2010/main" val="3611513497"/>
+      </p:ext>
+    </p:extLst>
+  </p:cSld>
+  <p:clrMapOvr>
+    <a:masterClrMapping/>
+  </p:clrMapOvr>
+  <p:timing>
+    <p:tnLst>
+      <p:par>
+        <p:cTn id="1" dur="indefinite" restart="never" nodeType="tmRoot">
+          <p:childTnLst>
+            <p:seq concurrent="1" nextAc="seek">
+              <p:cTn id="2" dur="indefinite" nodeType="mainSeq">
+                <p:childTnLst>
+                  <p:par>
+                    <p:cTn id="3" fill="hold">
+                      <p:stCondLst>
+                        <p:cond delay="indefinite"/>
+                        <p:cond evt="onBegin" delay="0">
+                          <p:tn val="2"/>
+                        </p:cond>
+                      </p:stCondLst>
+                      <p:childTnLst>
+                        <p:par>
+                          <p:cTn id="4" fill="hold">
+                            <p:stCondLst>
+                              <p:cond delay="0"/>
+                            </p:stCondLst>
+                            <p:childTnLst>
+                              <p:par>
+                                <p:cTn id="5" presetID="1" presetClass="entr" presetSubtype="0" fill="hold" grpId="1" nodeType="afterEffect">
+                                  <p:stCondLst>
+                                    <p:cond delay="0"/>
+                                  </p:stCondLst>
+                                  <p:childTnLst>
+                                    <p:set>
+                                      <p:cBhvr>
+                                        <p:cTn id="6" dur="1" fill="hold">
+                                          <p:stCondLst>
+                                            <p:cond delay="0"/>
+                                          </p:stCondLst>
+                                        </p:cTn>
+                                        <p:tgtEl>
+                                          <p:spTgt spid="13"/>
+                                        </p:tgtEl>
+                                        <p:attrNameLst>
+                                          <p:attrName>style.visibility</p:attrName>
+                                        </p:attrNameLst>
+                                      </p:cBhvr>
+                                      <p:to>
+                                        <p:strVal val="visible"/>
+                                      </p:to>
+                                    </p:set>
+                                  </p:childTnLst>
+                                </p:cTn>
+                              </p:par>
+                            </p:childTnLst>
+                          </p:cTn>
+                        </p:par>
+                        <p:par>
+                          <p:cTn id="7" fill="hold">
+                            <p:stCondLst>
+                              <p:cond delay="0"/>
+                            </p:stCondLst>
+                            <p:childTnLst>
+                              <p:par>
+                                <p:cTn id="8" presetID="0" presetClass="path" presetSubtype="0" accel="50000" decel="50000" fill="hold" grpId="0" nodeType="afterEffect">
+                                  <p:stCondLst>
+                                    <p:cond delay="0"/>
+                                  </p:stCondLst>
+                                  <p:childTnLst>
+                                    <p:animMotion origin="layout" path="M 1.66667E-6 2.22222E-6 L 0.0414 -0.06806 L 0.95234 -0.06945 L 0.99453 0.00694 " pathEditMode="relative" ptsTypes="AAAA">
+                                      <p:cBhvr>
+                                        <p:cTn id="9" dur="2000" fill="hold"/>
+                                        <p:tgtEl>
+                                          <p:spTgt spid="13"/>
+                                        </p:tgtEl>
+                                        <p:attrNameLst>
+                                          <p:attrName>ppt_x</p:attrName>
+                                          <p:attrName>ppt_y</p:attrName>
+                                        </p:attrNameLst>
+                                      </p:cBhvr>
+                                    </p:animMotion>
+                                  </p:childTnLst>
+                                </p:cTn>
+                              </p:par>
+                            </p:childTnLst>
+                          </p:cTn>
+                        </p:par>
+                        <p:par>
+                          <p:cTn id="10" fill="hold">
+                            <p:stCondLst>
+                              <p:cond delay="2000"/>
+                            </p:stCondLst>
+                            <p:childTnLst>
+                              <p:par>
+                                <p:cTn id="11" presetID="1" presetClass="exit" presetSubtype="0" fill="hold" grpId="2" nodeType="afterEffect">
+                                  <p:stCondLst>
+                                    <p:cond delay="0"/>
+                                  </p:stCondLst>
+                                  <p:childTnLst>
+                                    <p:set>
+                                      <p:cBhvr>
+                                        <p:cTn id="12" dur="1" fill="hold">
+                                          <p:stCondLst>
+                                            <p:cond delay="0"/>
+                                          </p:stCondLst>
+                                        </p:cTn>
+                                        <p:tgtEl>
+                                          <p:spTgt spid="13"/>
+                                        </p:tgtEl>
+                                        <p:attrNameLst>
+                                          <p:attrName>style.visibility</p:attrName>
+                                        </p:attrNameLst>
+                                      </p:cBhvr>
+                                      <p:to>
+                                        <p:strVal val="hidden"/>
+                                      </p:to>
+                                    </p:set>
+                                  </p:childTnLst>
+                                </p:cTn>
+                              </p:par>
+                            </p:childTnLst>
+                          </p:cTn>
+                        </p:par>
+                      </p:childTnLst>
+                    </p:cTn>
+                  </p:par>
+                </p:childTnLst>
+              </p:cTn>
+              <p:prevCondLst>
+                <p:cond evt="onPrev" delay="0">
+                  <p:tgtEl>
+                    <p:sldTgt/>
+                  </p:tgtEl>
+                </p:cond>
+              </p:prevCondLst>
+              <p:nextCondLst>
+                <p:cond evt="onNext" delay="0">
+                  <p:tgtEl>
+                    <p:sldTgt/>
+                  </p:tgtEl>
+                </p:cond>
+              </p:nextCondLst>
+            </p:seq>
+          </p:childTnLst>
+        </p:cTn>
+      </p:par>
+    </p:tnLst>
+    <p:bldLst>
+      <p:bldP spid="13" grpId="0" animBg="1"/>
+      <p:bldP spid="13" grpId="1" animBg="1"/>
+      <p:bldP spid="13" grpId="2" animBg="1"/>
+    </p:bldLst>
+  </p:timing>
+</p:sld>
+</file>
+
+<file path=ppt/slides/slide9.xml><?xml version="1.0" encoding="utf-8"?>
+<p:sld xmlns:a="http://schemas.openxmlformats.org/drawingml/2006/main" xmlns:r="http://schemas.openxmlformats.org/officeDocument/2006/relationships" xmlns:p="http://schemas.openxmlformats.org/presentationml/2006/main">
+  <p:cSld>
+    <p:spTree>
+      <p:nvGrpSpPr>
+        <p:cNvPr id="1" name=""/>
+        <p:cNvGrpSpPr/>
+        <p:nvPr/>
+      </p:nvGrpSpPr>
+      <p:grpSpPr>
+        <a:xfrm>
+          <a:off x="0" y="0"/>
+          <a:ext cx="0" cy="0"/>
+          <a:chOff x="0" y="0"/>
+          <a:chExt cx="0" cy="0"/>
+        </a:xfrm>
+      </p:grpSpPr>
+      <p:sp>
+        <p:nvSpPr>
+          <p:cNvPr id="2" name="Title 1"/>
+          <p:cNvSpPr>
+            <a:spLocks noGrp="1"/>
+          </p:cNvSpPr>
+          <p:nvPr>
+            <p:ph type="title"/>
+          </p:nvPr>
+        </p:nvSpPr>
+        <p:spPr/>
+        <p:txBody>
+          <a:bodyPr/>
+          <a:lstStyle/>
+          <a:p>
+            <a:r>
+              <a:rPr lang="en-US" dirty="0" smtClean="0"/>
+              <a:t>Components (Pipelines)</a:t>
+            </a:r>
+            <a:endParaRPr lang="en-US" dirty="0"/>
+          </a:p>
+        </p:txBody>
+      </p:sp>
+      <p:sp>
+        <p:nvSpPr>
+          <p:cNvPr id="3" name="Content Placeholder 2"/>
+          <p:cNvSpPr>
+            <a:spLocks noGrp="1"/>
+          </p:cNvSpPr>
+          <p:nvPr>
+            <p:ph idx="1"/>
+          </p:nvPr>
+        </p:nvSpPr>
+        <p:spPr/>
+        <p:txBody>
+          <a:bodyPr/>
+          <a:lstStyle/>
+          <a:p>
+            <a:r>
+              <a:rPr lang="en-US" dirty="0" smtClean="0"/>
+              <a:t>Monitors the CPU during each cycle</a:t>
+            </a:r>
+          </a:p>
+          <a:p>
+            <a:endParaRPr lang="en-US" dirty="0"/>
+          </a:p>
+          <a:p>
+            <a:r>
+              <a:rPr lang="en-US" dirty="0" smtClean="0"/>
+              <a:t>Stores the results of each cycle to reduce hazards (called forwarding)</a:t>
+            </a:r>
+          </a:p>
+          <a:p>
+            <a:endParaRPr lang="en-US" dirty="0"/>
+          </a:p>
+          <a:p>
+            <a:r>
+              <a:rPr lang="en-US" dirty="0" smtClean="0"/>
+              <a:t>Makes for a more efficient process</a:t>
+            </a:r>
+            <a:endParaRPr lang="en-US" dirty="0"/>
+          </a:p>
+        </p:txBody>
+      </p:sp>
+      <p:cxnSp>
+        <p:nvCxnSpPr>
+          <p:cNvPr id="4" name="Straight Connector 3"/>
+          <p:cNvCxnSpPr/>
+          <p:nvPr/>
+        </p:nvCxnSpPr>
+        <p:spPr>
+          <a:xfrm flipH="1">
+            <a:off x="541178" y="6316824"/>
+            <a:ext cx="11109646" cy="0"/>
+          </a:xfrm>
+          <a:prstGeom prst="line">
+            <a:avLst/>
+          </a:prstGeom>
+        </p:spPr>
+        <p:style>
+          <a:lnRef idx="1">
+            <a:schemeClr val="accent1"/>
+          </a:lnRef>
+          <a:fillRef idx="0">
+            <a:schemeClr val="accent1"/>
+          </a:fillRef>
+          <a:effectRef idx="0">
+            <a:schemeClr val="accent1"/>
+          </a:effectRef>
+          <a:fontRef idx="minor">
+            <a:schemeClr val="tx1"/>
+          </a:fontRef>
+        </p:style>
+      </p:cxnSp>
+      <p:cxnSp>
+        <p:nvCxnSpPr>
+          <p:cNvPr id="5" name="Straight Connector 4"/>
+          <p:cNvCxnSpPr/>
+          <p:nvPr/>
+        </p:nvCxnSpPr>
+        <p:spPr>
+          <a:xfrm flipH="1">
+            <a:off x="723900" y="6469224"/>
+            <a:ext cx="10744200" cy="0"/>
+          </a:xfrm>
+          <a:prstGeom prst="line">
+            <a:avLst/>
+          </a:prstGeom>
+        </p:spPr>
+        <p:style>
+          <a:lnRef idx="1">
+            <a:schemeClr val="accent1"/>
+          </a:lnRef>
+          <a:fillRef idx="0">
+            <a:schemeClr val="accent1"/>
+          </a:fillRef>
+          <a:effectRef idx="0">
+            <a:schemeClr val="accent1"/>
+          </a:effectRef>
+          <a:fontRef idx="minor">
+            <a:schemeClr val="tx1"/>
+          </a:fontRef>
+        </p:style>
+      </p:cxnSp>
+      <p:cxnSp>
+        <p:nvCxnSpPr>
+          <p:cNvPr id="6" name="Straight Connector 5"/>
+          <p:cNvCxnSpPr/>
+          <p:nvPr/>
+        </p:nvCxnSpPr>
+        <p:spPr>
+          <a:xfrm flipH="1">
+            <a:off x="876300" y="6621624"/>
+            <a:ext cx="10378440" cy="0"/>
+          </a:xfrm>
+          <a:prstGeom prst="line">
+            <a:avLst/>
+          </a:prstGeom>
+        </p:spPr>
+        <p:style>
+          <a:lnRef idx="1">
+            <a:schemeClr val="accent1"/>
+          </a:lnRef>
+          <a:fillRef idx="0">
+            <a:schemeClr val="accent1"/>
+          </a:fillRef>
+          <a:effectRef idx="0">
+            <a:schemeClr val="accent1"/>
+          </a:effectRef>
+          <a:fontRef idx="minor">
+            <a:schemeClr val="tx1"/>
+          </a:fontRef>
+        </p:style>
+      </p:cxnSp>
+      <p:cxnSp>
+        <p:nvCxnSpPr>
+          <p:cNvPr id="7" name="Straight Connector 6"/>
+          <p:cNvCxnSpPr/>
+          <p:nvPr/>
+        </p:nvCxnSpPr>
+        <p:spPr>
+          <a:xfrm flipH="1">
+            <a:off x="0" y="6316824"/>
+            <a:ext cx="541178" cy="541176"/>
+          </a:xfrm>
+          <a:prstGeom prst="line">
+            <a:avLst/>
+          </a:prstGeom>
+        </p:spPr>
+        <p:style>
+          <a:lnRef idx="1">
+            <a:schemeClr val="accent1"/>
+          </a:lnRef>
+          <a:fillRef idx="0">
+            <a:schemeClr val="accent1"/>
+          </a:fillRef>
+          <a:effectRef idx="0">
+            <a:schemeClr val="accent1"/>
+          </a:effectRef>
+          <a:fontRef idx="minor">
+            <a:schemeClr val="tx1"/>
+          </a:fontRef>
+        </p:style>
+      </p:cxnSp>
+      <p:cxnSp>
+        <p:nvCxnSpPr>
+          <p:cNvPr id="8" name="Straight Connector 7"/>
+          <p:cNvCxnSpPr/>
+          <p:nvPr/>
+        </p:nvCxnSpPr>
+        <p:spPr>
+          <a:xfrm flipH="1">
+            <a:off x="344846" y="6469224"/>
+            <a:ext cx="379054" cy="388776"/>
+          </a:xfrm>
+          <a:prstGeom prst="line">
+            <a:avLst/>
+          </a:prstGeom>
+        </p:spPr>
+        <p:style>
+          <a:lnRef idx="1">
+            <a:schemeClr val="accent1"/>
+          </a:lnRef>
+          <a:fillRef idx="0">
+            <a:schemeClr val="accent1"/>
+          </a:fillRef>
+          <a:effectRef idx="0">
+            <a:schemeClr val="accent1"/>
+          </a:effectRef>
+          <a:fontRef idx="minor">
+            <a:schemeClr val="tx1"/>
+          </a:fontRef>
+        </p:style>
+      </p:cxnSp>
+      <p:cxnSp>
+        <p:nvCxnSpPr>
+          <p:cNvPr id="9" name="Straight Connector 8"/>
+          <p:cNvCxnSpPr/>
+          <p:nvPr/>
+        </p:nvCxnSpPr>
+        <p:spPr>
+          <a:xfrm flipH="1">
+            <a:off x="657225" y="6621624"/>
+            <a:ext cx="219075" cy="236376"/>
+          </a:xfrm>
+          <a:prstGeom prst="line">
+            <a:avLst/>
+          </a:prstGeom>
+        </p:spPr>
+        <p:style>
+          <a:lnRef idx="1">
+            <a:schemeClr val="accent1"/>
+          </a:lnRef>
+          <a:fillRef idx="0">
+            <a:schemeClr val="accent1"/>
+          </a:fillRef>
+          <a:effectRef idx="0">
+            <a:schemeClr val="accent1"/>
+          </a:effectRef>
+          <a:fontRef idx="minor">
+            <a:schemeClr val="tx1"/>
+          </a:fontRef>
+        </p:style>
+      </p:cxnSp>
+      <p:cxnSp>
+        <p:nvCxnSpPr>
+          <p:cNvPr id="10" name="Straight Connector 9"/>
+          <p:cNvCxnSpPr/>
+          <p:nvPr/>
+        </p:nvCxnSpPr>
+        <p:spPr>
+          <a:xfrm rot="5400000" flipH="1">
+            <a:off x="11650821" y="6316823"/>
+            <a:ext cx="541178" cy="541176"/>
+          </a:xfrm>
+          <a:prstGeom prst="line">
+            <a:avLst/>
+          </a:prstGeom>
+        </p:spPr>
+        <p:style>
+          <a:lnRef idx="1">
+            <a:schemeClr val="accent1"/>
+          </a:lnRef>
+          <a:fillRef idx="0">
+            <a:schemeClr val="accent1"/>
+          </a:fillRef>
+          <a:effectRef idx="0">
+            <a:schemeClr val="accent1"/>
+          </a:effectRef>
+          <a:fontRef idx="minor">
+            <a:schemeClr val="tx1"/>
+          </a:fontRef>
+        </p:style>
+      </p:cxnSp>
+      <p:cxnSp>
+        <p:nvCxnSpPr>
+          <p:cNvPr id="11" name="Straight Connector 10"/>
+          <p:cNvCxnSpPr/>
+          <p:nvPr/>
+        </p:nvCxnSpPr>
+        <p:spPr>
+          <a:xfrm flipH="1" flipV="1">
+            <a:off x="11468100" y="6469223"/>
+            <a:ext cx="396082" cy="388777"/>
+          </a:xfrm>
+          <a:prstGeom prst="line">
+            <a:avLst/>
+          </a:prstGeom>
+        </p:spPr>
+        <p:style>
+          <a:lnRef idx="1">
+            <a:schemeClr val="accent1"/>
+          </a:lnRef>
+          <a:fillRef idx="0">
+            <a:schemeClr val="accent1"/>
+          </a:fillRef>
+          <a:effectRef idx="0">
+            <a:schemeClr val="accent1"/>
+          </a:effectRef>
+          <a:fontRef idx="minor">
+            <a:schemeClr val="tx1"/>
+          </a:fontRef>
+        </p:style>
+      </p:cxnSp>
+      <p:cxnSp>
+        <p:nvCxnSpPr>
+          <p:cNvPr id="12" name="Straight Connector 11"/>
+          <p:cNvCxnSpPr/>
+          <p:nvPr/>
+        </p:nvCxnSpPr>
+        <p:spPr>
+          <a:xfrm flipH="1" flipV="1">
+            <a:off x="11254740" y="6621624"/>
+            <a:ext cx="213360" cy="236376"/>
+          </a:xfrm>
+          <a:prstGeom prst="line">
+            <a:avLst/>
+          </a:prstGeom>
+        </p:spPr>
+        <p:style>
+          <a:lnRef idx="1">
+            <a:schemeClr val="accent1"/>
+          </a:lnRef>
+          <a:fillRef idx="0">
+            <a:schemeClr val="accent1"/>
+          </a:fillRef>
+          <a:effectRef idx="0">
+            <a:schemeClr val="accent1"/>
+          </a:effectRef>
+          <a:fontRef idx="minor">
+            <a:schemeClr val="tx1"/>
+          </a:fontRef>
+        </p:style>
+      </p:cxnSp>
+      <p:sp>
+        <p:nvSpPr>
+          <p:cNvPr id="13" name="Oval 12"/>
+          <p:cNvSpPr/>
+          <p:nvPr/>
+        </p:nvSpPr>
+        <p:spPr>
+          <a:xfrm>
+            <a:off x="0" y="6724650"/>
+            <a:ext cx="121879" cy="133350"/>
+          </a:xfrm>
+          <a:prstGeom prst="ellipse">
+            <a:avLst/>
+          </a:prstGeom>
+          <a:solidFill>
+            <a:schemeClr val="tx1"/>
+          </a:solidFill>
+          <a:effectLst>
+            <a:glow rad="63500">
+              <a:schemeClr val="accent1">
+                <a:satMod val="175000"/>
+                <a:alpha val="40000"/>
+              </a:schemeClr>
+            </a:glow>
+            <a:softEdge rad="31750"/>
+          </a:effectLst>
+        </p:spPr>
+        <p:style>
+          <a:lnRef idx="2">
+            <a:schemeClr val="accent1">
+              <a:shade val="50000"/>
+            </a:schemeClr>
+          </a:lnRef>
+          <a:fillRef idx="1">
+            <a:schemeClr val="accent1"/>
+          </a:fillRef>
+          <a:effectRef idx="0">
+            <a:schemeClr val="accent1"/>
+          </a:effectRef>
+          <a:fontRef idx="minor">
+            <a:schemeClr val="lt1"/>
+          </a:fontRef>
+        </p:style>
+        <p:txBody>
+          <a:bodyPr rtlCol="0" anchor="ctr"/>
+          <a:lstStyle/>
+          <a:p>
+            <a:pPr algn="ctr"/>
+            <a:endParaRPr lang="en-US"/>
+          </a:p>
+        </p:txBody>
+      </p:sp>
+    </p:spTree>
+    <p:extLst>
+      <p:ext uri="{BB962C8B-B14F-4D97-AF65-F5344CB8AC3E}">
+        <p14:creationId xmlns:p14="http://schemas.microsoft.com/office/powerpoint/2010/main" val="1428999865"/>
       </p:ext>
     </p:extLst>
   </p:cSld>

</xml_diff>

<commit_message>
Final: Final commit to project
</commit_message>
<xml_diff>
--- a/Source Files/Final/CPU Architecture.pptx
+++ b/Source Files/Final/CPU Architecture.pptx
@@ -9,13 +9,14 @@
     <p:sldId id="257" r:id="rId3"/>
     <p:sldId id="258" r:id="rId4"/>
     <p:sldId id="263" r:id="rId5"/>
-    <p:sldId id="259" r:id="rId6"/>
-    <p:sldId id="264" r:id="rId7"/>
-    <p:sldId id="260" r:id="rId8"/>
-    <p:sldId id="265" r:id="rId9"/>
-    <p:sldId id="266" r:id="rId10"/>
-    <p:sldId id="261" r:id="rId11"/>
-    <p:sldId id="262" r:id="rId12"/>
+    <p:sldId id="267" r:id="rId6"/>
+    <p:sldId id="259" r:id="rId7"/>
+    <p:sldId id="264" r:id="rId8"/>
+    <p:sldId id="260" r:id="rId9"/>
+    <p:sldId id="265" r:id="rId10"/>
+    <p:sldId id="266" r:id="rId11"/>
+    <p:sldId id="261" r:id="rId12"/>
+    <p:sldId id="262" r:id="rId13"/>
   </p:sldIdLst>
   <p:sldSz cx="12192000" cy="6858000"/>
   <p:notesSz cx="6858000" cy="9144000"/>
@@ -116,7 +117,7 @@
   </p:defaultTextStyle>
   <p:extLst>
     <p:ext uri="{EFAFB233-063F-42B5-8137-9DF3F51BA10A}">
-      <p15:sldGuideLst xmlns:p15="http://schemas.microsoft.com/office/powerpoint/2012/main"/>
+      <p15:sldGuideLst xmlns:p15="http://schemas.microsoft.com/office/powerpoint/2012/main" xmlns=""/>
     </p:ext>
   </p:extLst>
 </p:presentation>
@@ -253,7 +254,7 @@
           <a:p>
             <a:fld id="{CB37AB1E-EE32-48F7-B51B-28267015AF68}" type="datetimeFigureOut">
               <a:rPr lang="en-US" smtClean="0"/>
-              <a:t>5/2/2015</a:t>
+              <a:t>5/4/15</a:t>
             </a:fld>
             <a:endParaRPr lang="en-US"/>
           </a:p>
@@ -313,7 +314,7 @@
   </p:clrMapOvr>
   <p:extLst>
     <p:ext uri="{DCECCB84-F9BA-43D5-87BE-67443E8EF086}">
-      <p15:sldGuideLst xmlns:p15="http://schemas.microsoft.com/office/powerpoint/2012/main"/>
+      <p15:sldGuideLst xmlns:p15="http://schemas.microsoft.com/office/powerpoint/2012/main" xmlns=""/>
     </p:ext>
   </p:extLst>
 </p:sldLayout>
@@ -428,7 +429,7 @@
           <a:p>
             <a:fld id="{CB37AB1E-EE32-48F7-B51B-28267015AF68}" type="datetimeFigureOut">
               <a:rPr lang="en-US" smtClean="0"/>
-              <a:t>5/2/2015</a:t>
+              <a:t>5/4/15</a:t>
             </a:fld>
             <a:endParaRPr lang="en-US"/>
           </a:p>
@@ -608,7 +609,7 @@
           <a:p>
             <a:fld id="{CB37AB1E-EE32-48F7-B51B-28267015AF68}" type="datetimeFigureOut">
               <a:rPr lang="en-US" smtClean="0"/>
-              <a:t>5/2/2015</a:t>
+              <a:t>5/4/15</a:t>
             </a:fld>
             <a:endParaRPr lang="en-US"/>
           </a:p>
@@ -668,7 +669,7 @@
   </p:clrMapOvr>
   <p:extLst>
     <p:ext uri="{DCECCB84-F9BA-43D5-87BE-67443E8EF086}">
-      <p15:sldGuideLst xmlns:p15="http://schemas.microsoft.com/office/powerpoint/2012/main"/>
+      <p15:sldGuideLst xmlns:p15="http://schemas.microsoft.com/office/powerpoint/2012/main" xmlns=""/>
     </p:ext>
   </p:extLst>
 </p:sldLayout>
@@ -783,7 +784,7 @@
           <a:p>
             <a:fld id="{CB37AB1E-EE32-48F7-B51B-28267015AF68}" type="datetimeFigureOut">
               <a:rPr lang="en-US" smtClean="0"/>
-              <a:t>5/2/2015</a:t>
+              <a:t>5/4/15</a:t>
             </a:fld>
             <a:endParaRPr lang="en-US"/>
           </a:p>
@@ -1029,7 +1030,7 @@
           <a:p>
             <a:fld id="{CB37AB1E-EE32-48F7-B51B-28267015AF68}" type="datetimeFigureOut">
               <a:rPr lang="en-US" smtClean="0"/>
-              <a:t>5/2/2015</a:t>
+              <a:t>5/4/15</a:t>
             </a:fld>
             <a:endParaRPr lang="en-US"/>
           </a:p>
@@ -1089,7 +1090,7 @@
   </p:clrMapOvr>
   <p:extLst>
     <p:ext uri="{DCECCB84-F9BA-43D5-87BE-67443E8EF086}">
-      <p15:sldGuideLst xmlns:p15="http://schemas.microsoft.com/office/powerpoint/2012/main"/>
+      <p15:sldGuideLst xmlns:p15="http://schemas.microsoft.com/office/powerpoint/2012/main" xmlns=""/>
     </p:ext>
   </p:extLst>
 </p:sldLayout>
@@ -1266,7 +1267,7 @@
           <a:p>
             <a:fld id="{CB37AB1E-EE32-48F7-B51B-28267015AF68}" type="datetimeFigureOut">
               <a:rPr lang="en-US" smtClean="0"/>
-              <a:t>5/2/2015</a:t>
+              <a:t>5/4/15</a:t>
             </a:fld>
             <a:endParaRPr lang="en-US"/>
           </a:p>
@@ -1633,7 +1634,7 @@
           <a:p>
             <a:fld id="{CB37AB1E-EE32-48F7-B51B-28267015AF68}" type="datetimeFigureOut">
               <a:rPr lang="en-US" smtClean="0"/>
-              <a:t>5/2/2015</a:t>
+              <a:t>5/4/15</a:t>
             </a:fld>
             <a:endParaRPr lang="en-US"/>
           </a:p>
@@ -1751,7 +1752,7 @@
           <a:p>
             <a:fld id="{CB37AB1E-EE32-48F7-B51B-28267015AF68}" type="datetimeFigureOut">
               <a:rPr lang="en-US" smtClean="0"/>
-              <a:t>5/2/2015</a:t>
+              <a:t>5/4/15</a:t>
             </a:fld>
             <a:endParaRPr lang="en-US"/>
           </a:p>
@@ -1846,7 +1847,7 @@
           <a:p>
             <a:fld id="{CB37AB1E-EE32-48F7-B51B-28267015AF68}" type="datetimeFigureOut">
               <a:rPr lang="en-US" smtClean="0"/>
-              <a:t>5/2/2015</a:t>
+              <a:t>5/4/15</a:t>
             </a:fld>
             <a:endParaRPr lang="en-US"/>
           </a:p>
@@ -2123,7 +2124,7 @@
           <a:p>
             <a:fld id="{CB37AB1E-EE32-48F7-B51B-28267015AF68}" type="datetimeFigureOut">
               <a:rPr lang="en-US" smtClean="0"/>
-              <a:t>5/2/2015</a:t>
+              <a:t>5/4/15</a:t>
             </a:fld>
             <a:endParaRPr lang="en-US"/>
           </a:p>
@@ -2380,7 +2381,7 @@
           <a:p>
             <a:fld id="{CB37AB1E-EE32-48F7-B51B-28267015AF68}" type="datetimeFigureOut">
               <a:rPr lang="en-US" smtClean="0"/>
-              <a:t>5/2/2015</a:t>
+              <a:t>5/4/15</a:t>
             </a:fld>
             <a:endParaRPr lang="en-US"/>
           </a:p>
@@ -2593,7 +2594,7 @@
           <a:p>
             <a:fld id="{CB37AB1E-EE32-48F7-B51B-28267015AF68}" type="datetimeFigureOut">
               <a:rPr lang="en-US" smtClean="0"/>
-              <a:t>5/2/2015</a:t>
+              <a:t>5/4/15</a:t>
             </a:fld>
             <a:endParaRPr lang="en-US"/>
           </a:p>
@@ -2980,7 +2981,7 @@
   </p:txStyles>
   <p:extLst>
     <p:ext uri="{27BBF7A9-308A-43DC-89C8-2F10F3537804}">
-      <p15:sldGuideLst xmlns:p15="http://schemas.microsoft.com/office/powerpoint/2012/main"/>
+      <p15:sldGuideLst xmlns:p15="http://schemas.microsoft.com/office/powerpoint/2012/main" xmlns=""/>
     </p:ext>
   </p:extLst>
 </p:sldMaster>
@@ -3354,7 +3355,7 @@
   <p:timing>
     <p:tnLst>
       <p:par>
-        <p:cTn id="1" dur="indefinite" restart="never" nodeType="tmRoot"/>
+        <p:cTn xmlns:p14="http://schemas.microsoft.com/office/powerpoint/2010/main" id="1" dur="indefinite" restart="never" nodeType="tmRoot"/>
       </p:par>
     </p:tnLst>
   </p:timing>
@@ -3362,6 +3363,571 @@
 </file>
 
 <file path=ppt/slides/slide10.xml><?xml version="1.0" encoding="utf-8"?>
+<p:sld xmlns:a="http://schemas.openxmlformats.org/drawingml/2006/main" xmlns:r="http://schemas.openxmlformats.org/officeDocument/2006/relationships" xmlns:p="http://schemas.openxmlformats.org/presentationml/2006/main">
+  <p:cSld>
+    <p:spTree>
+      <p:nvGrpSpPr>
+        <p:cNvPr id="1" name=""/>
+        <p:cNvGrpSpPr/>
+        <p:nvPr/>
+      </p:nvGrpSpPr>
+      <p:grpSpPr>
+        <a:xfrm>
+          <a:off x="0" y="0"/>
+          <a:ext cx="0" cy="0"/>
+          <a:chOff x="0" y="0"/>
+          <a:chExt cx="0" cy="0"/>
+        </a:xfrm>
+      </p:grpSpPr>
+      <p:sp>
+        <p:nvSpPr>
+          <p:cNvPr id="2" name="Title 1"/>
+          <p:cNvSpPr>
+            <a:spLocks noGrp="1"/>
+          </p:cNvSpPr>
+          <p:nvPr>
+            <p:ph type="title"/>
+          </p:nvPr>
+        </p:nvSpPr>
+        <p:spPr/>
+        <p:txBody>
+          <a:bodyPr/>
+          <a:lstStyle/>
+          <a:p>
+            <a:r>
+              <a:rPr lang="en-US" dirty="0" smtClean="0"/>
+              <a:t>Components (Pipelines)</a:t>
+            </a:r>
+            <a:endParaRPr lang="en-US" dirty="0"/>
+          </a:p>
+        </p:txBody>
+      </p:sp>
+      <p:sp>
+        <p:nvSpPr>
+          <p:cNvPr id="3" name="Content Placeholder 2"/>
+          <p:cNvSpPr>
+            <a:spLocks noGrp="1"/>
+          </p:cNvSpPr>
+          <p:nvPr>
+            <p:ph idx="1"/>
+          </p:nvPr>
+        </p:nvSpPr>
+        <p:spPr/>
+        <p:txBody>
+          <a:bodyPr/>
+          <a:lstStyle/>
+          <a:p>
+            <a:r>
+              <a:rPr lang="en-US" dirty="0" smtClean="0"/>
+              <a:t>Monitors the CPU during each cycle</a:t>
+            </a:r>
+          </a:p>
+          <a:p>
+            <a:endParaRPr lang="en-US" dirty="0"/>
+          </a:p>
+          <a:p>
+            <a:r>
+              <a:rPr lang="en-US" dirty="0" smtClean="0"/>
+              <a:t>Stores the results of each cycle to reduce hazards (called forwarding)</a:t>
+            </a:r>
+          </a:p>
+          <a:p>
+            <a:endParaRPr lang="en-US" dirty="0"/>
+          </a:p>
+          <a:p>
+            <a:r>
+              <a:rPr lang="en-US" dirty="0" smtClean="0"/>
+              <a:t>Makes for a more efficient process</a:t>
+            </a:r>
+            <a:endParaRPr lang="en-US" dirty="0"/>
+          </a:p>
+        </p:txBody>
+      </p:sp>
+      <p:cxnSp>
+        <p:nvCxnSpPr>
+          <p:cNvPr id="4" name="Straight Connector 3"/>
+          <p:cNvCxnSpPr/>
+          <p:nvPr/>
+        </p:nvCxnSpPr>
+        <p:spPr>
+          <a:xfrm flipH="1">
+            <a:off x="541178" y="6316824"/>
+            <a:ext cx="11109646" cy="0"/>
+          </a:xfrm>
+          <a:prstGeom prst="line">
+            <a:avLst/>
+          </a:prstGeom>
+        </p:spPr>
+        <p:style>
+          <a:lnRef idx="1">
+            <a:schemeClr val="accent1"/>
+          </a:lnRef>
+          <a:fillRef idx="0">
+            <a:schemeClr val="accent1"/>
+          </a:fillRef>
+          <a:effectRef idx="0">
+            <a:schemeClr val="accent1"/>
+          </a:effectRef>
+          <a:fontRef idx="minor">
+            <a:schemeClr val="tx1"/>
+          </a:fontRef>
+        </p:style>
+      </p:cxnSp>
+      <p:cxnSp>
+        <p:nvCxnSpPr>
+          <p:cNvPr id="5" name="Straight Connector 4"/>
+          <p:cNvCxnSpPr/>
+          <p:nvPr/>
+        </p:nvCxnSpPr>
+        <p:spPr>
+          <a:xfrm flipH="1">
+            <a:off x="723900" y="6469224"/>
+            <a:ext cx="10744200" cy="0"/>
+          </a:xfrm>
+          <a:prstGeom prst="line">
+            <a:avLst/>
+          </a:prstGeom>
+        </p:spPr>
+        <p:style>
+          <a:lnRef idx="1">
+            <a:schemeClr val="accent1"/>
+          </a:lnRef>
+          <a:fillRef idx="0">
+            <a:schemeClr val="accent1"/>
+          </a:fillRef>
+          <a:effectRef idx="0">
+            <a:schemeClr val="accent1"/>
+          </a:effectRef>
+          <a:fontRef idx="minor">
+            <a:schemeClr val="tx1"/>
+          </a:fontRef>
+        </p:style>
+      </p:cxnSp>
+      <p:cxnSp>
+        <p:nvCxnSpPr>
+          <p:cNvPr id="6" name="Straight Connector 5"/>
+          <p:cNvCxnSpPr/>
+          <p:nvPr/>
+        </p:nvCxnSpPr>
+        <p:spPr>
+          <a:xfrm flipH="1">
+            <a:off x="876300" y="6621624"/>
+            <a:ext cx="10378440" cy="0"/>
+          </a:xfrm>
+          <a:prstGeom prst="line">
+            <a:avLst/>
+          </a:prstGeom>
+        </p:spPr>
+        <p:style>
+          <a:lnRef idx="1">
+            <a:schemeClr val="accent1"/>
+          </a:lnRef>
+          <a:fillRef idx="0">
+            <a:schemeClr val="accent1"/>
+          </a:fillRef>
+          <a:effectRef idx="0">
+            <a:schemeClr val="accent1"/>
+          </a:effectRef>
+          <a:fontRef idx="minor">
+            <a:schemeClr val="tx1"/>
+          </a:fontRef>
+        </p:style>
+      </p:cxnSp>
+      <p:cxnSp>
+        <p:nvCxnSpPr>
+          <p:cNvPr id="7" name="Straight Connector 6"/>
+          <p:cNvCxnSpPr/>
+          <p:nvPr/>
+        </p:nvCxnSpPr>
+        <p:spPr>
+          <a:xfrm flipH="1">
+            <a:off x="0" y="6316824"/>
+            <a:ext cx="541178" cy="541176"/>
+          </a:xfrm>
+          <a:prstGeom prst="line">
+            <a:avLst/>
+          </a:prstGeom>
+        </p:spPr>
+        <p:style>
+          <a:lnRef idx="1">
+            <a:schemeClr val="accent1"/>
+          </a:lnRef>
+          <a:fillRef idx="0">
+            <a:schemeClr val="accent1"/>
+          </a:fillRef>
+          <a:effectRef idx="0">
+            <a:schemeClr val="accent1"/>
+          </a:effectRef>
+          <a:fontRef idx="minor">
+            <a:schemeClr val="tx1"/>
+          </a:fontRef>
+        </p:style>
+      </p:cxnSp>
+      <p:cxnSp>
+        <p:nvCxnSpPr>
+          <p:cNvPr id="8" name="Straight Connector 7"/>
+          <p:cNvCxnSpPr/>
+          <p:nvPr/>
+        </p:nvCxnSpPr>
+        <p:spPr>
+          <a:xfrm flipH="1">
+            <a:off x="344846" y="6469224"/>
+            <a:ext cx="379054" cy="388776"/>
+          </a:xfrm>
+          <a:prstGeom prst="line">
+            <a:avLst/>
+          </a:prstGeom>
+        </p:spPr>
+        <p:style>
+          <a:lnRef idx="1">
+            <a:schemeClr val="accent1"/>
+          </a:lnRef>
+          <a:fillRef idx="0">
+            <a:schemeClr val="accent1"/>
+          </a:fillRef>
+          <a:effectRef idx="0">
+            <a:schemeClr val="accent1"/>
+          </a:effectRef>
+          <a:fontRef idx="minor">
+            <a:schemeClr val="tx1"/>
+          </a:fontRef>
+        </p:style>
+      </p:cxnSp>
+      <p:cxnSp>
+        <p:nvCxnSpPr>
+          <p:cNvPr id="9" name="Straight Connector 8"/>
+          <p:cNvCxnSpPr/>
+          <p:nvPr/>
+        </p:nvCxnSpPr>
+        <p:spPr>
+          <a:xfrm flipH="1">
+            <a:off x="657225" y="6621624"/>
+            <a:ext cx="219075" cy="236376"/>
+          </a:xfrm>
+          <a:prstGeom prst="line">
+            <a:avLst/>
+          </a:prstGeom>
+        </p:spPr>
+        <p:style>
+          <a:lnRef idx="1">
+            <a:schemeClr val="accent1"/>
+          </a:lnRef>
+          <a:fillRef idx="0">
+            <a:schemeClr val="accent1"/>
+          </a:fillRef>
+          <a:effectRef idx="0">
+            <a:schemeClr val="accent1"/>
+          </a:effectRef>
+          <a:fontRef idx="minor">
+            <a:schemeClr val="tx1"/>
+          </a:fontRef>
+        </p:style>
+      </p:cxnSp>
+      <p:cxnSp>
+        <p:nvCxnSpPr>
+          <p:cNvPr id="10" name="Straight Connector 9"/>
+          <p:cNvCxnSpPr/>
+          <p:nvPr/>
+        </p:nvCxnSpPr>
+        <p:spPr>
+          <a:xfrm rot="5400000" flipH="1">
+            <a:off x="11650821" y="6316823"/>
+            <a:ext cx="541178" cy="541176"/>
+          </a:xfrm>
+          <a:prstGeom prst="line">
+            <a:avLst/>
+          </a:prstGeom>
+        </p:spPr>
+        <p:style>
+          <a:lnRef idx="1">
+            <a:schemeClr val="accent1"/>
+          </a:lnRef>
+          <a:fillRef idx="0">
+            <a:schemeClr val="accent1"/>
+          </a:fillRef>
+          <a:effectRef idx="0">
+            <a:schemeClr val="accent1"/>
+          </a:effectRef>
+          <a:fontRef idx="minor">
+            <a:schemeClr val="tx1"/>
+          </a:fontRef>
+        </p:style>
+      </p:cxnSp>
+      <p:cxnSp>
+        <p:nvCxnSpPr>
+          <p:cNvPr id="11" name="Straight Connector 10"/>
+          <p:cNvCxnSpPr/>
+          <p:nvPr/>
+        </p:nvCxnSpPr>
+        <p:spPr>
+          <a:xfrm flipH="1" flipV="1">
+            <a:off x="11468100" y="6469223"/>
+            <a:ext cx="396082" cy="388777"/>
+          </a:xfrm>
+          <a:prstGeom prst="line">
+            <a:avLst/>
+          </a:prstGeom>
+        </p:spPr>
+        <p:style>
+          <a:lnRef idx="1">
+            <a:schemeClr val="accent1"/>
+          </a:lnRef>
+          <a:fillRef idx="0">
+            <a:schemeClr val="accent1"/>
+          </a:fillRef>
+          <a:effectRef idx="0">
+            <a:schemeClr val="accent1"/>
+          </a:effectRef>
+          <a:fontRef idx="minor">
+            <a:schemeClr val="tx1"/>
+          </a:fontRef>
+        </p:style>
+      </p:cxnSp>
+      <p:cxnSp>
+        <p:nvCxnSpPr>
+          <p:cNvPr id="12" name="Straight Connector 11"/>
+          <p:cNvCxnSpPr/>
+          <p:nvPr/>
+        </p:nvCxnSpPr>
+        <p:spPr>
+          <a:xfrm flipH="1" flipV="1">
+            <a:off x="11254740" y="6621624"/>
+            <a:ext cx="213360" cy="236376"/>
+          </a:xfrm>
+          <a:prstGeom prst="line">
+            <a:avLst/>
+          </a:prstGeom>
+        </p:spPr>
+        <p:style>
+          <a:lnRef idx="1">
+            <a:schemeClr val="accent1"/>
+          </a:lnRef>
+          <a:fillRef idx="0">
+            <a:schemeClr val="accent1"/>
+          </a:fillRef>
+          <a:effectRef idx="0">
+            <a:schemeClr val="accent1"/>
+          </a:effectRef>
+          <a:fontRef idx="minor">
+            <a:schemeClr val="tx1"/>
+          </a:fontRef>
+        </p:style>
+      </p:cxnSp>
+      <p:sp>
+        <p:nvSpPr>
+          <p:cNvPr id="13" name="Oval 12"/>
+          <p:cNvSpPr/>
+          <p:nvPr/>
+        </p:nvSpPr>
+        <p:spPr>
+          <a:xfrm>
+            <a:off x="0" y="6724650"/>
+            <a:ext cx="121879" cy="133350"/>
+          </a:xfrm>
+          <a:prstGeom prst="ellipse">
+            <a:avLst/>
+          </a:prstGeom>
+          <a:solidFill>
+            <a:schemeClr val="tx1"/>
+          </a:solidFill>
+          <a:effectLst>
+            <a:glow rad="63500">
+              <a:schemeClr val="accent1">
+                <a:satMod val="175000"/>
+                <a:alpha val="40000"/>
+              </a:schemeClr>
+            </a:glow>
+            <a:softEdge rad="31750"/>
+          </a:effectLst>
+        </p:spPr>
+        <p:style>
+          <a:lnRef idx="2">
+            <a:schemeClr val="accent1">
+              <a:shade val="50000"/>
+            </a:schemeClr>
+          </a:lnRef>
+          <a:fillRef idx="1">
+            <a:schemeClr val="accent1"/>
+          </a:fillRef>
+          <a:effectRef idx="0">
+            <a:schemeClr val="accent1"/>
+          </a:effectRef>
+          <a:fontRef idx="minor">
+            <a:schemeClr val="lt1"/>
+          </a:fontRef>
+        </p:style>
+        <p:txBody>
+          <a:bodyPr rtlCol="0" anchor="ctr"/>
+          <a:lstStyle/>
+          <a:p>
+            <a:pPr algn="ctr"/>
+            <a:endParaRPr lang="en-US"/>
+          </a:p>
+        </p:txBody>
+      </p:sp>
+    </p:spTree>
+    <p:extLst>
+      <p:ext uri="{BB962C8B-B14F-4D97-AF65-F5344CB8AC3E}">
+        <p14:creationId xmlns:p14="http://schemas.microsoft.com/office/powerpoint/2010/main" val="1428999865"/>
+      </p:ext>
+    </p:extLst>
+  </p:cSld>
+  <p:clrMapOvr>
+    <a:masterClrMapping/>
+  </p:clrMapOvr>
+  <p:timing>
+    <p:tnLst>
+      <p:par>
+        <p:cTn xmlns:p14="http://schemas.microsoft.com/office/powerpoint/2010/main" id="1" dur="indefinite" restart="never" nodeType="tmRoot">
+          <p:childTnLst>
+            <p:seq concurrent="1" nextAc="seek">
+              <p:cTn id="2" dur="indefinite" nodeType="mainSeq">
+                <p:childTnLst>
+                  <p:par>
+                    <p:cTn id="3" fill="hold">
+                      <p:stCondLst>
+                        <p:cond delay="indefinite"/>
+                        <p:cond evt="onBegin" delay="0">
+                          <p:tn val="2"/>
+                        </p:cond>
+                      </p:stCondLst>
+                      <p:childTnLst>
+                        <p:par>
+                          <p:cTn id="4" fill="hold">
+                            <p:stCondLst>
+                              <p:cond delay="0"/>
+                            </p:stCondLst>
+                            <p:childTnLst>
+                              <p:par>
+                                <p:cTn id="5" presetID="1" presetClass="entr" presetSubtype="0" fill="hold" grpId="1" nodeType="afterEffect">
+                                  <p:stCondLst>
+                                    <p:cond delay="0"/>
+                                  </p:stCondLst>
+                                  <p:childTnLst>
+                                    <p:set>
+                                      <p:cBhvr>
+                                        <p:cTn id="6" dur="1" fill="hold">
+                                          <p:stCondLst>
+                                            <p:cond delay="0"/>
+                                          </p:stCondLst>
+                                        </p:cTn>
+                                        <p:tgtEl>
+                                          <p:spTgt spid="13"/>
+                                        </p:tgtEl>
+                                        <p:attrNameLst>
+                                          <p:attrName>style.visibility</p:attrName>
+                                        </p:attrNameLst>
+                                      </p:cBhvr>
+                                      <p:to>
+                                        <p:strVal val="visible"/>
+                                      </p:to>
+                                    </p:set>
+                                  </p:childTnLst>
+                                </p:cTn>
+                              </p:par>
+                            </p:childTnLst>
+                          </p:cTn>
+                        </p:par>
+                        <p:par>
+                          <p:cTn id="7" fill="hold">
+                            <p:stCondLst>
+                              <p:cond delay="0"/>
+                            </p:stCondLst>
+                            <p:childTnLst>
+                              <p:par>
+                                <p:cTn id="8" presetID="0" presetClass="path" presetSubtype="0" accel="50000" decel="50000" fill="hold" grpId="0" nodeType="afterEffect">
+                                  <p:stCondLst>
+                                    <p:cond delay="0"/>
+                                  </p:stCondLst>
+                                  <p:childTnLst>
+                                    <p:animMotion origin="layout" path="M 1.66667E-6 2.22222E-6 L 0.0414 -0.06806 L 0.95234 -0.06945 L 0.99453 0.00694 " pathEditMode="relative" ptsTypes="AAAA">
+                                      <p:cBhvr>
+                                        <p:cTn id="9" dur="2000" fill="hold"/>
+                                        <p:tgtEl>
+                                          <p:spTgt spid="13"/>
+                                        </p:tgtEl>
+                                        <p:attrNameLst>
+                                          <p:attrName>ppt_x</p:attrName>
+                                          <p:attrName>ppt_y</p:attrName>
+                                        </p:attrNameLst>
+                                      </p:cBhvr>
+                                    </p:animMotion>
+                                  </p:childTnLst>
+                                </p:cTn>
+                              </p:par>
+                            </p:childTnLst>
+                          </p:cTn>
+                        </p:par>
+                        <p:par>
+                          <p:cTn id="10" fill="hold">
+                            <p:stCondLst>
+                              <p:cond delay="2000"/>
+                            </p:stCondLst>
+                            <p:childTnLst>
+                              <p:par>
+                                <p:cTn id="11" presetID="1" presetClass="exit" presetSubtype="0" fill="hold" grpId="2" nodeType="afterEffect">
+                                  <p:stCondLst>
+                                    <p:cond delay="0"/>
+                                  </p:stCondLst>
+                                  <p:childTnLst>
+                                    <p:set>
+                                      <p:cBhvr>
+                                        <p:cTn id="12" dur="1" fill="hold">
+                                          <p:stCondLst>
+                                            <p:cond delay="0"/>
+                                          </p:stCondLst>
+                                        </p:cTn>
+                                        <p:tgtEl>
+                                          <p:spTgt spid="13"/>
+                                        </p:tgtEl>
+                                        <p:attrNameLst>
+                                          <p:attrName>style.visibility</p:attrName>
+                                        </p:attrNameLst>
+                                      </p:cBhvr>
+                                      <p:to>
+                                        <p:strVal val="hidden"/>
+                                      </p:to>
+                                    </p:set>
+                                  </p:childTnLst>
+                                </p:cTn>
+                              </p:par>
+                            </p:childTnLst>
+                          </p:cTn>
+                        </p:par>
+                      </p:childTnLst>
+                    </p:cTn>
+                  </p:par>
+                </p:childTnLst>
+              </p:cTn>
+              <p:prevCondLst>
+                <p:cond evt="onPrev" delay="0">
+                  <p:tgtEl>
+                    <p:sldTgt/>
+                  </p:tgtEl>
+                </p:cond>
+              </p:prevCondLst>
+              <p:nextCondLst>
+                <p:cond evt="onNext" delay="0">
+                  <p:tgtEl>
+                    <p:sldTgt/>
+                  </p:tgtEl>
+                </p:cond>
+              </p:nextCondLst>
+            </p:seq>
+          </p:childTnLst>
+        </p:cTn>
+      </p:par>
+    </p:tnLst>
+    <p:bldLst>
+      <p:bldP spid="13" grpId="0" animBg="1"/>
+      <p:bldP spid="13" grpId="1" animBg="1"/>
+      <p:bldP spid="13" grpId="2" animBg="1"/>
+    </p:bldLst>
+  </p:timing>
+</p:sld>
+</file>
+
+<file path=ppt/slides/slide11.xml><?xml version="1.0" encoding="utf-8"?>
 <p:sld xmlns:a="http://schemas.openxmlformats.org/drawingml/2006/main" xmlns:r="http://schemas.openxmlformats.org/officeDocument/2006/relationships" xmlns:p="http://schemas.openxmlformats.org/presentationml/2006/main">
   <p:cSld>
     <p:spTree>
@@ -4087,7 +4653,7 @@
   <p:timing>
     <p:tnLst>
       <p:par>
-        <p:cTn id="1" dur="indefinite" restart="never" nodeType="tmRoot">
+        <p:cTn xmlns:p14="http://schemas.microsoft.com/office/powerpoint/2010/main" id="1" dur="indefinite" restart="never" nodeType="tmRoot">
           <p:childTnLst>
             <p:seq concurrent="1" nextAc="seek">
               <p:cTn id="2" dur="indefinite" nodeType="mainSeq">
@@ -4236,7 +4802,7 @@
 </p:sld>
 </file>
 
-<file path=ppt/slides/slide11.xml><?xml version="1.0" encoding="utf-8"?>
+<file path=ppt/slides/slide12.xml><?xml version="1.0" encoding="utf-8"?>
 <p:sld xmlns:a="http://schemas.openxmlformats.org/drawingml/2006/main" xmlns:r="http://schemas.openxmlformats.org/officeDocument/2006/relationships" xmlns:p="http://schemas.openxmlformats.org/presentationml/2006/main">
   <p:cSld>
     <p:spTree>
@@ -4630,7 +5196,7 @@
   <p:timing>
     <p:tnLst>
       <p:par>
-        <p:cTn id="1" dur="indefinite" restart="never" nodeType="tmRoot">
+        <p:cTn xmlns:p14="http://schemas.microsoft.com/office/powerpoint/2010/main" id="1" dur="indefinite" restart="never" nodeType="tmRoot">
           <p:childTnLst>
             <p:seq concurrent="1" nextAc="seek">
               <p:cTn id="2" dur="indefinite" nodeType="mainSeq">
@@ -5197,7 +5763,7 @@
   <p:timing>
     <p:tnLst>
       <p:par>
-        <p:cTn id="1" dur="indefinite" restart="never" nodeType="tmRoot">
+        <p:cTn xmlns:p14="http://schemas.microsoft.com/office/powerpoint/2010/main" id="1" dur="indefinite" restart="never" nodeType="tmRoot">
           <p:childTnLst>
             <p:seq concurrent="1" nextAc="seek">
               <p:cTn id="2" dur="indefinite" nodeType="mainSeq">
@@ -5803,7 +6369,7 @@
   <p:timing>
     <p:tnLst>
       <p:par>
-        <p:cTn id="1" dur="indefinite" restart="never" nodeType="tmRoot">
+        <p:cTn xmlns:p14="http://schemas.microsoft.com/office/powerpoint/2010/main" id="1" dur="indefinite" restart="never" nodeType="tmRoot">
           <p:childTnLst>
             <p:seq concurrent="1" nextAc="seek">
               <p:cTn id="2" dur="indefinite" nodeType="mainSeq">
@@ -6385,7 +6951,7 @@
   <p:timing>
     <p:tnLst>
       <p:par>
-        <p:cTn id="1" dur="indefinite" restart="never" nodeType="tmRoot">
+        <p:cTn xmlns:p14="http://schemas.microsoft.com/office/powerpoint/2010/main" id="1" dur="indefinite" restart="never" nodeType="tmRoot">
           <p:childTnLst>
             <p:seq concurrent="1" nextAc="seek">
               <p:cTn id="2" dur="indefinite" nodeType="mainSeq">
@@ -6568,15 +7134,49 @@
           <a:p>
             <a:r>
               <a:rPr lang="en-US" dirty="0" smtClean="0"/>
-              <a:t>Instructions</a:t>
+              <a:t>Single-cycle </a:t>
+            </a:r>
+            <a:r>
+              <a:rPr lang="en-US" dirty="0" err="1" smtClean="0"/>
+              <a:t>datapath</a:t>
             </a:r>
             <a:endParaRPr lang="en-US" dirty="0"/>
           </a:p>
         </p:txBody>
       </p:sp>
-      <p:cxnSp>
-        <p:nvCxnSpPr>
-          <p:cNvPr id="4" name="Straight Connector 3"/>
+      <p:pic>
+        <p:nvPicPr>
+          <p:cNvPr id="8" name="Picture 7" descr="FP-Vector-Datapath.png"/>
+          <p:cNvPicPr>
+            <a:picLocks noChangeAspect="1"/>
+          </p:cNvPicPr>
+          <p:nvPr/>
+        </p:nvPicPr>
+        <p:blipFill>
+          <a:blip r:embed="rId2" cstate="print">
+            <a:extLst>
+              <a:ext uri="{28A0092B-C50C-407E-A947-70E740481C1C}">
+                <a14:useLocalDpi xmlns:a14="http://schemas.microsoft.com/office/drawing/2010/main" val="0"/>
+              </a:ext>
+            </a:extLst>
+          </a:blip>
+          <a:stretch>
+            <a:fillRect/>
+          </a:stretch>
+        </p:blipFill>
+        <p:spPr>
+          <a:xfrm>
+            <a:off x="1936750" y="1405016"/>
+            <a:ext cx="8270875" cy="4772186"/>
+          </a:xfrm>
+          <a:prstGeom prst="rect">
+            <a:avLst/>
+          </a:prstGeom>
+        </p:spPr>
+      </p:pic>
+      <p:cxnSp>
+        <p:nvCxnSpPr>
+          <p:cNvPr id="9" name="Straight Connector 8"/>
           <p:cNvCxnSpPr/>
           <p:nvPr/>
         </p:nvCxnSpPr>
@@ -6606,7 +7206,7 @@
       </p:cxnSp>
       <p:cxnSp>
         <p:nvCxnSpPr>
-          <p:cNvPr id="5" name="Straight Connector 4"/>
+          <p:cNvPr id="10" name="Straight Connector 9"/>
           <p:cNvCxnSpPr/>
           <p:nvPr/>
         </p:nvCxnSpPr>
@@ -6636,7 +7236,7 @@
       </p:cxnSp>
       <p:cxnSp>
         <p:nvCxnSpPr>
-          <p:cNvPr id="6" name="Straight Connector 5"/>
+          <p:cNvPr id="11" name="Straight Connector 10"/>
           <p:cNvCxnSpPr/>
           <p:nvPr/>
         </p:nvCxnSpPr>
@@ -6666,7 +7266,7 @@
       </p:cxnSp>
       <p:cxnSp>
         <p:nvCxnSpPr>
-          <p:cNvPr id="7" name="Straight Connector 6"/>
+          <p:cNvPr id="12" name="Straight Connector 11"/>
           <p:cNvCxnSpPr/>
           <p:nvPr/>
         </p:nvCxnSpPr>
@@ -6696,7 +7296,7 @@
       </p:cxnSp>
       <p:cxnSp>
         <p:nvCxnSpPr>
-          <p:cNvPr id="8" name="Straight Connector 7"/>
+          <p:cNvPr id="13" name="Straight Connector 12"/>
           <p:cNvCxnSpPr/>
           <p:nvPr/>
         </p:nvCxnSpPr>
@@ -6726,7 +7326,7 @@
       </p:cxnSp>
       <p:cxnSp>
         <p:nvCxnSpPr>
-          <p:cNvPr id="9" name="Straight Connector 8"/>
+          <p:cNvPr id="14" name="Straight Connector 13"/>
           <p:cNvCxnSpPr/>
           <p:nvPr/>
         </p:nvCxnSpPr>
@@ -6756,7 +7356,7 @@
       </p:cxnSp>
       <p:cxnSp>
         <p:nvCxnSpPr>
-          <p:cNvPr id="10" name="Straight Connector 9"/>
+          <p:cNvPr id="15" name="Straight Connector 14"/>
           <p:cNvCxnSpPr/>
           <p:nvPr/>
         </p:nvCxnSpPr>
@@ -6786,7 +7386,7 @@
       </p:cxnSp>
       <p:cxnSp>
         <p:nvCxnSpPr>
-          <p:cNvPr id="11" name="Straight Connector 10"/>
+          <p:cNvPr id="16" name="Straight Connector 15"/>
           <p:cNvCxnSpPr/>
           <p:nvPr/>
         </p:nvCxnSpPr>
@@ -6816,7 +7416,7 @@
       </p:cxnSp>
       <p:cxnSp>
         <p:nvCxnSpPr>
-          <p:cNvPr id="12" name="Straight Connector 11"/>
+          <p:cNvPr id="17" name="Straight Connector 16"/>
           <p:cNvCxnSpPr/>
           <p:nvPr/>
         </p:nvCxnSpPr>
@@ -6846,7 +7446,7 @@
       </p:cxnSp>
       <p:sp>
         <p:nvSpPr>
-          <p:cNvPr id="13" name="Oval 12"/>
+          <p:cNvPr id="18" name="Oval 17"/>
           <p:cNvSpPr/>
           <p:nvPr/>
         </p:nvSpPr>
@@ -6896,117 +7496,10 @@
           </a:p>
         </p:txBody>
       </p:sp>
-      <p:sp>
-        <p:nvSpPr>
-          <p:cNvPr id="15" name="Content Placeholder 14"/>
-          <p:cNvSpPr>
-            <a:spLocks noGrp="1"/>
-          </p:cNvSpPr>
-          <p:nvPr>
-            <p:ph idx="1"/>
-          </p:nvPr>
-        </p:nvSpPr>
-        <p:spPr/>
-        <p:txBody>
-          <a:bodyPr/>
-          <a:lstStyle/>
-          <a:p>
-            <a:r>
-              <a:rPr lang="en-US" dirty="0" smtClean="0"/>
-              <a:t>Instructions are </a:t>
-            </a:r>
-          </a:p>
-          <a:p>
-            <a:pPr marL="0" indent="0">
-              <a:buNone/>
-            </a:pPr>
-            <a:r>
-              <a:rPr lang="en-US" dirty="0" smtClean="0"/>
-              <a:t>assigned to </a:t>
-            </a:r>
-          </a:p>
-          <a:p>
-            <a:pPr marL="0" indent="0">
-              <a:buNone/>
-            </a:pPr>
-            <a:r>
-              <a:rPr lang="en-US" dirty="0" smtClean="0"/>
-              <a:t>4-bit numbers</a:t>
-            </a:r>
-          </a:p>
-          <a:p>
-            <a:pPr marL="0" indent="0">
-              <a:buNone/>
-            </a:pPr>
-            <a:endParaRPr lang="en-US" dirty="0" smtClean="0"/>
-          </a:p>
-          <a:p>
-            <a:r>
-              <a:rPr lang="en-US" dirty="0" smtClean="0"/>
-              <a:t>Three types:</a:t>
-            </a:r>
-          </a:p>
-          <a:p>
-            <a:pPr lvl="1"/>
-            <a:r>
-              <a:rPr lang="en-US" dirty="0" smtClean="0"/>
-              <a:t>R-type (Register)</a:t>
-            </a:r>
-          </a:p>
-          <a:p>
-            <a:pPr lvl="1"/>
-            <a:r>
-              <a:rPr lang="en-US" dirty="0" smtClean="0"/>
-              <a:t>I-type (Immediate)</a:t>
-            </a:r>
-          </a:p>
-          <a:p>
-            <a:pPr lvl="1"/>
-            <a:r>
-              <a:rPr lang="en-US" dirty="0" smtClean="0"/>
-              <a:t>J-type (Jump)</a:t>
-            </a:r>
-          </a:p>
-          <a:p>
-            <a:pPr lvl="1"/>
-            <a:endParaRPr lang="en-US" dirty="0"/>
-          </a:p>
-        </p:txBody>
-      </p:sp>
-      <p:pic>
-        <p:nvPicPr>
-          <p:cNvPr id="17" name="Picture 16"/>
-          <p:cNvPicPr>
-            <a:picLocks noChangeAspect="1"/>
-          </p:cNvPicPr>
-          <p:nvPr/>
-        </p:nvPicPr>
-        <p:blipFill>
-          <a:blip r:embed="rId2">
-            <a:extLst>
-              <a:ext uri="{28A0092B-C50C-407E-A947-70E740481C1C}">
-                <a14:useLocalDpi xmlns:a14="http://schemas.microsoft.com/office/drawing/2010/main" val="0"/>
-              </a:ext>
-            </a:extLst>
-          </a:blip>
-          <a:stretch>
-            <a:fillRect/>
-          </a:stretch>
-        </p:blipFill>
-        <p:spPr>
-          <a:xfrm>
-            <a:off x="4342609" y="1576785"/>
-            <a:ext cx="7308213" cy="4587638"/>
-          </a:xfrm>
-          <a:prstGeom prst="rect">
-            <a:avLst/>
-          </a:prstGeom>
-        </p:spPr>
-      </p:pic>
     </p:spTree>
     <p:extLst>
       <p:ext uri="{BB962C8B-B14F-4D97-AF65-F5344CB8AC3E}">
-        <p14:creationId xmlns:p14="http://schemas.microsoft.com/office/powerpoint/2010/main" val="1788683600"/>
+        <p14:creationId xmlns:p14="http://schemas.microsoft.com/office/powerpoint/2010/main" val="1011732554"/>
       </p:ext>
     </p:extLst>
   </p:cSld>
@@ -7016,7 +7509,7 @@
   <p:timing>
     <p:tnLst>
       <p:par>
-        <p:cTn id="1" dur="indefinite" restart="never" nodeType="tmRoot">
+        <p:cTn xmlns:p14="http://schemas.microsoft.com/office/powerpoint/2010/main" id="1" dur="indefinite" restart="never" nodeType="tmRoot">
           <p:childTnLst>
             <p:seq concurrent="1" nextAc="seek">
               <p:cTn id="2" dur="indefinite" nodeType="mainSeq">
@@ -7050,7 +7543,7 @@
                                           </p:stCondLst>
                                         </p:cTn>
                                         <p:tgtEl>
-                                          <p:spTgt spid="13"/>
+                                          <p:spTgt spid="18"/>
                                         </p:tgtEl>
                                         <p:attrNameLst>
                                           <p:attrName>style.visibility</p:attrName>
@@ -7082,7 +7575,7 @@
                                       <p:cBhvr>
                                         <p:cTn id="9" dur="2000" fill="hold"/>
                                         <p:tgtEl>
-                                          <p:spTgt spid="13"/>
+                                          <p:spTgt spid="18"/>
                                         </p:tgtEl>
                                         <p:attrNameLst>
                                           <p:attrName>ppt_x</p:attrName>
@@ -7116,7 +7609,7 @@
                                           </p:stCondLst>
                                         </p:cTn>
                                         <p:tgtEl>
-                                          <p:spTgt spid="13"/>
+                                          <p:spTgt spid="18"/>
                                         </p:tgtEl>
                                         <p:attrNameLst>
                                           <p:attrName>style.visibility</p:attrName>
@@ -7157,9 +7650,9 @@
       </p:par>
     </p:tnLst>
     <p:bldLst>
-      <p:bldP spid="13" grpId="0" animBg="1"/>
-      <p:bldP spid="13" grpId="1" animBg="1"/>
-      <p:bldP spid="13" grpId="2" animBg="1"/>
+      <p:bldP spid="18" grpId="0" animBg="1"/>
+      <p:bldP spid="18" grpId="1" animBg="1"/>
+      <p:bldP spid="18" grpId="2" animBg="1"/>
     </p:bldLst>
   </p:timing>
 </p:sld>
@@ -7199,15 +7692,337 @@
           <a:p>
             <a:r>
               <a:rPr lang="en-US" dirty="0" smtClean="0"/>
-              <a:t>Components (Registers)</a:t>
+              <a:t>Instructions</a:t>
             </a:r>
             <a:endParaRPr lang="en-US" dirty="0"/>
+          </a:p>
+        </p:txBody>
+      </p:sp>
+      <p:cxnSp>
+        <p:nvCxnSpPr>
+          <p:cNvPr id="4" name="Straight Connector 3"/>
+          <p:cNvCxnSpPr/>
+          <p:nvPr/>
+        </p:nvCxnSpPr>
+        <p:spPr>
+          <a:xfrm flipH="1">
+            <a:off x="541178" y="6316824"/>
+            <a:ext cx="11109646" cy="0"/>
+          </a:xfrm>
+          <a:prstGeom prst="line">
+            <a:avLst/>
+          </a:prstGeom>
+        </p:spPr>
+        <p:style>
+          <a:lnRef idx="1">
+            <a:schemeClr val="accent1"/>
+          </a:lnRef>
+          <a:fillRef idx="0">
+            <a:schemeClr val="accent1"/>
+          </a:fillRef>
+          <a:effectRef idx="0">
+            <a:schemeClr val="accent1"/>
+          </a:effectRef>
+          <a:fontRef idx="minor">
+            <a:schemeClr val="tx1"/>
+          </a:fontRef>
+        </p:style>
+      </p:cxnSp>
+      <p:cxnSp>
+        <p:nvCxnSpPr>
+          <p:cNvPr id="5" name="Straight Connector 4"/>
+          <p:cNvCxnSpPr/>
+          <p:nvPr/>
+        </p:nvCxnSpPr>
+        <p:spPr>
+          <a:xfrm flipH="1">
+            <a:off x="723900" y="6469224"/>
+            <a:ext cx="10744200" cy="0"/>
+          </a:xfrm>
+          <a:prstGeom prst="line">
+            <a:avLst/>
+          </a:prstGeom>
+        </p:spPr>
+        <p:style>
+          <a:lnRef idx="1">
+            <a:schemeClr val="accent1"/>
+          </a:lnRef>
+          <a:fillRef idx="0">
+            <a:schemeClr val="accent1"/>
+          </a:fillRef>
+          <a:effectRef idx="0">
+            <a:schemeClr val="accent1"/>
+          </a:effectRef>
+          <a:fontRef idx="minor">
+            <a:schemeClr val="tx1"/>
+          </a:fontRef>
+        </p:style>
+      </p:cxnSp>
+      <p:cxnSp>
+        <p:nvCxnSpPr>
+          <p:cNvPr id="6" name="Straight Connector 5"/>
+          <p:cNvCxnSpPr/>
+          <p:nvPr/>
+        </p:nvCxnSpPr>
+        <p:spPr>
+          <a:xfrm flipH="1">
+            <a:off x="876300" y="6621624"/>
+            <a:ext cx="10378440" cy="0"/>
+          </a:xfrm>
+          <a:prstGeom prst="line">
+            <a:avLst/>
+          </a:prstGeom>
+        </p:spPr>
+        <p:style>
+          <a:lnRef idx="1">
+            <a:schemeClr val="accent1"/>
+          </a:lnRef>
+          <a:fillRef idx="0">
+            <a:schemeClr val="accent1"/>
+          </a:fillRef>
+          <a:effectRef idx="0">
+            <a:schemeClr val="accent1"/>
+          </a:effectRef>
+          <a:fontRef idx="minor">
+            <a:schemeClr val="tx1"/>
+          </a:fontRef>
+        </p:style>
+      </p:cxnSp>
+      <p:cxnSp>
+        <p:nvCxnSpPr>
+          <p:cNvPr id="7" name="Straight Connector 6"/>
+          <p:cNvCxnSpPr/>
+          <p:nvPr/>
+        </p:nvCxnSpPr>
+        <p:spPr>
+          <a:xfrm flipH="1">
+            <a:off x="0" y="6316824"/>
+            <a:ext cx="541178" cy="541176"/>
+          </a:xfrm>
+          <a:prstGeom prst="line">
+            <a:avLst/>
+          </a:prstGeom>
+        </p:spPr>
+        <p:style>
+          <a:lnRef idx="1">
+            <a:schemeClr val="accent1"/>
+          </a:lnRef>
+          <a:fillRef idx="0">
+            <a:schemeClr val="accent1"/>
+          </a:fillRef>
+          <a:effectRef idx="0">
+            <a:schemeClr val="accent1"/>
+          </a:effectRef>
+          <a:fontRef idx="minor">
+            <a:schemeClr val="tx1"/>
+          </a:fontRef>
+        </p:style>
+      </p:cxnSp>
+      <p:cxnSp>
+        <p:nvCxnSpPr>
+          <p:cNvPr id="8" name="Straight Connector 7"/>
+          <p:cNvCxnSpPr/>
+          <p:nvPr/>
+        </p:nvCxnSpPr>
+        <p:spPr>
+          <a:xfrm flipH="1">
+            <a:off x="344846" y="6469224"/>
+            <a:ext cx="379054" cy="388776"/>
+          </a:xfrm>
+          <a:prstGeom prst="line">
+            <a:avLst/>
+          </a:prstGeom>
+        </p:spPr>
+        <p:style>
+          <a:lnRef idx="1">
+            <a:schemeClr val="accent1"/>
+          </a:lnRef>
+          <a:fillRef idx="0">
+            <a:schemeClr val="accent1"/>
+          </a:fillRef>
+          <a:effectRef idx="0">
+            <a:schemeClr val="accent1"/>
+          </a:effectRef>
+          <a:fontRef idx="minor">
+            <a:schemeClr val="tx1"/>
+          </a:fontRef>
+        </p:style>
+      </p:cxnSp>
+      <p:cxnSp>
+        <p:nvCxnSpPr>
+          <p:cNvPr id="9" name="Straight Connector 8"/>
+          <p:cNvCxnSpPr/>
+          <p:nvPr/>
+        </p:nvCxnSpPr>
+        <p:spPr>
+          <a:xfrm flipH="1">
+            <a:off x="657225" y="6621624"/>
+            <a:ext cx="219075" cy="236376"/>
+          </a:xfrm>
+          <a:prstGeom prst="line">
+            <a:avLst/>
+          </a:prstGeom>
+        </p:spPr>
+        <p:style>
+          <a:lnRef idx="1">
+            <a:schemeClr val="accent1"/>
+          </a:lnRef>
+          <a:fillRef idx="0">
+            <a:schemeClr val="accent1"/>
+          </a:fillRef>
+          <a:effectRef idx="0">
+            <a:schemeClr val="accent1"/>
+          </a:effectRef>
+          <a:fontRef idx="minor">
+            <a:schemeClr val="tx1"/>
+          </a:fontRef>
+        </p:style>
+      </p:cxnSp>
+      <p:cxnSp>
+        <p:nvCxnSpPr>
+          <p:cNvPr id="10" name="Straight Connector 9"/>
+          <p:cNvCxnSpPr/>
+          <p:nvPr/>
+        </p:nvCxnSpPr>
+        <p:spPr>
+          <a:xfrm rot="5400000" flipH="1">
+            <a:off x="11650821" y="6316823"/>
+            <a:ext cx="541178" cy="541176"/>
+          </a:xfrm>
+          <a:prstGeom prst="line">
+            <a:avLst/>
+          </a:prstGeom>
+        </p:spPr>
+        <p:style>
+          <a:lnRef idx="1">
+            <a:schemeClr val="accent1"/>
+          </a:lnRef>
+          <a:fillRef idx="0">
+            <a:schemeClr val="accent1"/>
+          </a:fillRef>
+          <a:effectRef idx="0">
+            <a:schemeClr val="accent1"/>
+          </a:effectRef>
+          <a:fontRef idx="minor">
+            <a:schemeClr val="tx1"/>
+          </a:fontRef>
+        </p:style>
+      </p:cxnSp>
+      <p:cxnSp>
+        <p:nvCxnSpPr>
+          <p:cNvPr id="11" name="Straight Connector 10"/>
+          <p:cNvCxnSpPr/>
+          <p:nvPr/>
+        </p:nvCxnSpPr>
+        <p:spPr>
+          <a:xfrm flipH="1" flipV="1">
+            <a:off x="11468100" y="6469223"/>
+            <a:ext cx="396082" cy="388777"/>
+          </a:xfrm>
+          <a:prstGeom prst="line">
+            <a:avLst/>
+          </a:prstGeom>
+        </p:spPr>
+        <p:style>
+          <a:lnRef idx="1">
+            <a:schemeClr val="accent1"/>
+          </a:lnRef>
+          <a:fillRef idx="0">
+            <a:schemeClr val="accent1"/>
+          </a:fillRef>
+          <a:effectRef idx="0">
+            <a:schemeClr val="accent1"/>
+          </a:effectRef>
+          <a:fontRef idx="minor">
+            <a:schemeClr val="tx1"/>
+          </a:fontRef>
+        </p:style>
+      </p:cxnSp>
+      <p:cxnSp>
+        <p:nvCxnSpPr>
+          <p:cNvPr id="12" name="Straight Connector 11"/>
+          <p:cNvCxnSpPr/>
+          <p:nvPr/>
+        </p:nvCxnSpPr>
+        <p:spPr>
+          <a:xfrm flipH="1" flipV="1">
+            <a:off x="11254740" y="6621624"/>
+            <a:ext cx="213360" cy="236376"/>
+          </a:xfrm>
+          <a:prstGeom prst="line">
+            <a:avLst/>
+          </a:prstGeom>
+        </p:spPr>
+        <p:style>
+          <a:lnRef idx="1">
+            <a:schemeClr val="accent1"/>
+          </a:lnRef>
+          <a:fillRef idx="0">
+            <a:schemeClr val="accent1"/>
+          </a:fillRef>
+          <a:effectRef idx="0">
+            <a:schemeClr val="accent1"/>
+          </a:effectRef>
+          <a:fontRef idx="minor">
+            <a:schemeClr val="tx1"/>
+          </a:fontRef>
+        </p:style>
+      </p:cxnSp>
+      <p:sp>
+        <p:nvSpPr>
+          <p:cNvPr id="13" name="Oval 12"/>
+          <p:cNvSpPr/>
+          <p:nvPr/>
+        </p:nvSpPr>
+        <p:spPr>
+          <a:xfrm>
+            <a:off x="0" y="6724650"/>
+            <a:ext cx="121879" cy="133350"/>
+          </a:xfrm>
+          <a:prstGeom prst="ellipse">
+            <a:avLst/>
+          </a:prstGeom>
+          <a:solidFill>
+            <a:schemeClr val="tx1"/>
+          </a:solidFill>
+          <a:effectLst>
+            <a:glow rad="63500">
+              <a:schemeClr val="accent1">
+                <a:satMod val="175000"/>
+                <a:alpha val="40000"/>
+              </a:schemeClr>
+            </a:glow>
+            <a:softEdge rad="31750"/>
+          </a:effectLst>
+        </p:spPr>
+        <p:style>
+          <a:lnRef idx="2">
+            <a:schemeClr val="accent1">
+              <a:shade val="50000"/>
+            </a:schemeClr>
+          </a:lnRef>
+          <a:fillRef idx="1">
+            <a:schemeClr val="accent1"/>
+          </a:fillRef>
+          <a:effectRef idx="0">
+            <a:schemeClr val="accent1"/>
+          </a:effectRef>
+          <a:fontRef idx="minor">
+            <a:schemeClr val="lt1"/>
+          </a:fontRef>
+        </p:style>
+        <p:txBody>
+          <a:bodyPr rtlCol="0" anchor="ctr"/>
+          <a:lstStyle/>
+          <a:p>
+            <a:pPr algn="ctr"/>
+            <a:endParaRPr lang="en-US"/>
           </a:p>
         </p:txBody>
       </p:sp>
       <p:sp>
         <p:nvSpPr>
-          <p:cNvPr id="3" name="Content Placeholder 2"/>
+          <p:cNvPr id="15" name="Content Placeholder 14"/>
           <p:cNvSpPr>
             <a:spLocks noGrp="1"/>
           </p:cNvSpPr>
@@ -7222,7 +8037,7 @@
           <a:p>
             <a:r>
               <a:rPr lang="en-US" dirty="0" smtClean="0"/>
-              <a:t>This CPU has 4 registers identified </a:t>
+              <a:t>Instructions are </a:t>
             </a:r>
           </a:p>
           <a:p>
@@ -7231,7 +8046,7 @@
             </a:pPr>
             <a:r>
               <a:rPr lang="en-US" dirty="0" smtClean="0"/>
-              <a:t>by 2-bits: 00, 01, 10, 11 for </a:t>
+              <a:t>assigned to </a:t>
             </a:r>
           </a:p>
           <a:p>
@@ -7240,7 +8055,7 @@
             </a:pPr>
             <a:r>
               <a:rPr lang="en-US" dirty="0" smtClean="0"/>
-              <a:t>$0, $1, $2, $3.</a:t>
+              <a:t>4-bit numbers</a:t>
             </a:r>
           </a:p>
           <a:p>
@@ -7252,357 +8067,53 @@
           <a:p>
             <a:r>
               <a:rPr lang="en-US" dirty="0" smtClean="0"/>
-              <a:t>$0 is read-only for the value 0.</a:t>
-            </a:r>
-          </a:p>
-        </p:txBody>
-      </p:sp>
-      <p:cxnSp>
-        <p:nvCxnSpPr>
-          <p:cNvPr id="4" name="Straight Connector 3"/>
-          <p:cNvCxnSpPr/>
-          <p:nvPr/>
-        </p:nvCxnSpPr>
-        <p:spPr>
-          <a:xfrm flipH="1">
-            <a:off x="541178" y="6316824"/>
-            <a:ext cx="11109646" cy="0"/>
-          </a:xfrm>
-          <a:prstGeom prst="line">
-            <a:avLst/>
-          </a:prstGeom>
-        </p:spPr>
-        <p:style>
-          <a:lnRef idx="1">
-            <a:schemeClr val="accent1"/>
-          </a:lnRef>
-          <a:fillRef idx="0">
-            <a:schemeClr val="accent1"/>
-          </a:fillRef>
-          <a:effectRef idx="0">
-            <a:schemeClr val="accent1"/>
-          </a:effectRef>
-          <a:fontRef idx="minor">
-            <a:schemeClr val="tx1"/>
-          </a:fontRef>
-        </p:style>
-      </p:cxnSp>
-      <p:cxnSp>
-        <p:nvCxnSpPr>
-          <p:cNvPr id="5" name="Straight Connector 4"/>
-          <p:cNvCxnSpPr/>
-          <p:nvPr/>
-        </p:nvCxnSpPr>
-        <p:spPr>
-          <a:xfrm flipH="1">
-            <a:off x="723900" y="6469224"/>
-            <a:ext cx="10744200" cy="0"/>
-          </a:xfrm>
-          <a:prstGeom prst="line">
-            <a:avLst/>
-          </a:prstGeom>
-        </p:spPr>
-        <p:style>
-          <a:lnRef idx="1">
-            <a:schemeClr val="accent1"/>
-          </a:lnRef>
-          <a:fillRef idx="0">
-            <a:schemeClr val="accent1"/>
-          </a:fillRef>
-          <a:effectRef idx="0">
-            <a:schemeClr val="accent1"/>
-          </a:effectRef>
-          <a:fontRef idx="minor">
-            <a:schemeClr val="tx1"/>
-          </a:fontRef>
-        </p:style>
-      </p:cxnSp>
-      <p:cxnSp>
-        <p:nvCxnSpPr>
-          <p:cNvPr id="6" name="Straight Connector 5"/>
-          <p:cNvCxnSpPr/>
-          <p:nvPr/>
-        </p:nvCxnSpPr>
-        <p:spPr>
-          <a:xfrm flipH="1">
-            <a:off x="876300" y="6621624"/>
-            <a:ext cx="10378440" cy="0"/>
-          </a:xfrm>
-          <a:prstGeom prst="line">
-            <a:avLst/>
-          </a:prstGeom>
-        </p:spPr>
-        <p:style>
-          <a:lnRef idx="1">
-            <a:schemeClr val="accent1"/>
-          </a:lnRef>
-          <a:fillRef idx="0">
-            <a:schemeClr val="accent1"/>
-          </a:fillRef>
-          <a:effectRef idx="0">
-            <a:schemeClr val="accent1"/>
-          </a:effectRef>
-          <a:fontRef idx="minor">
-            <a:schemeClr val="tx1"/>
-          </a:fontRef>
-        </p:style>
-      </p:cxnSp>
-      <p:cxnSp>
-        <p:nvCxnSpPr>
-          <p:cNvPr id="7" name="Straight Connector 6"/>
-          <p:cNvCxnSpPr/>
-          <p:nvPr/>
-        </p:nvCxnSpPr>
-        <p:spPr>
-          <a:xfrm flipH="1">
-            <a:off x="0" y="6316824"/>
-            <a:ext cx="541178" cy="541176"/>
-          </a:xfrm>
-          <a:prstGeom prst="line">
-            <a:avLst/>
-          </a:prstGeom>
-        </p:spPr>
-        <p:style>
-          <a:lnRef idx="1">
-            <a:schemeClr val="accent1"/>
-          </a:lnRef>
-          <a:fillRef idx="0">
-            <a:schemeClr val="accent1"/>
-          </a:fillRef>
-          <a:effectRef idx="0">
-            <a:schemeClr val="accent1"/>
-          </a:effectRef>
-          <a:fontRef idx="minor">
-            <a:schemeClr val="tx1"/>
-          </a:fontRef>
-        </p:style>
-      </p:cxnSp>
-      <p:cxnSp>
-        <p:nvCxnSpPr>
-          <p:cNvPr id="8" name="Straight Connector 7"/>
-          <p:cNvCxnSpPr/>
-          <p:nvPr/>
-        </p:nvCxnSpPr>
-        <p:spPr>
-          <a:xfrm flipH="1">
-            <a:off x="344846" y="6469224"/>
-            <a:ext cx="379054" cy="388776"/>
-          </a:xfrm>
-          <a:prstGeom prst="line">
-            <a:avLst/>
-          </a:prstGeom>
-        </p:spPr>
-        <p:style>
-          <a:lnRef idx="1">
-            <a:schemeClr val="accent1"/>
-          </a:lnRef>
-          <a:fillRef idx="0">
-            <a:schemeClr val="accent1"/>
-          </a:fillRef>
-          <a:effectRef idx="0">
-            <a:schemeClr val="accent1"/>
-          </a:effectRef>
-          <a:fontRef idx="minor">
-            <a:schemeClr val="tx1"/>
-          </a:fontRef>
-        </p:style>
-      </p:cxnSp>
-      <p:cxnSp>
-        <p:nvCxnSpPr>
-          <p:cNvPr id="9" name="Straight Connector 8"/>
-          <p:cNvCxnSpPr/>
-          <p:nvPr/>
-        </p:nvCxnSpPr>
-        <p:spPr>
-          <a:xfrm flipH="1">
-            <a:off x="657225" y="6621624"/>
-            <a:ext cx="219075" cy="236376"/>
-          </a:xfrm>
-          <a:prstGeom prst="line">
-            <a:avLst/>
-          </a:prstGeom>
-        </p:spPr>
-        <p:style>
-          <a:lnRef idx="1">
-            <a:schemeClr val="accent1"/>
-          </a:lnRef>
-          <a:fillRef idx="0">
-            <a:schemeClr val="accent1"/>
-          </a:fillRef>
-          <a:effectRef idx="0">
-            <a:schemeClr val="accent1"/>
-          </a:effectRef>
-          <a:fontRef idx="minor">
-            <a:schemeClr val="tx1"/>
-          </a:fontRef>
-        </p:style>
-      </p:cxnSp>
-      <p:cxnSp>
-        <p:nvCxnSpPr>
-          <p:cNvPr id="10" name="Straight Connector 9"/>
-          <p:cNvCxnSpPr/>
-          <p:nvPr/>
-        </p:nvCxnSpPr>
-        <p:spPr>
-          <a:xfrm rot="5400000" flipH="1">
-            <a:off x="11650821" y="6316823"/>
-            <a:ext cx="541178" cy="541176"/>
-          </a:xfrm>
-          <a:prstGeom prst="line">
-            <a:avLst/>
-          </a:prstGeom>
-        </p:spPr>
-        <p:style>
-          <a:lnRef idx="1">
-            <a:schemeClr val="accent1"/>
-          </a:lnRef>
-          <a:fillRef idx="0">
-            <a:schemeClr val="accent1"/>
-          </a:fillRef>
-          <a:effectRef idx="0">
-            <a:schemeClr val="accent1"/>
-          </a:effectRef>
-          <a:fontRef idx="minor">
-            <a:schemeClr val="tx1"/>
-          </a:fontRef>
-        </p:style>
-      </p:cxnSp>
-      <p:cxnSp>
-        <p:nvCxnSpPr>
-          <p:cNvPr id="11" name="Straight Connector 10"/>
-          <p:cNvCxnSpPr/>
-          <p:nvPr/>
-        </p:nvCxnSpPr>
-        <p:spPr>
-          <a:xfrm flipH="1" flipV="1">
-            <a:off x="11468100" y="6469223"/>
-            <a:ext cx="396082" cy="388777"/>
-          </a:xfrm>
-          <a:prstGeom prst="line">
-            <a:avLst/>
-          </a:prstGeom>
-        </p:spPr>
-        <p:style>
-          <a:lnRef idx="1">
-            <a:schemeClr val="accent1"/>
-          </a:lnRef>
-          <a:fillRef idx="0">
-            <a:schemeClr val="accent1"/>
-          </a:fillRef>
-          <a:effectRef idx="0">
-            <a:schemeClr val="accent1"/>
-          </a:effectRef>
-          <a:fontRef idx="minor">
-            <a:schemeClr val="tx1"/>
-          </a:fontRef>
-        </p:style>
-      </p:cxnSp>
-      <p:cxnSp>
-        <p:nvCxnSpPr>
-          <p:cNvPr id="12" name="Straight Connector 11"/>
-          <p:cNvCxnSpPr/>
-          <p:nvPr/>
-        </p:nvCxnSpPr>
-        <p:spPr>
-          <a:xfrm flipH="1" flipV="1">
-            <a:off x="11254740" y="6621624"/>
-            <a:ext cx="213360" cy="236376"/>
-          </a:xfrm>
-          <a:prstGeom prst="line">
-            <a:avLst/>
-          </a:prstGeom>
-        </p:spPr>
-        <p:style>
-          <a:lnRef idx="1">
-            <a:schemeClr val="accent1"/>
-          </a:lnRef>
-          <a:fillRef idx="0">
-            <a:schemeClr val="accent1"/>
-          </a:fillRef>
-          <a:effectRef idx="0">
-            <a:schemeClr val="accent1"/>
-          </a:effectRef>
-          <a:fontRef idx="minor">
-            <a:schemeClr val="tx1"/>
-          </a:fontRef>
-        </p:style>
-      </p:cxnSp>
-      <p:sp>
-        <p:nvSpPr>
-          <p:cNvPr id="13" name="Oval 12"/>
-          <p:cNvSpPr/>
-          <p:nvPr/>
-        </p:nvSpPr>
-        <p:spPr>
-          <a:xfrm>
-            <a:off x="0" y="6724650"/>
-            <a:ext cx="121879" cy="133350"/>
-          </a:xfrm>
-          <a:prstGeom prst="ellipse">
-            <a:avLst/>
-          </a:prstGeom>
-          <a:solidFill>
-            <a:schemeClr val="tx1"/>
-          </a:solidFill>
-          <a:effectLst>
-            <a:glow rad="63500">
-              <a:schemeClr val="accent1">
-                <a:satMod val="175000"/>
-                <a:alpha val="40000"/>
-              </a:schemeClr>
-            </a:glow>
-            <a:softEdge rad="31750"/>
-          </a:effectLst>
-        </p:spPr>
-        <p:style>
-          <a:lnRef idx="2">
-            <a:schemeClr val="accent1">
-              <a:shade val="50000"/>
-            </a:schemeClr>
-          </a:lnRef>
-          <a:fillRef idx="1">
-            <a:schemeClr val="accent1"/>
-          </a:fillRef>
-          <a:effectRef idx="0">
-            <a:schemeClr val="accent1"/>
-          </a:effectRef>
-          <a:fontRef idx="minor">
-            <a:schemeClr val="lt1"/>
-          </a:fontRef>
-        </p:style>
-        <p:txBody>
-          <a:bodyPr rtlCol="0" anchor="ctr"/>
-          <a:lstStyle/>
-          <a:p>
-            <a:pPr algn="ctr"/>
-            <a:endParaRPr lang="en-US"/>
+              <a:t>Three types:</a:t>
+            </a:r>
+          </a:p>
+          <a:p>
+            <a:pPr lvl="1"/>
+            <a:r>
+              <a:rPr lang="en-US" dirty="0" smtClean="0"/>
+              <a:t>R-type (Register)</a:t>
+            </a:r>
+          </a:p>
+          <a:p>
+            <a:pPr lvl="1"/>
+            <a:r>
+              <a:rPr lang="en-US" dirty="0" smtClean="0"/>
+              <a:t>I-type (Immediate)</a:t>
+            </a:r>
+          </a:p>
+          <a:p>
+            <a:pPr lvl="1"/>
+            <a:r>
+              <a:rPr lang="en-US" dirty="0" smtClean="0"/>
+              <a:t>J-type (Jump)</a:t>
+            </a:r>
+          </a:p>
+          <a:p>
+            <a:pPr lvl="1"/>
+            <a:endParaRPr lang="en-US" dirty="0"/>
           </a:p>
         </p:txBody>
       </p:sp>
       <p:pic>
         <p:nvPicPr>
-          <p:cNvPr id="15" name="Picture 14"/>
+          <p:cNvPr id="3" name="Picture 2"/>
           <p:cNvPicPr>
             <a:picLocks noChangeAspect="1"/>
           </p:cNvPicPr>
           <p:nvPr/>
         </p:nvPicPr>
-        <p:blipFill>
-          <a:blip r:embed="rId2">
-            <a:extLst>
-              <a:ext uri="{28A0092B-C50C-407E-A947-70E740481C1C}">
-                <a14:useLocalDpi xmlns:a14="http://schemas.microsoft.com/office/drawing/2010/main" val="0"/>
-              </a:ext>
-            </a:extLst>
-          </a:blip>
-          <a:stretch>
-            <a:fillRect/>
-          </a:stretch>
+        <p:blipFill rotWithShape="1">
+          <a:blip r:embed="rId2"/>
+          <a:srcRect r="2500" b="5439"/>
+          <a:stretch/>
         </p:blipFill>
         <p:spPr>
           <a:xfrm>
-            <a:off x="6159732" y="1825624"/>
-            <a:ext cx="5491090" cy="4046476"/>
+            <a:off x="5572125" y="593725"/>
+            <a:ext cx="5943600" cy="5212080"/>
           </a:xfrm>
           <a:prstGeom prst="rect">
             <a:avLst/>
@@ -7612,7 +8123,7 @@
     </p:spTree>
     <p:extLst>
       <p:ext uri="{BB962C8B-B14F-4D97-AF65-F5344CB8AC3E}">
-        <p14:creationId xmlns:p14="http://schemas.microsoft.com/office/powerpoint/2010/main" val="3469625977"/>
+        <p14:creationId xmlns:p14="http://schemas.microsoft.com/office/powerpoint/2010/main" val="1788683600"/>
       </p:ext>
     </p:extLst>
   </p:cSld>
@@ -7622,7 +8133,7 @@
   <p:timing>
     <p:tnLst>
       <p:par>
-        <p:cTn id="1" dur="indefinite" restart="never" nodeType="tmRoot">
+        <p:cTn xmlns:p14="http://schemas.microsoft.com/office/powerpoint/2010/main" id="1" dur="indefinite" restart="never" nodeType="tmRoot">
           <p:childTnLst>
             <p:seq concurrent="1" nextAc="seek">
               <p:cTn id="2" dur="indefinite" nodeType="mainSeq">
@@ -7805,7 +8316,7 @@
           <a:p>
             <a:r>
               <a:rPr lang="en-US" dirty="0" smtClean="0"/>
-              <a:t>Components (ALU)</a:t>
+              <a:t>Components (Registers)</a:t>
             </a:r>
             <a:endParaRPr lang="en-US" dirty="0"/>
           </a:p>
@@ -7828,27 +8339,38 @@
           <a:p>
             <a:r>
               <a:rPr lang="en-US" dirty="0" smtClean="0"/>
-              <a:t>Workhorse of the CPU</a:t>
-            </a:r>
-          </a:p>
-          <a:p>
+              <a:t>This CPU has 4 registers identified </a:t>
+            </a:r>
+          </a:p>
+          <a:p>
+            <a:pPr marL="0" indent="0">
+              <a:buNone/>
+            </a:pPr>
+            <a:r>
+              <a:rPr lang="en-US" dirty="0" smtClean="0"/>
+              <a:t>by 2-bits: 00, 01, 10, 11 for </a:t>
+            </a:r>
+          </a:p>
+          <a:p>
+            <a:pPr marL="0" indent="0">
+              <a:buNone/>
+            </a:pPr>
+            <a:r>
+              <a:rPr lang="en-US" dirty="0" smtClean="0"/>
+              <a:t>$0, $1, $2, $3.</a:t>
+            </a:r>
+          </a:p>
+          <a:p>
+            <a:pPr marL="0" indent="0">
+              <a:buNone/>
+            </a:pPr>
             <a:endParaRPr lang="en-US" dirty="0" smtClean="0"/>
           </a:p>
           <a:p>
             <a:r>
               <a:rPr lang="en-US" dirty="0" smtClean="0"/>
-              <a:t>Strings together 16 separate 1-bit ALU’s to handle 16-bit data</a:t>
-            </a:r>
-          </a:p>
-          <a:p>
-            <a:endParaRPr lang="en-US" dirty="0"/>
-          </a:p>
-          <a:p>
-            <a:r>
-              <a:rPr lang="en-US" dirty="0" smtClean="0"/>
-              <a:t>Requires a unique significant bit ALU when chaining</a:t>
-            </a:r>
-            <a:endParaRPr lang="en-US" dirty="0"/>
+              <a:t>$0 is read-only for the value 0.</a:t>
+            </a:r>
           </a:p>
         </p:txBody>
       </p:sp>
@@ -8174,10 +8696,40 @@
           </a:p>
         </p:txBody>
       </p:sp>
+      <p:pic>
+        <p:nvPicPr>
+          <p:cNvPr id="15" name="Picture 14"/>
+          <p:cNvPicPr>
+            <a:picLocks noChangeAspect="1"/>
+          </p:cNvPicPr>
+          <p:nvPr/>
+        </p:nvPicPr>
+        <p:blipFill>
+          <a:blip r:embed="rId2">
+            <a:extLst>
+              <a:ext uri="{28A0092B-C50C-407E-A947-70E740481C1C}">
+                <a14:useLocalDpi xmlns:a14="http://schemas.microsoft.com/office/drawing/2010/main" val="0"/>
+              </a:ext>
+            </a:extLst>
+          </a:blip>
+          <a:stretch>
+            <a:fillRect/>
+          </a:stretch>
+        </p:blipFill>
+        <p:spPr>
+          <a:xfrm>
+            <a:off x="6159732" y="1825624"/>
+            <a:ext cx="5491090" cy="4046476"/>
+          </a:xfrm>
+          <a:prstGeom prst="rect">
+            <a:avLst/>
+          </a:prstGeom>
+        </p:spPr>
+      </p:pic>
     </p:spTree>
     <p:extLst>
       <p:ext uri="{BB962C8B-B14F-4D97-AF65-F5344CB8AC3E}">
-        <p14:creationId xmlns:p14="http://schemas.microsoft.com/office/powerpoint/2010/main" val="727768195"/>
+        <p14:creationId xmlns:p14="http://schemas.microsoft.com/office/powerpoint/2010/main" val="3469625977"/>
       </p:ext>
     </p:extLst>
   </p:cSld>
@@ -8187,7 +8739,7 @@
   <p:timing>
     <p:tnLst>
       <p:par>
-        <p:cTn id="1" dur="indefinite" restart="never" nodeType="tmRoot">
+        <p:cTn xmlns:p14="http://schemas.microsoft.com/office/powerpoint/2010/main" id="1" dur="indefinite" restart="never" nodeType="tmRoot">
           <p:childTnLst>
             <p:seq concurrent="1" nextAc="seek">
               <p:cTn id="2" dur="indefinite" nodeType="mainSeq">
@@ -8370,7 +8922,7 @@
           <a:p>
             <a:r>
               <a:rPr lang="en-US" dirty="0" smtClean="0"/>
-              <a:t>Components (Data Memory)</a:t>
+              <a:t>Components (ALU)</a:t>
             </a:r>
             <a:endParaRPr lang="en-US" dirty="0"/>
           </a:p>
@@ -8393,7 +8945,16 @@
           <a:p>
             <a:r>
               <a:rPr lang="en-US" dirty="0" smtClean="0"/>
-              <a:t>16-bit storage locations</a:t>
+              <a:t>Workhorse of the CPU</a:t>
+            </a:r>
+          </a:p>
+          <a:p>
+            <a:endParaRPr lang="en-US" dirty="0" smtClean="0"/>
+          </a:p>
+          <a:p>
+            <a:r>
+              <a:rPr lang="en-US" dirty="0" smtClean="0"/>
+              <a:t>Strings together 16 separate 1-bit ALU’s to handle 16-bit data</a:t>
             </a:r>
           </a:p>
           <a:p>
@@ -8402,29 +8963,8 @@
           <a:p>
             <a:r>
               <a:rPr lang="en-US" dirty="0" smtClean="0"/>
-              <a:t>Internally stored as an array</a:t>
-            </a:r>
-          </a:p>
-          <a:p>
-            <a:endParaRPr lang="en-US" dirty="0" smtClean="0"/>
-          </a:p>
-          <a:p>
-            <a:r>
-              <a:rPr lang="en-US" dirty="0" smtClean="0"/>
-              <a:t>Can store up to 1024 </a:t>
-            </a:r>
-          </a:p>
-          <a:p>
-            <a:pPr marL="0" indent="0">
-              <a:buNone/>
-            </a:pPr>
-            <a:r>
-              <a:rPr lang="en-US" dirty="0" smtClean="0"/>
-              <a:t>pieces of data</a:t>
-            </a:r>
-            <a:endParaRPr lang="en-US" dirty="0"/>
-          </a:p>
-          <a:p>
+              <a:t>Requires a unique significant bit ALU when chaining</a:t>
+            </a:r>
             <a:endParaRPr lang="en-US" dirty="0"/>
           </a:p>
         </p:txBody>
@@ -8751,40 +9291,10 @@
           </a:p>
         </p:txBody>
       </p:sp>
-      <p:pic>
-        <p:nvPicPr>
-          <p:cNvPr id="16" name="Picture 15"/>
-          <p:cNvPicPr>
-            <a:picLocks noChangeAspect="1"/>
-          </p:cNvPicPr>
-          <p:nvPr/>
-        </p:nvPicPr>
-        <p:blipFill>
-          <a:blip r:embed="rId2">
-            <a:extLst>
-              <a:ext uri="{28A0092B-C50C-407E-A947-70E740481C1C}">
-                <a14:useLocalDpi xmlns:a14="http://schemas.microsoft.com/office/drawing/2010/main" val="0"/>
-              </a:ext>
-            </a:extLst>
-          </a:blip>
-          <a:stretch>
-            <a:fillRect/>
-          </a:stretch>
-        </p:blipFill>
-        <p:spPr>
-          <a:xfrm>
-            <a:off x="5940407" y="1825624"/>
-            <a:ext cx="5710415" cy="3952582"/>
-          </a:xfrm>
-          <a:prstGeom prst="rect">
-            <a:avLst/>
-          </a:prstGeom>
-        </p:spPr>
-      </p:pic>
     </p:spTree>
     <p:extLst>
       <p:ext uri="{BB962C8B-B14F-4D97-AF65-F5344CB8AC3E}">
-        <p14:creationId xmlns:p14="http://schemas.microsoft.com/office/powerpoint/2010/main" val="3611513497"/>
+        <p14:creationId xmlns:p14="http://schemas.microsoft.com/office/powerpoint/2010/main" val="727768195"/>
       </p:ext>
     </p:extLst>
   </p:cSld>
@@ -8794,7 +9304,7 @@
   <p:timing>
     <p:tnLst>
       <p:par>
-        <p:cTn id="1" dur="indefinite" restart="never" nodeType="tmRoot">
+        <p:cTn xmlns:p14="http://schemas.microsoft.com/office/powerpoint/2010/main" id="1" dur="indefinite" restart="never" nodeType="tmRoot">
           <p:childTnLst>
             <p:seq concurrent="1" nextAc="seek">
               <p:cTn id="2" dur="indefinite" nodeType="mainSeq">
@@ -8977,7 +9487,7 @@
           <a:p>
             <a:r>
               <a:rPr lang="en-US" dirty="0" smtClean="0"/>
-              <a:t>Components (Pipelines)</a:t>
+              <a:t>Components (Data Memory)</a:t>
             </a:r>
             <a:endParaRPr lang="en-US" dirty="0"/>
           </a:p>
@@ -9000,7 +9510,7 @@
           <a:p>
             <a:r>
               <a:rPr lang="en-US" dirty="0" smtClean="0"/>
-              <a:t>Monitors the CPU during each cycle</a:t>
+              <a:t>16-bit storage locations</a:t>
             </a:r>
           </a:p>
           <a:p>
@@ -9009,17 +9519,29 @@
           <a:p>
             <a:r>
               <a:rPr lang="en-US" dirty="0" smtClean="0"/>
-              <a:t>Stores the results of each cycle to reduce hazards (called forwarding)</a:t>
-            </a:r>
-          </a:p>
-          <a:p>
+              <a:t>Internally stored as an array</a:t>
+            </a:r>
+          </a:p>
+          <a:p>
+            <a:endParaRPr lang="en-US" dirty="0" smtClean="0"/>
+          </a:p>
+          <a:p>
+            <a:r>
+              <a:rPr lang="en-US" dirty="0" smtClean="0"/>
+              <a:t>Can store up to 1024 </a:t>
+            </a:r>
+          </a:p>
+          <a:p>
+            <a:pPr marL="0" indent="0">
+              <a:buNone/>
+            </a:pPr>
+            <a:r>
+              <a:rPr lang="en-US" dirty="0" smtClean="0"/>
+              <a:t>pieces of data</a:t>
+            </a:r>
             <a:endParaRPr lang="en-US" dirty="0"/>
           </a:p>
           <a:p>
-            <a:r>
-              <a:rPr lang="en-US" dirty="0" smtClean="0"/>
-              <a:t>Makes for a more efficient process</a:t>
-            </a:r>
             <a:endParaRPr lang="en-US" dirty="0"/>
           </a:p>
         </p:txBody>
@@ -9346,10 +9868,40 @@
           </a:p>
         </p:txBody>
       </p:sp>
+      <p:pic>
+        <p:nvPicPr>
+          <p:cNvPr id="16" name="Picture 15"/>
+          <p:cNvPicPr>
+            <a:picLocks noChangeAspect="1"/>
+          </p:cNvPicPr>
+          <p:nvPr/>
+        </p:nvPicPr>
+        <p:blipFill>
+          <a:blip r:embed="rId2">
+            <a:extLst>
+              <a:ext uri="{28A0092B-C50C-407E-A947-70E740481C1C}">
+                <a14:useLocalDpi xmlns:a14="http://schemas.microsoft.com/office/drawing/2010/main" val="0"/>
+              </a:ext>
+            </a:extLst>
+          </a:blip>
+          <a:stretch>
+            <a:fillRect/>
+          </a:stretch>
+        </p:blipFill>
+        <p:spPr>
+          <a:xfrm>
+            <a:off x="5940407" y="1825624"/>
+            <a:ext cx="5710415" cy="3952582"/>
+          </a:xfrm>
+          <a:prstGeom prst="rect">
+            <a:avLst/>
+          </a:prstGeom>
+        </p:spPr>
+      </p:pic>
     </p:spTree>
     <p:extLst>
       <p:ext uri="{BB962C8B-B14F-4D97-AF65-F5344CB8AC3E}">
-        <p14:creationId xmlns:p14="http://schemas.microsoft.com/office/powerpoint/2010/main" val="1428999865"/>
+        <p14:creationId xmlns:p14="http://schemas.microsoft.com/office/powerpoint/2010/main" val="3611513497"/>
       </p:ext>
     </p:extLst>
   </p:cSld>
@@ -9359,7 +9911,7 @@
   <p:timing>
     <p:tnLst>
       <p:par>
-        <p:cTn id="1" dur="indefinite" restart="never" nodeType="tmRoot">
+        <p:cTn xmlns:p14="http://schemas.microsoft.com/office/powerpoint/2010/main" id="1" dur="indefinite" restart="never" nodeType="tmRoot">
           <p:childTnLst>
             <p:seq concurrent="1" nextAc="seek">
               <p:cTn id="2" dur="indefinite" nodeType="mainSeq">
@@ -9551,7 +10103,7 @@
     </a:clrScheme>
     <a:fontScheme name="Office Theme">
       <a:majorFont>
-        <a:latin typeface="Calibri Light" panose="020F0302020204030204"/>
+        <a:latin typeface="Calibri Light"/>
         <a:ea typeface=""/>
         <a:cs typeface=""/>
         <a:font script="Jpan" typeface="ＭＳ Ｐゴシック"/>
@@ -9586,7 +10138,7 @@
         <a:font script="Geor" typeface="Sylfaen"/>
       </a:majorFont>
       <a:minorFont>
-        <a:latin typeface="Calibri" panose="020F0502020204030204"/>
+        <a:latin typeface="Calibri"/>
         <a:ea typeface=""/>
         <a:cs typeface=""/>
         <a:font script="Jpan" typeface="ＭＳ Ｐゴシック"/>
@@ -9763,7 +10315,7 @@
   <a:extraClrSchemeLst/>
   <a:extLst>
     <a:ext uri="{05A4C25C-085E-4340-85A3-A5531E510DB2}">
-      <thm15:themeFamily xmlns:thm15="http://schemas.microsoft.com/office/thememl/2012/main" name="Office Theme" id="{62F939B6-93AF-4DB8-9C6B-D6C7DFDC589F}" vid="{4F46216B-77A9-411A-B9D3-5023FCB70208}"/>
+      <thm15:themeFamily xmlns:thm15="http://schemas.microsoft.com/office/thememl/2012/main" xmlns="" name="Office Theme" id="{62F939B6-93AF-4DB8-9C6B-D6C7DFDC589F}" vid="{4F46216B-77A9-411A-B9D3-5023FCB70208}"/>
     </a:ext>
   </a:extLst>
 </a:theme>

</xml_diff>

<commit_message>
Final: Fixed register comments and presentation.
Changed 'single cycle datapath' label in presentation slide to
'final cpu datapath'. Fixed mentions of '$t1' to '$1'.

Still needs fixing the nops between addi instructions where no
hazards were present.
</commit_message>
<xml_diff>
--- a/Source Files/Final/CPU Architecture.pptx
+++ b/Source Files/Final/CPU Architecture.pptx
@@ -117,7 +117,7 @@
   </p:defaultTextStyle>
   <p:extLst>
     <p:ext uri="{EFAFB233-063F-42B5-8137-9DF3F51BA10A}">
-      <p15:sldGuideLst xmlns:p15="http://schemas.microsoft.com/office/powerpoint/2012/main" xmlns=""/>
+      <p15:sldGuideLst xmlns="" xmlns:p15="http://schemas.microsoft.com/office/powerpoint/2012/main"/>
     </p:ext>
   </p:extLst>
 </p:presentation>
@@ -314,7 +314,7 @@
   </p:clrMapOvr>
   <p:extLst>
     <p:ext uri="{DCECCB84-F9BA-43D5-87BE-67443E8EF086}">
-      <p15:sldGuideLst xmlns:p15="http://schemas.microsoft.com/office/powerpoint/2012/main" xmlns=""/>
+      <p15:sldGuideLst xmlns="" xmlns:p15="http://schemas.microsoft.com/office/powerpoint/2012/main"/>
     </p:ext>
   </p:extLst>
 </p:sldLayout>
@@ -669,7 +669,7 @@
   </p:clrMapOvr>
   <p:extLst>
     <p:ext uri="{DCECCB84-F9BA-43D5-87BE-67443E8EF086}">
-      <p15:sldGuideLst xmlns:p15="http://schemas.microsoft.com/office/powerpoint/2012/main" xmlns=""/>
+      <p15:sldGuideLst xmlns="" xmlns:p15="http://schemas.microsoft.com/office/powerpoint/2012/main"/>
     </p:ext>
   </p:extLst>
 </p:sldLayout>
@@ -1090,7 +1090,7 @@
   </p:clrMapOvr>
   <p:extLst>
     <p:ext uri="{DCECCB84-F9BA-43D5-87BE-67443E8EF086}">
-      <p15:sldGuideLst xmlns:p15="http://schemas.microsoft.com/office/powerpoint/2012/main" xmlns=""/>
+      <p15:sldGuideLst xmlns="" xmlns:p15="http://schemas.microsoft.com/office/powerpoint/2012/main"/>
     </p:ext>
   </p:extLst>
 </p:sldLayout>
@@ -2981,7 +2981,7 @@
   </p:txStyles>
   <p:extLst>
     <p:ext uri="{27BBF7A9-308A-43DC-89C8-2F10F3537804}">
-      <p15:sldGuideLst xmlns:p15="http://schemas.microsoft.com/office/powerpoint/2012/main" xmlns=""/>
+      <p15:sldGuideLst xmlns="" xmlns:p15="http://schemas.microsoft.com/office/powerpoint/2012/main"/>
     </p:ext>
   </p:extLst>
 </p:sldMaster>
@@ -7133,8 +7133,8 @@
           <a:lstStyle/>
           <a:p>
             <a:r>
-              <a:rPr lang="en-US" dirty="0" smtClean="0"/>
-              <a:t>Single-cycle </a:t>
+              <a:rPr lang="en-US" smtClean="0"/>
+              <a:t>Final CPU </a:t>
             </a:r>
             <a:r>
               <a:rPr lang="en-US" dirty="0" err="1" smtClean="0"/>
@@ -10315,7 +10315,7 @@
   <a:extraClrSchemeLst/>
   <a:extLst>
     <a:ext uri="{05A4C25C-085E-4340-85A3-A5531E510DB2}">
-      <thm15:themeFamily xmlns:thm15="http://schemas.microsoft.com/office/thememl/2012/main" xmlns="" name="Office Theme" id="{62F939B6-93AF-4DB8-9C6B-D6C7DFDC589F}" vid="{4F46216B-77A9-411A-B9D3-5023FCB70208}"/>
+      <thm15:themeFamily xmlns="" xmlns:thm15="http://schemas.microsoft.com/office/thememl/2012/main" name="Office Theme" id="{62F939B6-93AF-4DB8-9C6B-D6C7DFDC589F}" vid="{4F46216B-77A9-411A-B9D3-5023FCB70208}"/>
     </a:ext>
   </a:extLst>
 </a:theme>

</xml_diff>